<commit_message>
- add web optimize
</commit_message>
<xml_diff>
--- a/presentations/chapter-7/Practical Web Dev.pptx
+++ b/presentations/chapter-7/Practical Web Dev.pptx
@@ -5,11 +5,17 @@
     <p:sldMasterId id="2147483648" r:id="rId1"/>
   </p:sldMasterIdLst>
   <p:notesMasterIdLst>
-    <p:notesMasterId r:id="rId4"/>
+    <p:notesMasterId r:id="rId10"/>
   </p:notesMasterIdLst>
   <p:sldIdLst>
     <p:sldId id="408" r:id="rId2"/>
     <p:sldId id="409" r:id="rId3"/>
+    <p:sldId id="410" r:id="rId4"/>
+    <p:sldId id="411" r:id="rId5"/>
+    <p:sldId id="412" r:id="rId6"/>
+    <p:sldId id="413" r:id="rId7"/>
+    <p:sldId id="414" r:id="rId8"/>
+    <p:sldId id="415" r:id="rId9"/>
   </p:sldIdLst>
   <p:sldSz cx="12192000" cy="6858000"/>
   <p:notesSz cx="6858000" cy="9144000"/>
@@ -118,6 +124,12 @@
           <p14:sldIdLst>
             <p14:sldId id="408"/>
             <p14:sldId id="409"/>
+            <p14:sldId id="410"/>
+            <p14:sldId id="411"/>
+            <p14:sldId id="412"/>
+            <p14:sldId id="413"/>
+            <p14:sldId id="414"/>
+            <p14:sldId id="415"/>
           </p14:sldIdLst>
         </p14:section>
       </p14:sectionLst>
@@ -222,7 +234,7 @@
           <a:p>
             <a:fld id="{B53C1D94-E0DD-4250-8C1B-3D8C3DA9B2B6}" type="datetimeFigureOut">
               <a:rPr lang="he-IL" smtClean="0"/>
-              <a:t>כ"ז/סיון/תשע"ט</a:t>
+              <a:t>י"א/תמוז/תשע"ט</a:t>
             </a:fld>
             <a:endParaRPr lang="he-IL"/>
           </a:p>
@@ -651,7 +663,10 @@
               <a:tabLst/>
               <a:defRPr/>
             </a:pPr>
-            <a:endParaRPr lang="en-US" b="0" dirty="0"/>
+            <a:r>
+              <a:rPr lang="en-US" b="0" dirty="0"/>
+              <a:t>Here we are going to talk how to improve our web site performance</a:t>
+            </a:r>
           </a:p>
         </p:txBody>
       </p:sp>
@@ -682,6 +697,3666 @@
     <p:extLst>
       <p:ext uri="{BB962C8B-B14F-4D97-AF65-F5344CB8AC3E}">
         <p14:creationId xmlns:p14="http://schemas.microsoft.com/office/powerpoint/2010/main" val="1187732096"/>
+      </p:ext>
+    </p:extLst>
+  </p:cSld>
+  <p:clrMapOvr>
+    <a:masterClrMapping/>
+  </p:clrMapOvr>
+</p:notes>
+</file>
+
+<file path=ppt/notesSlides/notesSlide3.xml><?xml version="1.0" encoding="utf-8"?>
+<p:notes xmlns:a="http://schemas.openxmlformats.org/drawingml/2006/main" xmlns:r="http://schemas.openxmlformats.org/officeDocument/2006/relationships" xmlns:p="http://schemas.openxmlformats.org/presentationml/2006/main">
+  <p:cSld>
+    <p:spTree>
+      <p:nvGrpSpPr>
+        <p:cNvPr id="1" name=""/>
+        <p:cNvGrpSpPr/>
+        <p:nvPr/>
+      </p:nvGrpSpPr>
+      <p:grpSpPr>
+        <a:xfrm>
+          <a:off x="0" y="0"/>
+          <a:ext cx="0" cy="0"/>
+          <a:chOff x="0" y="0"/>
+          <a:chExt cx="0" cy="0"/>
+        </a:xfrm>
+      </p:grpSpPr>
+      <p:sp>
+        <p:nvSpPr>
+          <p:cNvPr id="2" name="Slide Image Placeholder 1"/>
+          <p:cNvSpPr>
+            <a:spLocks noGrp="1" noRot="1" noChangeAspect="1"/>
+          </p:cNvSpPr>
+          <p:nvPr>
+            <p:ph type="sldImg"/>
+          </p:nvPr>
+        </p:nvSpPr>
+        <p:spPr/>
+      </p:sp>
+      <p:sp>
+        <p:nvSpPr>
+          <p:cNvPr id="3" name="Notes Placeholder 2"/>
+          <p:cNvSpPr>
+            <a:spLocks noGrp="1"/>
+          </p:cNvSpPr>
+          <p:nvPr>
+            <p:ph type="body" idx="1"/>
+          </p:nvPr>
+        </p:nvSpPr>
+        <p:spPr/>
+        <p:txBody>
+          <a:bodyPr/>
+          <a:lstStyle/>
+          <a:p>
+            <a:pPr marL="171450" indent="-171450" algn="l" rtl="0" fontAlgn="base">
+              <a:buFontTx/>
+              <a:buChar char="-"/>
+            </a:pPr>
+            <a:r>
+              <a:rPr lang="en-US" sz="1200" b="0" i="0" kern="1200" dirty="0">
+                <a:solidFill>
+                  <a:schemeClr val="tx1"/>
+                </a:solidFill>
+                <a:effectLst/>
+                <a:latin typeface="+mn-lt"/>
+                <a:ea typeface="+mn-ea"/>
+                <a:cs typeface="+mn-cs"/>
+              </a:rPr>
+              <a:t>Bundle Size:</a:t>
+            </a:r>
+          </a:p>
+          <a:p>
+            <a:pPr marL="628650" lvl="1" indent="-171450" algn="l" rtl="0" fontAlgn="base">
+              <a:buFontTx/>
+              <a:buChar char="-"/>
+            </a:pPr>
+            <a:r>
+              <a:rPr lang="en-US" sz="1200" b="0" i="0" kern="1200" dirty="0">
+                <a:solidFill>
+                  <a:schemeClr val="tx1"/>
+                </a:solidFill>
+                <a:effectLst/>
+                <a:latin typeface="+mn-lt"/>
+                <a:ea typeface="+mn-ea"/>
+                <a:cs typeface="+mn-cs"/>
+              </a:rPr>
+              <a:t>When you are adding a new package consider his size as well, you can check it via bundle phobia or if you are using VS code the is a plugin for it.</a:t>
+            </a:r>
+            <a:br>
+              <a:rPr lang="en-US" sz="1200" b="0" i="0" kern="1200" dirty="0">
+                <a:solidFill>
+                  <a:schemeClr val="tx1"/>
+                </a:solidFill>
+                <a:effectLst/>
+                <a:latin typeface="+mn-lt"/>
+                <a:ea typeface="+mn-ea"/>
+                <a:cs typeface="+mn-cs"/>
+              </a:rPr>
+            </a:br>
+            <a:r>
+              <a:rPr lang="en-US" sz="1200" b="0" i="0" kern="1200" dirty="0">
+                <a:solidFill>
+                  <a:schemeClr val="tx1"/>
+                </a:solidFill>
+                <a:effectLst/>
+                <a:latin typeface="+mn-lt"/>
+                <a:ea typeface="+mn-ea"/>
+                <a:cs typeface="+mn-cs"/>
+              </a:rPr>
+              <a:t>Bundle phobia is a website that provides more detailed bundle size information. You can also upload your </a:t>
+            </a:r>
+            <a:r>
+              <a:rPr lang="en-US" sz="1200" b="0" i="0" kern="1200" dirty="0" err="1">
+                <a:solidFill>
+                  <a:schemeClr val="tx1"/>
+                </a:solidFill>
+                <a:effectLst/>
+                <a:latin typeface="+mn-lt"/>
+                <a:ea typeface="+mn-ea"/>
+                <a:cs typeface="+mn-cs"/>
+              </a:rPr>
+              <a:t>package.json</a:t>
+            </a:r>
+            <a:r>
+              <a:rPr lang="en-US" sz="1200" b="0" i="0" kern="1200" dirty="0">
+                <a:solidFill>
+                  <a:schemeClr val="tx1"/>
+                </a:solidFill>
+                <a:effectLst/>
+                <a:latin typeface="+mn-lt"/>
+                <a:ea typeface="+mn-ea"/>
+                <a:cs typeface="+mn-cs"/>
+              </a:rPr>
+              <a:t> file to view your largest dependencies.</a:t>
+            </a:r>
+          </a:p>
+          <a:p>
+            <a:pPr marL="628650" lvl="1" indent="-171450" algn="l" rtl="0" fontAlgn="base">
+              <a:buFontTx/>
+              <a:buChar char="-"/>
+            </a:pPr>
+            <a:r>
+              <a:rPr lang="en-US" sz="1200" b="0" i="0" kern="1200" dirty="0">
+                <a:solidFill>
+                  <a:schemeClr val="tx1"/>
+                </a:solidFill>
+                <a:effectLst/>
+                <a:latin typeface="+mn-lt"/>
+                <a:ea typeface="+mn-ea"/>
+                <a:cs typeface="+mn-cs"/>
+              </a:rPr>
+              <a:t>Minification - Minification is the process of minimizing code and markup in your web pages and script files. It’s one of the main methods used to reduce load times and bandwidth usage on websites. Minification dramatically improves site speed and accessibility, directly translating into a better user experience. It’s also beneficial to users accessing your website through a limited data plan and who would like to save on their bandwidth usage while surfing the web.</a:t>
+            </a:r>
+          </a:p>
+          <a:p>
+            <a:pPr marL="628650" lvl="1" indent="-171450" algn="l" rtl="0" fontAlgn="base">
+              <a:buFontTx/>
+              <a:buChar char="-"/>
+            </a:pPr>
+            <a:r>
+              <a:rPr lang="en-US" sz="1200" b="0" i="0" kern="1200" dirty="0" err="1">
+                <a:solidFill>
+                  <a:schemeClr val="tx1"/>
+                </a:solidFill>
+                <a:effectLst/>
+                <a:latin typeface="+mn-lt"/>
+                <a:ea typeface="+mn-ea"/>
+                <a:cs typeface="+mn-cs"/>
+              </a:rPr>
+              <a:t>Brotli</a:t>
+            </a:r>
+            <a:r>
+              <a:rPr lang="en-US" sz="1200" b="0" i="0" kern="1200" dirty="0">
+                <a:solidFill>
+                  <a:schemeClr val="tx1"/>
+                </a:solidFill>
+                <a:effectLst/>
+                <a:latin typeface="+mn-lt"/>
+                <a:ea typeface="+mn-ea"/>
+                <a:cs typeface="+mn-cs"/>
+              </a:rPr>
+              <a:t> compression - Just like </a:t>
+            </a:r>
+            <a:r>
+              <a:rPr lang="en-US" sz="1200" b="0" i="0" kern="1200" dirty="0" err="1">
+                <a:solidFill>
+                  <a:schemeClr val="tx1"/>
+                </a:solidFill>
+                <a:effectLst/>
+                <a:latin typeface="+mn-lt"/>
+                <a:ea typeface="+mn-ea"/>
+                <a:cs typeface="+mn-cs"/>
+              </a:rPr>
+              <a:t>gzip</a:t>
+            </a:r>
+            <a:r>
+              <a:rPr lang="en-US" sz="1200" b="0" i="0" kern="1200" dirty="0">
+                <a:solidFill>
+                  <a:schemeClr val="tx1"/>
+                </a:solidFill>
+                <a:effectLst/>
+                <a:latin typeface="+mn-lt"/>
+                <a:ea typeface="+mn-ea"/>
+                <a:cs typeface="+mn-cs"/>
+              </a:rPr>
+              <a:t>, </a:t>
+            </a:r>
+            <a:r>
+              <a:rPr lang="en-US" sz="1200" b="0" i="0" kern="1200" dirty="0" err="1">
+                <a:solidFill>
+                  <a:schemeClr val="tx1"/>
+                </a:solidFill>
+                <a:effectLst/>
+                <a:latin typeface="+mn-lt"/>
+                <a:ea typeface="+mn-ea"/>
+                <a:cs typeface="+mn-cs"/>
+              </a:rPr>
+              <a:t>Brotli</a:t>
+            </a:r>
+            <a:r>
+              <a:rPr lang="en-US" sz="1200" b="0" i="0" kern="1200" dirty="0">
+                <a:solidFill>
+                  <a:schemeClr val="tx1"/>
+                </a:solidFill>
+                <a:effectLst/>
+                <a:latin typeface="+mn-lt"/>
+                <a:ea typeface="+mn-ea"/>
+                <a:cs typeface="+mn-cs"/>
+              </a:rPr>
+              <a:t> is also a compression algorithm. It is developed by Google and serves best for text compression</a:t>
+            </a:r>
+          </a:p>
+          <a:p>
+            <a:pPr marL="628650" lvl="1" indent="-171450" algn="l" rtl="0" fontAlgn="base">
+              <a:buFontTx/>
+              <a:buChar char="-"/>
+            </a:pPr>
+            <a:r>
+              <a:rPr lang="en-US" sz="1200" b="0" i="0" kern="1200" dirty="0">
+                <a:solidFill>
+                  <a:schemeClr val="tx1"/>
+                </a:solidFill>
+                <a:effectLst/>
+                <a:latin typeface="+mn-lt"/>
+                <a:ea typeface="+mn-ea"/>
+                <a:cs typeface="+mn-cs"/>
+              </a:rPr>
+              <a:t>GZIP compression - </a:t>
+            </a:r>
+            <a:r>
+              <a:rPr lang="en-US" sz="1200" b="0" i="0" kern="1200" dirty="0" err="1">
+                <a:solidFill>
+                  <a:schemeClr val="tx1"/>
+                </a:solidFill>
+                <a:effectLst/>
+                <a:latin typeface="+mn-lt"/>
+                <a:ea typeface="+mn-ea"/>
+                <a:cs typeface="+mn-cs"/>
+              </a:rPr>
+              <a:t>GZip</a:t>
+            </a:r>
+            <a:r>
+              <a:rPr lang="en-US" sz="1200" b="0" i="0" kern="1200" dirty="0">
+                <a:solidFill>
+                  <a:schemeClr val="tx1"/>
+                </a:solidFill>
+                <a:effectLst/>
+                <a:latin typeface="+mn-lt"/>
+                <a:ea typeface="+mn-ea"/>
+                <a:cs typeface="+mn-cs"/>
+              </a:rPr>
+              <a:t> is a form of data compression -- </a:t>
+            </a:r>
+            <a:r>
+              <a:rPr lang="en-US" sz="1200" b="0" i="0" kern="1200" dirty="0" err="1">
+                <a:solidFill>
+                  <a:schemeClr val="tx1"/>
+                </a:solidFill>
+                <a:effectLst/>
+                <a:latin typeface="+mn-lt"/>
+                <a:ea typeface="+mn-ea"/>
+                <a:cs typeface="+mn-cs"/>
+              </a:rPr>
+              <a:t>ie</a:t>
+            </a:r>
+            <a:r>
+              <a:rPr lang="en-US" sz="1200" b="0" i="0" kern="1200" dirty="0">
+                <a:solidFill>
+                  <a:schemeClr val="tx1"/>
+                </a:solidFill>
+                <a:effectLst/>
+                <a:latin typeface="+mn-lt"/>
+                <a:ea typeface="+mn-ea"/>
+                <a:cs typeface="+mn-cs"/>
+              </a:rPr>
+              <a:t> it takes a chunk of data and makes it smaller. The original data can be restored by un-zipping the compressed file.</a:t>
+            </a:r>
+            <a:br>
+              <a:rPr lang="en-US" sz="1200" b="0" i="0" kern="1200" dirty="0">
+                <a:solidFill>
+                  <a:schemeClr val="tx1"/>
+                </a:solidFill>
+                <a:effectLst/>
+                <a:latin typeface="+mn-lt"/>
+                <a:ea typeface="+mn-ea"/>
+                <a:cs typeface="+mn-cs"/>
+              </a:rPr>
+            </a:br>
+            <a:r>
+              <a:rPr lang="en-US" sz="1200" b="0" i="0" kern="1200" dirty="0">
+                <a:solidFill>
+                  <a:schemeClr val="tx1"/>
+                </a:solidFill>
+                <a:effectLst/>
+                <a:latin typeface="+mn-lt"/>
+                <a:ea typeface="+mn-ea"/>
+                <a:cs typeface="+mn-cs"/>
+              </a:rPr>
+              <a:t>It is relevant to web apps and web sites because the HTTP protocol includes the ability to </a:t>
+            </a:r>
+            <a:r>
+              <a:rPr lang="en-US" sz="1200" b="0" i="0" kern="1200" dirty="0" err="1">
+                <a:solidFill>
+                  <a:schemeClr val="tx1"/>
+                </a:solidFill>
+                <a:effectLst/>
+                <a:latin typeface="+mn-lt"/>
+                <a:ea typeface="+mn-ea"/>
+                <a:cs typeface="+mn-cs"/>
+              </a:rPr>
+              <a:t>gzip</a:t>
+            </a:r>
+            <a:r>
+              <a:rPr lang="en-US" sz="1200" b="0" i="0" kern="1200" dirty="0">
+                <a:solidFill>
+                  <a:schemeClr val="tx1"/>
+                </a:solidFill>
+                <a:effectLst/>
+                <a:latin typeface="+mn-lt"/>
+                <a:ea typeface="+mn-ea"/>
+                <a:cs typeface="+mn-cs"/>
+              </a:rPr>
+              <a:t> data that is being sent.</a:t>
+            </a:r>
+            <a:br>
+              <a:rPr lang="en-US" sz="1200" b="0" i="0" kern="1200" dirty="0">
+                <a:solidFill>
+                  <a:schemeClr val="tx1"/>
+                </a:solidFill>
+                <a:effectLst/>
+                <a:latin typeface="+mn-lt"/>
+                <a:ea typeface="+mn-ea"/>
+                <a:cs typeface="+mn-cs"/>
+              </a:rPr>
+            </a:br>
+            <a:r>
+              <a:rPr lang="en-US" sz="1200" b="0" i="0" kern="1200" dirty="0">
+                <a:solidFill>
+                  <a:schemeClr val="tx1"/>
+                </a:solidFill>
+                <a:effectLst/>
+                <a:latin typeface="+mn-lt"/>
+                <a:ea typeface="+mn-ea"/>
+                <a:cs typeface="+mn-cs"/>
+              </a:rPr>
+              <a:t>This means that when it is in use, your bandwidth costs for serving the site will be lower because people visiting the site will be downloading smaller files.</a:t>
+            </a:r>
+            <a:br>
+              <a:rPr lang="en-US" sz="1200" b="0" i="0" kern="1200" dirty="0">
+                <a:solidFill>
+                  <a:schemeClr val="tx1"/>
+                </a:solidFill>
+                <a:effectLst/>
+                <a:latin typeface="+mn-lt"/>
+                <a:ea typeface="+mn-ea"/>
+                <a:cs typeface="+mn-cs"/>
+              </a:rPr>
+            </a:br>
+            <a:r>
+              <a:rPr lang="en-US" sz="1200" b="0" i="0" kern="1200" dirty="0">
+                <a:solidFill>
+                  <a:schemeClr val="tx1"/>
+                </a:solidFill>
+                <a:effectLst/>
+                <a:latin typeface="+mn-lt"/>
+                <a:ea typeface="+mn-ea"/>
+                <a:cs typeface="+mn-cs"/>
+              </a:rPr>
+              <a:t>There are a few caveats to using </a:t>
+            </a:r>
+            <a:r>
+              <a:rPr lang="en-US" sz="1200" b="0" i="0" kern="1200" dirty="0" err="1">
+                <a:solidFill>
+                  <a:schemeClr val="tx1"/>
+                </a:solidFill>
+                <a:effectLst/>
+                <a:latin typeface="+mn-lt"/>
+                <a:ea typeface="+mn-ea"/>
+                <a:cs typeface="+mn-cs"/>
+              </a:rPr>
+              <a:t>GZip</a:t>
+            </a:r>
+            <a:r>
+              <a:rPr lang="en-US" sz="1200" b="0" i="0" kern="1200" dirty="0">
+                <a:solidFill>
+                  <a:schemeClr val="tx1"/>
+                </a:solidFill>
+                <a:effectLst/>
+                <a:latin typeface="+mn-lt"/>
+                <a:ea typeface="+mn-ea"/>
+                <a:cs typeface="+mn-cs"/>
+              </a:rPr>
+              <a:t>, but overall it's usually better to use </a:t>
+            </a:r>
+            <a:r>
+              <a:rPr lang="en-US" sz="1200" b="0" i="0" kern="1200" dirty="0" err="1">
+                <a:solidFill>
+                  <a:schemeClr val="tx1"/>
+                </a:solidFill>
+                <a:effectLst/>
+                <a:latin typeface="+mn-lt"/>
+                <a:ea typeface="+mn-ea"/>
+                <a:cs typeface="+mn-cs"/>
+              </a:rPr>
+              <a:t>gzip</a:t>
+            </a:r>
+            <a:r>
+              <a:rPr lang="en-US" sz="1200" b="0" i="0" kern="1200" dirty="0">
+                <a:solidFill>
+                  <a:schemeClr val="tx1"/>
+                </a:solidFill>
+                <a:effectLst/>
+                <a:latin typeface="+mn-lt"/>
+                <a:ea typeface="+mn-ea"/>
+                <a:cs typeface="+mn-cs"/>
+              </a:rPr>
+              <a:t> than not to -- for example, it does take time and processor power to zip and unzip the files, but typically this is not a problem because the time it takes to do that is often less than the time that is saved by downloading a smaller file. Therefore the overall effect is a time saving, despite the browser having to unzip the file.</a:t>
+            </a:r>
+          </a:p>
+          <a:p>
+            <a:pPr marL="628650" marR="0" lvl="1" indent="-171450" algn="l" defTabSz="914400" rtl="0" eaLnBrk="1" fontAlgn="base" latinLnBrk="0" hangingPunct="1">
+              <a:lnSpc>
+                <a:spcPct val="100000"/>
+              </a:lnSpc>
+              <a:spcBef>
+                <a:spcPts val="0"/>
+              </a:spcBef>
+              <a:spcAft>
+                <a:spcPts val="0"/>
+              </a:spcAft>
+              <a:buClrTx/>
+              <a:buSzTx/>
+              <a:buFontTx/>
+              <a:buChar char="-"/>
+              <a:tabLst/>
+              <a:defRPr/>
+            </a:pPr>
+            <a:r>
+              <a:rPr lang="en-US" sz="1200" b="0" i="0" kern="1200" dirty="0">
+                <a:solidFill>
+                  <a:schemeClr val="tx1"/>
+                </a:solidFill>
+                <a:effectLst/>
+                <a:latin typeface="+mn-lt"/>
+                <a:ea typeface="+mn-ea"/>
+                <a:cs typeface="+mn-cs"/>
+              </a:rPr>
+              <a:t>Compile target – compile to relevant browser target support.</a:t>
+            </a:r>
+            <a:br>
+              <a:rPr lang="en-US" sz="1200" b="0" i="0" kern="1200" dirty="0">
+                <a:solidFill>
+                  <a:schemeClr val="tx1"/>
+                </a:solidFill>
+                <a:effectLst/>
+                <a:latin typeface="+mn-lt"/>
+                <a:ea typeface="+mn-ea"/>
+                <a:cs typeface="+mn-cs"/>
+              </a:rPr>
+            </a:br>
+            <a:r>
+              <a:rPr lang="en-US" sz="1200" b="0" i="0" kern="1200" dirty="0">
+                <a:solidFill>
+                  <a:schemeClr val="tx1"/>
+                </a:solidFill>
+                <a:effectLst/>
+                <a:latin typeface="+mn-lt"/>
+                <a:ea typeface="+mn-ea"/>
+                <a:cs typeface="+mn-cs"/>
+              </a:rPr>
+              <a:t>Compiling your code with Babel is needed to support older browsers, but it also makes your code much more verbose.</a:t>
+            </a:r>
+            <a:br>
+              <a:rPr lang="en-US" sz="1200" b="0" i="0" kern="1200" dirty="0">
+                <a:solidFill>
+                  <a:schemeClr val="tx1"/>
+                </a:solidFill>
+                <a:effectLst/>
+                <a:latin typeface="+mn-lt"/>
+                <a:ea typeface="+mn-ea"/>
+                <a:cs typeface="+mn-cs"/>
+              </a:rPr>
+            </a:br>
+            <a:r>
+              <a:rPr lang="en-US" sz="1200" b="0" i="0" kern="1200" dirty="0">
+                <a:solidFill>
+                  <a:schemeClr val="tx1"/>
+                </a:solidFill>
+                <a:effectLst/>
+                <a:latin typeface="+mn-lt"/>
+                <a:ea typeface="+mn-ea"/>
+                <a:cs typeface="+mn-cs"/>
+              </a:rPr>
+              <a:t>For example function which is not supported in ES5 but supported in ES6 the code transformation will increase our code.</a:t>
+            </a:r>
+            <a:br>
+              <a:rPr lang="en-US" sz="1200" b="0" i="0" kern="1200" dirty="0">
+                <a:solidFill>
+                  <a:schemeClr val="tx1"/>
+                </a:solidFill>
+                <a:effectLst/>
+                <a:latin typeface="+mn-lt"/>
+                <a:ea typeface="+mn-ea"/>
+                <a:cs typeface="+mn-cs"/>
+              </a:rPr>
+            </a:br>
+            <a:r>
+              <a:rPr lang="en-US" sz="1200" b="0" i="0" kern="1200" dirty="0">
+                <a:solidFill>
+                  <a:schemeClr val="tx1"/>
+                </a:solidFill>
+                <a:effectLst/>
+                <a:latin typeface="+mn-lt"/>
+                <a:ea typeface="+mn-ea"/>
+                <a:cs typeface="+mn-cs"/>
+              </a:rPr>
+              <a:t>In angular 8 for example they added a new functionality `</a:t>
+            </a:r>
+            <a:r>
+              <a:rPr lang="en-US" sz="1200" b="1" i="0" kern="1200" dirty="0">
+                <a:solidFill>
+                  <a:schemeClr val="tx1"/>
+                </a:solidFill>
+                <a:effectLst/>
+                <a:latin typeface="+mn-lt"/>
+                <a:ea typeface="+mn-ea"/>
+                <a:cs typeface="+mn-cs"/>
+              </a:rPr>
+              <a:t>Differential Loading by Default` </a:t>
+            </a:r>
+            <a:r>
+              <a:rPr lang="en-US" sz="1200" b="0" i="0" kern="1200" dirty="0">
+                <a:solidFill>
+                  <a:schemeClr val="tx1"/>
+                </a:solidFill>
+                <a:effectLst/>
+                <a:latin typeface="+mn-lt"/>
+                <a:ea typeface="+mn-ea"/>
+                <a:cs typeface="+mn-cs"/>
+              </a:rPr>
+              <a:t>- When users load your application, they’ll automatically get the bundle they need. (</a:t>
+            </a:r>
+            <a:r>
+              <a:rPr lang="en-US" sz="1200" b="0" i="0" u="none" strike="noStrike" kern="1200" dirty="0">
+                <a:solidFill>
+                  <a:schemeClr val="tx1"/>
+                </a:solidFill>
+                <a:effectLst/>
+                <a:latin typeface="+mn-lt"/>
+                <a:ea typeface="+mn-ea"/>
+                <a:cs typeface="+mn-cs"/>
+                <a:hlinkClick r:id="rId3"/>
+              </a:rPr>
+              <a:t>Differential loading</a:t>
+            </a:r>
+            <a:r>
+              <a:rPr lang="en-US" sz="1200" b="0" i="0" kern="1200" dirty="0">
+                <a:solidFill>
+                  <a:schemeClr val="tx1"/>
+                </a:solidFill>
+                <a:effectLst/>
+                <a:latin typeface="+mn-lt"/>
+                <a:ea typeface="+mn-ea"/>
+                <a:cs typeface="+mn-cs"/>
+              </a:rPr>
+              <a:t> is a process by which the browser chooses between modern or legacy JavaScript based on its own capabilities. We now take advantage of this by default by performing a modern build (es2015) and a legacy build (es5) of your application.)</a:t>
+            </a:r>
+            <a:br>
+              <a:rPr lang="en-US" sz="1200" b="0" i="0" kern="1200" dirty="0">
+                <a:solidFill>
+                  <a:schemeClr val="tx1"/>
+                </a:solidFill>
+                <a:effectLst/>
+                <a:latin typeface="+mn-lt"/>
+                <a:ea typeface="+mn-ea"/>
+                <a:cs typeface="+mn-cs"/>
+              </a:rPr>
+            </a:br>
+            <a:r>
+              <a:rPr lang="en-US" sz="1200" b="0" i="0" kern="1200" dirty="0">
+                <a:solidFill>
+                  <a:schemeClr val="tx1"/>
+                </a:solidFill>
+                <a:effectLst/>
+                <a:latin typeface="+mn-lt"/>
+                <a:ea typeface="+mn-ea"/>
+                <a:cs typeface="+mn-cs"/>
+              </a:rPr>
+              <a:t>this action can reduce 7–20% of their bundle size. (</a:t>
+            </a:r>
+            <a:r>
+              <a:rPr lang="en-US" dirty="0">
+                <a:hlinkClick r:id="rId4"/>
+              </a:rPr>
+              <a:t>https://blog.angular.io/version-8-of-angular-smaller-bundles-cli-apis-and-alignment-with-the-ecosystem-af0261112a27</a:t>
+            </a:r>
+            <a:r>
+              <a:rPr lang="en-US" sz="1200" b="0" i="0" kern="1200" dirty="0">
+                <a:solidFill>
+                  <a:schemeClr val="tx1"/>
+                </a:solidFill>
+                <a:effectLst/>
+                <a:latin typeface="+mn-lt"/>
+                <a:ea typeface="+mn-ea"/>
+                <a:cs typeface="+mn-cs"/>
+              </a:rPr>
+              <a:t>)</a:t>
+            </a:r>
+          </a:p>
+          <a:p>
+            <a:pPr marL="628650" marR="0" lvl="1" indent="-171450" algn="l" defTabSz="914400" rtl="0" eaLnBrk="1" fontAlgn="base" latinLnBrk="0" hangingPunct="1">
+              <a:lnSpc>
+                <a:spcPct val="100000"/>
+              </a:lnSpc>
+              <a:spcBef>
+                <a:spcPts val="0"/>
+              </a:spcBef>
+              <a:spcAft>
+                <a:spcPts val="0"/>
+              </a:spcAft>
+              <a:buClrTx/>
+              <a:buSzTx/>
+              <a:buFontTx/>
+              <a:buChar char="-"/>
+              <a:tabLst/>
+              <a:defRPr/>
+            </a:pPr>
+            <a:r>
+              <a:rPr lang="en-US" sz="1200" b="0" i="0" kern="1200" dirty="0">
+                <a:solidFill>
+                  <a:schemeClr val="tx1"/>
+                </a:solidFill>
+                <a:effectLst/>
+                <a:latin typeface="+mn-lt"/>
+                <a:ea typeface="+mn-ea"/>
+                <a:cs typeface="+mn-cs"/>
+              </a:rPr>
+              <a:t>Tree Shaking - </a:t>
+            </a:r>
+            <a:r>
+              <a:rPr lang="en-US" sz="1200" b="0" i="1" kern="1200" dirty="0">
+                <a:solidFill>
+                  <a:schemeClr val="tx1"/>
+                </a:solidFill>
+                <a:effectLst/>
+                <a:latin typeface="+mn-lt"/>
+                <a:ea typeface="+mn-ea"/>
+                <a:cs typeface="+mn-cs"/>
+              </a:rPr>
+              <a:t>Tree shaking</a:t>
+            </a:r>
+            <a:r>
+              <a:rPr lang="en-US" sz="1200" b="0" i="0" kern="1200" dirty="0">
+                <a:solidFill>
+                  <a:schemeClr val="tx1"/>
+                </a:solidFill>
+                <a:effectLst/>
+                <a:latin typeface="+mn-lt"/>
+                <a:ea typeface="+mn-ea"/>
+                <a:cs typeface="+mn-cs"/>
+              </a:rPr>
+              <a:t> is a term commonly used in the JavaScript context for dead-code elimination. It relies on the </a:t>
+            </a:r>
+            <a:r>
+              <a:rPr lang="en-US" sz="1200" b="0" i="0" u="none" strike="noStrike" kern="1200" dirty="0">
+                <a:solidFill>
+                  <a:schemeClr val="tx1"/>
+                </a:solidFill>
+                <a:effectLst/>
+                <a:latin typeface="+mn-lt"/>
+                <a:ea typeface="+mn-ea"/>
+                <a:cs typeface="+mn-cs"/>
+                <a:hlinkClick r:id="rId5"/>
+              </a:rPr>
+              <a:t>static structure</a:t>
+            </a:r>
+            <a:r>
+              <a:rPr lang="en-US" sz="1200" b="0" i="0" kern="1200" dirty="0">
+                <a:solidFill>
+                  <a:schemeClr val="tx1"/>
+                </a:solidFill>
+                <a:effectLst/>
+                <a:latin typeface="+mn-lt"/>
+                <a:ea typeface="+mn-ea"/>
+                <a:cs typeface="+mn-cs"/>
+              </a:rPr>
+              <a:t> of ES2015 module syntax, i.e. </a:t>
+            </a:r>
+            <a:r>
+              <a:rPr lang="en-US" sz="1200" b="0" i="0" u="none" strike="noStrike" kern="1200" dirty="0">
+                <a:solidFill>
+                  <a:schemeClr val="tx1"/>
+                </a:solidFill>
+                <a:effectLst/>
+                <a:latin typeface="+mn-lt"/>
+                <a:ea typeface="+mn-ea"/>
+                <a:cs typeface="+mn-cs"/>
+                <a:hlinkClick r:id="rId6"/>
+              </a:rPr>
+              <a:t>import</a:t>
+            </a:r>
+            <a:r>
+              <a:rPr lang="en-US" sz="1200" b="0" i="0" kern="1200" dirty="0">
+                <a:solidFill>
+                  <a:schemeClr val="tx1"/>
+                </a:solidFill>
+                <a:effectLst/>
+                <a:latin typeface="+mn-lt"/>
+                <a:ea typeface="+mn-ea"/>
+                <a:cs typeface="+mn-cs"/>
+              </a:rPr>
+              <a:t> and </a:t>
+            </a:r>
+            <a:r>
+              <a:rPr lang="en-US" sz="1200" b="0" i="0" u="none" strike="noStrike" kern="1200" dirty="0">
+                <a:solidFill>
+                  <a:schemeClr val="tx1"/>
+                </a:solidFill>
+                <a:effectLst/>
+                <a:latin typeface="+mn-lt"/>
+                <a:ea typeface="+mn-ea"/>
+                <a:cs typeface="+mn-cs"/>
+                <a:hlinkClick r:id="rId7"/>
+              </a:rPr>
+              <a:t>export</a:t>
+            </a:r>
+            <a:r>
+              <a:rPr lang="en-US" sz="1200" b="0" i="0" kern="1200" dirty="0">
+                <a:solidFill>
+                  <a:schemeClr val="tx1"/>
+                </a:solidFill>
+                <a:effectLst/>
+                <a:latin typeface="+mn-lt"/>
+                <a:ea typeface="+mn-ea"/>
+                <a:cs typeface="+mn-cs"/>
+              </a:rPr>
+              <a:t>. The name and concept have been popularized by the ES2015 module bundler </a:t>
+            </a:r>
+            <a:r>
+              <a:rPr lang="en-US" sz="1200" b="0" i="0" u="none" strike="noStrike" kern="1200" dirty="0">
+                <a:solidFill>
+                  <a:schemeClr val="tx1"/>
+                </a:solidFill>
+                <a:effectLst/>
+                <a:latin typeface="+mn-lt"/>
+                <a:ea typeface="+mn-ea"/>
+                <a:cs typeface="+mn-cs"/>
+                <a:hlinkClick r:id="rId8"/>
+              </a:rPr>
+              <a:t>rollup</a:t>
+            </a:r>
+            <a:r>
+              <a:rPr lang="en-US" sz="1200" b="0" i="0" kern="1200" dirty="0">
+                <a:solidFill>
+                  <a:schemeClr val="tx1"/>
+                </a:solidFill>
+                <a:effectLst/>
+                <a:latin typeface="+mn-lt"/>
+                <a:ea typeface="+mn-ea"/>
+                <a:cs typeface="+mn-cs"/>
+              </a:rPr>
+              <a:t>.</a:t>
+            </a:r>
+            <a:br>
+              <a:rPr lang="en-US" sz="1200" b="0" i="0" kern="1200" dirty="0">
+                <a:solidFill>
+                  <a:schemeClr val="tx1"/>
+                </a:solidFill>
+                <a:effectLst/>
+                <a:latin typeface="+mn-lt"/>
+                <a:ea typeface="+mn-ea"/>
+                <a:cs typeface="+mn-cs"/>
+              </a:rPr>
+            </a:br>
+            <a:r>
+              <a:rPr lang="en-US" sz="1200" b="0" i="0" kern="1200" dirty="0">
+                <a:solidFill>
+                  <a:schemeClr val="tx1"/>
+                </a:solidFill>
+                <a:effectLst/>
+                <a:latin typeface="+mn-lt"/>
+                <a:ea typeface="+mn-ea"/>
+                <a:cs typeface="+mn-cs"/>
+              </a:rPr>
+              <a:t>Tree shaking allows you to load only the parts of a package you need, rather than the whole package.</a:t>
+            </a:r>
+            <a:br>
+              <a:rPr lang="en-US" sz="1200" b="0" i="0" kern="1200" dirty="0">
+                <a:solidFill>
+                  <a:schemeClr val="tx1"/>
+                </a:solidFill>
+                <a:effectLst/>
+                <a:latin typeface="+mn-lt"/>
+                <a:ea typeface="+mn-ea"/>
+                <a:cs typeface="+mn-cs"/>
+              </a:rPr>
+            </a:br>
+            <a:endParaRPr lang="en-US" sz="1200" b="0" i="0" kern="1200" dirty="0">
+              <a:solidFill>
+                <a:schemeClr val="tx1"/>
+              </a:solidFill>
+              <a:effectLst/>
+              <a:latin typeface="+mn-lt"/>
+              <a:ea typeface="+mn-ea"/>
+              <a:cs typeface="+mn-cs"/>
+            </a:endParaRPr>
+          </a:p>
+          <a:p>
+            <a:pPr marL="628650" lvl="1" indent="-171450" algn="l" rtl="0" fontAlgn="base">
+              <a:buFontTx/>
+              <a:buChar char="-"/>
+            </a:pPr>
+            <a:r>
+              <a:rPr lang="en-US" sz="1200" b="0" i="0" kern="1200" dirty="0">
+                <a:solidFill>
+                  <a:schemeClr val="tx1"/>
+                </a:solidFill>
+                <a:effectLst/>
+                <a:latin typeface="+mn-lt"/>
+                <a:ea typeface="+mn-ea"/>
+                <a:cs typeface="+mn-cs"/>
+              </a:rPr>
+              <a:t>Quicker download times for your users.</a:t>
+            </a:r>
+          </a:p>
+          <a:p>
+            <a:pPr marL="628650" lvl="1" indent="-171450" algn="l" rtl="0" fontAlgn="base">
+              <a:buFontTx/>
+              <a:buChar char="-"/>
+            </a:pPr>
+            <a:r>
+              <a:rPr lang="en-US" sz="1200" b="0" i="0" kern="1200" dirty="0">
+                <a:solidFill>
+                  <a:schemeClr val="tx1"/>
+                </a:solidFill>
+                <a:effectLst/>
+                <a:latin typeface="+mn-lt"/>
+                <a:ea typeface="+mn-ea"/>
+                <a:cs typeface="+mn-cs"/>
+              </a:rPr>
+              <a:t>Reduced bandwidth consumption of your website.</a:t>
+            </a:r>
+          </a:p>
+          <a:p>
+            <a:pPr marL="628650" lvl="1" indent="-171450" algn="l" rtl="0" fontAlgn="base">
+              <a:buFontTx/>
+              <a:buChar char="-"/>
+            </a:pPr>
+            <a:r>
+              <a:rPr lang="en-US" sz="1200" b="0" i="0" kern="1200" dirty="0">
+                <a:solidFill>
+                  <a:schemeClr val="tx1"/>
+                </a:solidFill>
+                <a:effectLst/>
+                <a:latin typeface="+mn-lt"/>
+                <a:ea typeface="+mn-ea"/>
+                <a:cs typeface="+mn-cs"/>
+              </a:rPr>
+              <a:t>Reduced number of HTTP requests on your server when combining many JavaScript files into one compressed file, thus reducing the server load and allowing more visitors to access your website.</a:t>
+            </a:r>
+          </a:p>
+          <a:p>
+            <a:pPr marL="628650" lvl="1" indent="-171450" algn="l" rtl="0" fontAlgn="base">
+              <a:buFontTx/>
+              <a:buChar char="-"/>
+            </a:pPr>
+            <a:r>
+              <a:rPr lang="en-US" sz="1200" b="0" i="0" kern="1200" dirty="0">
+                <a:solidFill>
+                  <a:schemeClr val="tx1"/>
+                </a:solidFill>
+                <a:effectLst/>
+                <a:latin typeface="+mn-lt"/>
+                <a:ea typeface="+mn-ea"/>
+                <a:cs typeface="+mn-cs"/>
+              </a:rPr>
+              <a:t>Comments and whitespace are not needed for JavaScript execution; Removing them will reduce file size and speed up script execution times.</a:t>
+            </a:r>
+          </a:p>
+          <a:p>
+            <a:pPr marL="0" marR="0" lvl="0" indent="0" algn="l" defTabSz="914400" rtl="0" eaLnBrk="1" fontAlgn="auto" latinLnBrk="0" hangingPunct="1">
+              <a:lnSpc>
+                <a:spcPct val="100000"/>
+              </a:lnSpc>
+              <a:spcBef>
+                <a:spcPts val="0"/>
+              </a:spcBef>
+              <a:spcAft>
+                <a:spcPts val="0"/>
+              </a:spcAft>
+              <a:buClrTx/>
+              <a:buSzTx/>
+              <a:buFontTx/>
+              <a:buNone/>
+              <a:tabLst/>
+              <a:defRPr/>
+            </a:pPr>
+            <a:endParaRPr lang="en-US" b="0" dirty="0"/>
+          </a:p>
+          <a:p>
+            <a:pPr marL="171450" marR="0" lvl="0" indent="-171450" algn="l" defTabSz="914400" rtl="0" eaLnBrk="1" fontAlgn="auto" latinLnBrk="0" hangingPunct="1">
+              <a:lnSpc>
+                <a:spcPct val="100000"/>
+              </a:lnSpc>
+              <a:spcBef>
+                <a:spcPts val="0"/>
+              </a:spcBef>
+              <a:spcAft>
+                <a:spcPts val="0"/>
+              </a:spcAft>
+              <a:buClrTx/>
+              <a:buSzTx/>
+              <a:buFontTx/>
+              <a:buChar char="-"/>
+              <a:tabLst/>
+              <a:defRPr/>
+            </a:pPr>
+            <a:endParaRPr lang="en-US" b="0" dirty="0"/>
+          </a:p>
+          <a:p>
+            <a:pPr marL="171450" marR="0" lvl="0" indent="-171450" algn="l" defTabSz="914400" rtl="0" eaLnBrk="1" fontAlgn="auto" latinLnBrk="0" hangingPunct="1">
+              <a:lnSpc>
+                <a:spcPct val="100000"/>
+              </a:lnSpc>
+              <a:spcBef>
+                <a:spcPts val="0"/>
+              </a:spcBef>
+              <a:spcAft>
+                <a:spcPts val="0"/>
+              </a:spcAft>
+              <a:buClrTx/>
+              <a:buSzTx/>
+              <a:buFontTx/>
+              <a:buChar char="-"/>
+              <a:tabLst/>
+              <a:defRPr/>
+            </a:pPr>
+            <a:endParaRPr lang="en-US" b="0" dirty="0"/>
+          </a:p>
+          <a:p>
+            <a:pPr marL="171450" marR="0" lvl="0" indent="-171450" algn="l" defTabSz="914400" rtl="0" eaLnBrk="1" fontAlgn="auto" latinLnBrk="0" hangingPunct="1">
+              <a:lnSpc>
+                <a:spcPct val="100000"/>
+              </a:lnSpc>
+              <a:spcBef>
+                <a:spcPts val="0"/>
+              </a:spcBef>
+              <a:spcAft>
+                <a:spcPts val="0"/>
+              </a:spcAft>
+              <a:buClrTx/>
+              <a:buSzTx/>
+              <a:buFontTx/>
+              <a:buChar char="-"/>
+              <a:tabLst/>
+              <a:defRPr/>
+            </a:pPr>
+            <a:endParaRPr lang="en-US" b="0" dirty="0"/>
+          </a:p>
+          <a:p>
+            <a:pPr marL="171450" marR="0" lvl="0" indent="-171450" algn="l" defTabSz="914400" rtl="0" eaLnBrk="1" fontAlgn="auto" latinLnBrk="0" hangingPunct="1">
+              <a:lnSpc>
+                <a:spcPct val="100000"/>
+              </a:lnSpc>
+              <a:spcBef>
+                <a:spcPts val="0"/>
+              </a:spcBef>
+              <a:spcAft>
+                <a:spcPts val="0"/>
+              </a:spcAft>
+              <a:buClrTx/>
+              <a:buSzTx/>
+              <a:buFontTx/>
+              <a:buChar char="-"/>
+              <a:tabLst/>
+              <a:defRPr/>
+            </a:pPr>
+            <a:r>
+              <a:rPr lang="en-US" dirty="0">
+                <a:hlinkClick r:id="rId9"/>
+              </a:rPr>
+              <a:t>https://stackoverflow.com/questions/16691506/what-is-gzip-compression</a:t>
+            </a:r>
+            <a:endParaRPr lang="en-US" dirty="0"/>
+          </a:p>
+          <a:p>
+            <a:pPr marL="171450" marR="0" lvl="0" indent="-171450" algn="l" defTabSz="914400" rtl="0" eaLnBrk="1" fontAlgn="auto" latinLnBrk="0" hangingPunct="1">
+              <a:lnSpc>
+                <a:spcPct val="100000"/>
+              </a:lnSpc>
+              <a:spcBef>
+                <a:spcPts val="0"/>
+              </a:spcBef>
+              <a:spcAft>
+                <a:spcPts val="0"/>
+              </a:spcAft>
+              <a:buClrTx/>
+              <a:buSzTx/>
+              <a:buFontTx/>
+              <a:buChar char="-"/>
+              <a:tabLst/>
+              <a:defRPr/>
+            </a:pPr>
+            <a:r>
+              <a:rPr lang="en-US" dirty="0">
+                <a:hlinkClick r:id="rId10"/>
+              </a:rPr>
+              <a:t>https://www.imperva.com/learn/performance/minification/</a:t>
+            </a:r>
+            <a:endParaRPr lang="en-US" dirty="0"/>
+          </a:p>
+          <a:p>
+            <a:pPr marL="171450" marR="0" lvl="0" indent="-171450" algn="l" defTabSz="914400" rtl="0" eaLnBrk="1" fontAlgn="auto" latinLnBrk="0" hangingPunct="1">
+              <a:lnSpc>
+                <a:spcPct val="100000"/>
+              </a:lnSpc>
+              <a:spcBef>
+                <a:spcPts val="0"/>
+              </a:spcBef>
+              <a:spcAft>
+                <a:spcPts val="0"/>
+              </a:spcAft>
+              <a:buClrTx/>
+              <a:buSzTx/>
+              <a:buFontTx/>
+              <a:buChar char="-"/>
+              <a:tabLst/>
+              <a:defRPr/>
+            </a:pPr>
+            <a:r>
+              <a:rPr lang="en-US" dirty="0">
+                <a:hlinkClick r:id="rId11"/>
+              </a:rPr>
+              <a:t>https://javascript-minifier.com/</a:t>
+            </a:r>
+            <a:endParaRPr lang="en-US" dirty="0"/>
+          </a:p>
+          <a:p>
+            <a:pPr marL="171450" marR="0" lvl="0" indent="-171450" algn="l" defTabSz="914400" rtl="0" eaLnBrk="1" fontAlgn="auto" latinLnBrk="0" hangingPunct="1">
+              <a:lnSpc>
+                <a:spcPct val="100000"/>
+              </a:lnSpc>
+              <a:spcBef>
+                <a:spcPts val="0"/>
+              </a:spcBef>
+              <a:spcAft>
+                <a:spcPts val="0"/>
+              </a:spcAft>
+              <a:buClrTx/>
+              <a:buSzTx/>
+              <a:buFontTx/>
+              <a:buChar char="-"/>
+              <a:tabLst/>
+              <a:defRPr/>
+            </a:pPr>
+            <a:r>
+              <a:rPr lang="en-US" dirty="0">
+                <a:hlinkClick r:id="rId12"/>
+              </a:rPr>
+              <a:t>https://jscompress.com/</a:t>
+            </a:r>
+            <a:endParaRPr lang="en-US" dirty="0"/>
+          </a:p>
+          <a:p>
+            <a:pPr marL="171450" marR="0" lvl="0" indent="-171450" algn="l" defTabSz="914400" rtl="0" eaLnBrk="1" fontAlgn="auto" latinLnBrk="0" hangingPunct="1">
+              <a:lnSpc>
+                <a:spcPct val="100000"/>
+              </a:lnSpc>
+              <a:spcBef>
+                <a:spcPts val="0"/>
+              </a:spcBef>
+              <a:spcAft>
+                <a:spcPts val="0"/>
+              </a:spcAft>
+              <a:buClrTx/>
+              <a:buSzTx/>
+              <a:buFontTx/>
+              <a:buChar char="-"/>
+              <a:tabLst/>
+              <a:defRPr/>
+            </a:pPr>
+            <a:r>
+              <a:rPr lang="en-US" dirty="0">
+                <a:hlinkClick r:id="rId13"/>
+              </a:rPr>
+              <a:t>https://www.debugbear.com/blog/reducing-javascript-bundle-size</a:t>
+            </a:r>
+            <a:endParaRPr lang="en-US" dirty="0"/>
+          </a:p>
+          <a:p>
+            <a:pPr marL="171450" marR="0" lvl="0" indent="-171450" algn="l" defTabSz="914400" rtl="0" eaLnBrk="1" fontAlgn="auto" latinLnBrk="0" hangingPunct="1">
+              <a:lnSpc>
+                <a:spcPct val="100000"/>
+              </a:lnSpc>
+              <a:spcBef>
+                <a:spcPts val="0"/>
+              </a:spcBef>
+              <a:spcAft>
+                <a:spcPts val="0"/>
+              </a:spcAft>
+              <a:buClrTx/>
+              <a:buSzTx/>
+              <a:buFontTx/>
+              <a:buChar char="-"/>
+              <a:tabLst/>
+              <a:defRPr/>
+            </a:pPr>
+            <a:r>
+              <a:rPr lang="en-US" dirty="0">
+                <a:hlinkClick r:id="rId14"/>
+              </a:rPr>
+              <a:t>https://medium.com/oyotech/how-brotli-compression-gave-us-37-latency-improvement-14d41e50fee4</a:t>
+            </a:r>
+            <a:endParaRPr lang="en-US" b="0" dirty="0"/>
+          </a:p>
+        </p:txBody>
+      </p:sp>
+      <p:sp>
+        <p:nvSpPr>
+          <p:cNvPr id="4" name="Slide Number Placeholder 3"/>
+          <p:cNvSpPr>
+            <a:spLocks noGrp="1"/>
+          </p:cNvSpPr>
+          <p:nvPr>
+            <p:ph type="sldNum" sz="quarter" idx="10"/>
+          </p:nvPr>
+        </p:nvSpPr>
+        <p:spPr/>
+        <p:txBody>
+          <a:bodyPr/>
+          <a:lstStyle/>
+          <a:p>
+            <a:fld id="{595D0871-5AD0-4670-BDA8-FBE649F625DD}" type="slidenum">
+              <a:rPr lang="he-IL" smtClean="0"/>
+              <a:t>3</a:t>
+            </a:fld>
+            <a:endParaRPr lang="he-IL"/>
+          </a:p>
+        </p:txBody>
+      </p:sp>
+    </p:spTree>
+    <p:extLst>
+      <p:ext uri="{BB962C8B-B14F-4D97-AF65-F5344CB8AC3E}">
+        <p14:creationId xmlns:p14="http://schemas.microsoft.com/office/powerpoint/2010/main" val="3777271908"/>
+      </p:ext>
+    </p:extLst>
+  </p:cSld>
+  <p:clrMapOvr>
+    <a:masterClrMapping/>
+  </p:clrMapOvr>
+</p:notes>
+</file>
+
+<file path=ppt/notesSlides/notesSlide4.xml><?xml version="1.0" encoding="utf-8"?>
+<p:notes xmlns:a="http://schemas.openxmlformats.org/drawingml/2006/main" xmlns:r="http://schemas.openxmlformats.org/officeDocument/2006/relationships" xmlns:p="http://schemas.openxmlformats.org/presentationml/2006/main">
+  <p:cSld>
+    <p:spTree>
+      <p:nvGrpSpPr>
+        <p:cNvPr id="1" name=""/>
+        <p:cNvGrpSpPr/>
+        <p:nvPr/>
+      </p:nvGrpSpPr>
+      <p:grpSpPr>
+        <a:xfrm>
+          <a:off x="0" y="0"/>
+          <a:ext cx="0" cy="0"/>
+          <a:chOff x="0" y="0"/>
+          <a:chExt cx="0" cy="0"/>
+        </a:xfrm>
+      </p:grpSpPr>
+      <p:sp>
+        <p:nvSpPr>
+          <p:cNvPr id="2" name="Slide Image Placeholder 1"/>
+          <p:cNvSpPr>
+            <a:spLocks noGrp="1" noRot="1" noChangeAspect="1"/>
+          </p:cNvSpPr>
+          <p:nvPr>
+            <p:ph type="sldImg"/>
+          </p:nvPr>
+        </p:nvSpPr>
+        <p:spPr/>
+      </p:sp>
+      <p:sp>
+        <p:nvSpPr>
+          <p:cNvPr id="3" name="Notes Placeholder 2"/>
+          <p:cNvSpPr>
+            <a:spLocks noGrp="1"/>
+          </p:cNvSpPr>
+          <p:nvPr>
+            <p:ph type="body" idx="1"/>
+          </p:nvPr>
+        </p:nvSpPr>
+        <p:spPr/>
+        <p:txBody>
+          <a:bodyPr/>
+          <a:lstStyle/>
+          <a:p>
+            <a:pPr marL="0" marR="0" lvl="0" indent="0" algn="l" defTabSz="914400" rtl="0" eaLnBrk="1" fontAlgn="auto" latinLnBrk="0" hangingPunct="1">
+              <a:lnSpc>
+                <a:spcPct val="100000"/>
+              </a:lnSpc>
+              <a:spcBef>
+                <a:spcPts val="0"/>
+              </a:spcBef>
+              <a:spcAft>
+                <a:spcPts val="0"/>
+              </a:spcAft>
+              <a:buClrTx/>
+              <a:buSzTx/>
+              <a:buFontTx/>
+              <a:buNone/>
+              <a:tabLst/>
+              <a:defRPr/>
+            </a:pPr>
+            <a:r>
+              <a:rPr lang="en-US" b="0" dirty="0"/>
+              <a:t>In modern web app, 2/3 percent is media content, so it will be good to optimize it.</a:t>
+            </a:r>
+          </a:p>
+          <a:p>
+            <a:pPr marL="171450" marR="0" lvl="0" indent="-171450" algn="l" defTabSz="914400" rtl="0" eaLnBrk="1" fontAlgn="auto" latinLnBrk="0" hangingPunct="1">
+              <a:lnSpc>
+                <a:spcPct val="100000"/>
+              </a:lnSpc>
+              <a:spcBef>
+                <a:spcPts val="0"/>
+              </a:spcBef>
+              <a:spcAft>
+                <a:spcPts val="0"/>
+              </a:spcAft>
+              <a:buClrTx/>
+              <a:buSzTx/>
+              <a:buFontTx/>
+              <a:buChar char="-"/>
+              <a:tabLst/>
+              <a:defRPr/>
+            </a:pPr>
+            <a:r>
+              <a:rPr lang="en-US" b="0" dirty="0"/>
+              <a:t>Media Size:</a:t>
+            </a:r>
+          </a:p>
+          <a:p>
+            <a:pPr marL="628650" marR="0" lvl="1" indent="-171450" algn="l" defTabSz="914400" rtl="0" eaLnBrk="1" fontAlgn="auto" latinLnBrk="0" hangingPunct="1">
+              <a:lnSpc>
+                <a:spcPct val="100000"/>
+              </a:lnSpc>
+              <a:spcBef>
+                <a:spcPts val="0"/>
+              </a:spcBef>
+              <a:spcAft>
+                <a:spcPts val="0"/>
+              </a:spcAft>
+              <a:buClrTx/>
+              <a:buSzTx/>
+              <a:buFontTx/>
+              <a:buChar char="-"/>
+              <a:tabLst/>
+              <a:defRPr/>
+            </a:pPr>
+            <a:r>
+              <a:rPr lang="en-US" b="0" dirty="0"/>
+              <a:t>Check for extra-large downloads – first, sort your downloads and see what is the bigger files you are download and think what is the value for this resource, if it worth it.</a:t>
+            </a:r>
+            <a:br>
+              <a:rPr lang="en-US" b="0" dirty="0"/>
+            </a:br>
+            <a:r>
+              <a:rPr lang="en-US" b="0" dirty="0"/>
+              <a:t>For examples, there are some websites which downloads animated gif which is size is 5 times bigger then the whole size and was beyond the fold (</a:t>
+            </a:r>
+            <a:r>
+              <a:rPr lang="en-US" sz="1200" b="0" i="0" kern="1200" dirty="0">
+                <a:solidFill>
+                  <a:schemeClr val="tx1"/>
+                </a:solidFill>
+                <a:effectLst/>
+                <a:latin typeface="+mn-lt"/>
+                <a:ea typeface="+mn-ea"/>
+                <a:cs typeface="+mn-cs"/>
+              </a:rPr>
+              <a:t>The fold is a term used by webmasters and website owners to mean the portion of your site which can be shown when first entering the site without scrolling down at all.</a:t>
+            </a:r>
+            <a:r>
+              <a:rPr lang="en-US" b="0" dirty="0"/>
+              <a:t>),</a:t>
+            </a:r>
+            <a:br>
+              <a:rPr lang="en-US" b="0" dirty="0"/>
+            </a:br>
+            <a:r>
+              <a:rPr lang="en-US" b="0" dirty="0"/>
+              <a:t>or website which is downloading video which is not played in mobile at all but still being downloaded.</a:t>
+            </a:r>
+          </a:p>
+          <a:p>
+            <a:pPr marL="628650" marR="0" lvl="1" indent="-171450" algn="l" defTabSz="914400" rtl="0" eaLnBrk="1" fontAlgn="auto" latinLnBrk="0" hangingPunct="1">
+              <a:lnSpc>
+                <a:spcPct val="100000"/>
+              </a:lnSpc>
+              <a:spcBef>
+                <a:spcPts val="0"/>
+              </a:spcBef>
+              <a:spcAft>
+                <a:spcPts val="0"/>
+              </a:spcAft>
+              <a:buClrTx/>
+              <a:buSzTx/>
+              <a:buFontTx/>
+              <a:buChar char="-"/>
+              <a:tabLst/>
+              <a:defRPr/>
+            </a:pPr>
+            <a:r>
+              <a:rPr lang="en-US" b="0" dirty="0"/>
+              <a:t>Prefer JPG to PNG – JPG is lossy compression so it can be 10 time smaller then PNG and the user will not tell the different, use PNG only if you need transparency.</a:t>
+            </a:r>
+          </a:p>
+          <a:p>
+            <a:pPr marL="628650" marR="0" lvl="1" indent="-171450" algn="l" defTabSz="914400" rtl="0" eaLnBrk="1" fontAlgn="auto" latinLnBrk="0" hangingPunct="1">
+              <a:lnSpc>
+                <a:spcPct val="100000"/>
+              </a:lnSpc>
+              <a:spcBef>
+                <a:spcPts val="0"/>
+              </a:spcBef>
+              <a:spcAft>
+                <a:spcPts val="0"/>
+              </a:spcAft>
+              <a:buClrTx/>
+              <a:buSzTx/>
+              <a:buFontTx/>
+              <a:buChar char="-"/>
+              <a:tabLst/>
+              <a:defRPr/>
+            </a:pPr>
+            <a:r>
+              <a:rPr lang="en-US" b="0" dirty="0"/>
+              <a:t>Convert JPG and PNG to </a:t>
+            </a:r>
+            <a:r>
+              <a:rPr lang="en-US" b="0" dirty="0" err="1"/>
+              <a:t>WebP</a:t>
+            </a:r>
+            <a:r>
+              <a:rPr lang="en-US" b="0" dirty="0"/>
+              <a:t> – it’s the new standard. </a:t>
+            </a:r>
+            <a:r>
+              <a:rPr lang="en-US" sz="1200" b="0" i="0" kern="1200" dirty="0" err="1">
+                <a:solidFill>
+                  <a:schemeClr val="tx1"/>
+                </a:solidFill>
+                <a:effectLst/>
+                <a:latin typeface="+mn-lt"/>
+                <a:ea typeface="+mn-ea"/>
+                <a:cs typeface="+mn-cs"/>
+              </a:rPr>
+              <a:t>WebP</a:t>
+            </a:r>
+            <a:r>
+              <a:rPr lang="en-US" sz="1200" b="0" i="0" kern="1200" dirty="0">
+                <a:solidFill>
+                  <a:schemeClr val="tx1"/>
+                </a:solidFill>
+                <a:effectLst/>
+                <a:latin typeface="+mn-lt"/>
+                <a:ea typeface="+mn-ea"/>
+                <a:cs typeface="+mn-cs"/>
+              </a:rPr>
+              <a:t> is a modern </a:t>
+            </a:r>
+            <a:r>
+              <a:rPr lang="en-US" sz="1200" b="1" i="0" kern="1200" dirty="0">
+                <a:solidFill>
+                  <a:schemeClr val="tx1"/>
+                </a:solidFill>
+                <a:effectLst/>
+                <a:latin typeface="+mn-lt"/>
+                <a:ea typeface="+mn-ea"/>
+                <a:cs typeface="+mn-cs"/>
+              </a:rPr>
+              <a:t>image format</a:t>
+            </a:r>
+            <a:r>
+              <a:rPr lang="en-US" sz="1200" b="0" i="0" kern="1200" dirty="0">
+                <a:solidFill>
+                  <a:schemeClr val="tx1"/>
+                </a:solidFill>
+                <a:effectLst/>
+                <a:latin typeface="+mn-lt"/>
+                <a:ea typeface="+mn-ea"/>
+                <a:cs typeface="+mn-cs"/>
+              </a:rPr>
+              <a:t> that provides superior </a:t>
+            </a:r>
+            <a:r>
+              <a:rPr lang="en-US" sz="1200" b="1" i="0" kern="1200" dirty="0">
+                <a:solidFill>
+                  <a:schemeClr val="tx1"/>
+                </a:solidFill>
+                <a:effectLst/>
+                <a:latin typeface="+mn-lt"/>
+                <a:ea typeface="+mn-ea"/>
+                <a:cs typeface="+mn-cs"/>
+              </a:rPr>
+              <a:t>lossless and lossy</a:t>
+            </a:r>
+            <a:r>
+              <a:rPr lang="en-US" sz="1200" b="0" i="0" kern="1200" dirty="0">
+                <a:solidFill>
+                  <a:schemeClr val="tx1"/>
+                </a:solidFill>
+                <a:effectLst/>
+                <a:latin typeface="+mn-lt"/>
+                <a:ea typeface="+mn-ea"/>
+                <a:cs typeface="+mn-cs"/>
+              </a:rPr>
+              <a:t> compression for images on the web. Using </a:t>
+            </a:r>
+            <a:r>
+              <a:rPr lang="en-US" sz="1200" b="0" i="0" kern="1200" dirty="0" err="1">
+                <a:solidFill>
+                  <a:schemeClr val="tx1"/>
+                </a:solidFill>
+                <a:effectLst/>
+                <a:latin typeface="+mn-lt"/>
+                <a:ea typeface="+mn-ea"/>
+                <a:cs typeface="+mn-cs"/>
+              </a:rPr>
+              <a:t>WebP</a:t>
+            </a:r>
+            <a:r>
+              <a:rPr lang="en-US" sz="1200" b="0" i="0" kern="1200" dirty="0">
+                <a:solidFill>
+                  <a:schemeClr val="tx1"/>
+                </a:solidFill>
+                <a:effectLst/>
+                <a:latin typeface="+mn-lt"/>
+                <a:ea typeface="+mn-ea"/>
+                <a:cs typeface="+mn-cs"/>
+              </a:rPr>
+              <a:t>, webmasters and web developers can create smaller, richer images that make the web faster.</a:t>
+            </a:r>
+          </a:p>
+          <a:p>
+            <a:pPr marL="628650" marR="0" lvl="1" indent="-171450" algn="l" defTabSz="914400" rtl="0" eaLnBrk="1" fontAlgn="auto" latinLnBrk="0" hangingPunct="1">
+              <a:lnSpc>
+                <a:spcPct val="100000"/>
+              </a:lnSpc>
+              <a:spcBef>
+                <a:spcPts val="0"/>
+              </a:spcBef>
+              <a:spcAft>
+                <a:spcPts val="0"/>
+              </a:spcAft>
+              <a:buClrTx/>
+              <a:buSzTx/>
+              <a:buFontTx/>
+              <a:buChar char="-"/>
+              <a:tabLst/>
+              <a:defRPr/>
+            </a:pPr>
+            <a:r>
+              <a:rPr lang="en-US" sz="1200" b="0" i="0" kern="1200" dirty="0">
+                <a:solidFill>
+                  <a:schemeClr val="tx1"/>
+                </a:solidFill>
+                <a:effectLst/>
+                <a:latin typeface="+mn-lt"/>
+                <a:ea typeface="+mn-ea"/>
+                <a:cs typeface="+mn-cs"/>
+              </a:rPr>
+              <a:t>Prefer SVG – SVG is better then everything else, it’s vector so the size will be very small (talk about SVG animation I did in SVG) and it will give us the best quality compering to the other alternatives.</a:t>
+            </a:r>
+            <a:br>
+              <a:rPr lang="en-US" sz="1200" b="0" i="0" kern="1200" dirty="0">
+                <a:solidFill>
+                  <a:schemeClr val="tx1"/>
+                </a:solidFill>
+                <a:effectLst/>
+                <a:latin typeface="+mn-lt"/>
+                <a:ea typeface="+mn-ea"/>
+                <a:cs typeface="+mn-cs"/>
+              </a:rPr>
+            </a:br>
+            <a:r>
+              <a:rPr lang="en-US" sz="1200" b="0" i="0" kern="1200" dirty="0">
+                <a:solidFill>
+                  <a:schemeClr val="tx1"/>
+                </a:solidFill>
+                <a:effectLst/>
+                <a:latin typeface="+mn-lt"/>
+                <a:ea typeface="+mn-ea"/>
+                <a:cs typeface="+mn-cs"/>
+              </a:rPr>
+              <a:t>The best will be embed it to the HTML</a:t>
+            </a:r>
+          </a:p>
+          <a:p>
+            <a:pPr marL="628650" marR="0" lvl="1" indent="-171450" algn="l" defTabSz="914400" rtl="0" eaLnBrk="1" fontAlgn="auto" latinLnBrk="0" hangingPunct="1">
+              <a:lnSpc>
+                <a:spcPct val="100000"/>
+              </a:lnSpc>
+              <a:spcBef>
+                <a:spcPts val="0"/>
+              </a:spcBef>
+              <a:spcAft>
+                <a:spcPts val="0"/>
+              </a:spcAft>
+              <a:buClrTx/>
+              <a:buSzTx/>
+              <a:buFontTx/>
+              <a:buChar char="-"/>
+              <a:tabLst/>
+              <a:defRPr/>
+            </a:pPr>
+            <a:r>
+              <a:rPr lang="en-US" sz="1200" b="0" i="0" kern="1200" dirty="0">
+                <a:solidFill>
+                  <a:schemeClr val="tx1"/>
+                </a:solidFill>
+                <a:effectLst/>
+                <a:latin typeface="+mn-lt"/>
+                <a:ea typeface="+mn-ea"/>
+                <a:cs typeface="+mn-cs"/>
+              </a:rPr>
+              <a:t>Avoid GIF (prefer video) – for images we will prefer </a:t>
+            </a:r>
+            <a:r>
+              <a:rPr lang="en-US" sz="1200" b="0" i="0" kern="1200" dirty="0" err="1">
+                <a:solidFill>
+                  <a:schemeClr val="tx1"/>
+                </a:solidFill>
+                <a:effectLst/>
+                <a:latin typeface="+mn-lt"/>
+                <a:ea typeface="+mn-ea"/>
+                <a:cs typeface="+mn-cs"/>
+              </a:rPr>
+              <a:t>WebP</a:t>
+            </a:r>
+            <a:r>
+              <a:rPr lang="en-US" sz="1200" b="0" i="0" kern="1200" dirty="0">
+                <a:solidFill>
+                  <a:schemeClr val="tx1"/>
+                </a:solidFill>
+                <a:effectLst/>
+                <a:latin typeface="+mn-lt"/>
+                <a:ea typeface="+mn-ea"/>
+                <a:cs typeface="+mn-cs"/>
+              </a:rPr>
+              <a:t> or jpg (2.5 smaller then gif), but when we usually use GIF? For animated images.</a:t>
+            </a:r>
+            <a:br>
+              <a:rPr lang="en-US" sz="1200" b="0" i="0" kern="1200" dirty="0">
+                <a:solidFill>
+                  <a:schemeClr val="tx1"/>
+                </a:solidFill>
+                <a:effectLst/>
+                <a:latin typeface="+mn-lt"/>
+                <a:ea typeface="+mn-ea"/>
+                <a:cs typeface="+mn-cs"/>
+              </a:rPr>
+            </a:br>
+            <a:r>
+              <a:rPr lang="en-US" sz="1200" b="0" i="0" kern="1200" dirty="0">
+                <a:solidFill>
+                  <a:schemeClr val="tx1"/>
+                </a:solidFill>
+                <a:effectLst/>
+                <a:latin typeface="+mn-lt"/>
+                <a:ea typeface="+mn-ea"/>
+                <a:cs typeface="+mn-cs"/>
+              </a:rPr>
+              <a:t>We can replace it by using video mp4 or new standard </a:t>
+            </a:r>
+            <a:r>
+              <a:rPr lang="en-US" sz="1200" b="0" i="0" kern="1200" dirty="0" err="1">
+                <a:solidFill>
+                  <a:schemeClr val="tx1"/>
+                </a:solidFill>
+                <a:effectLst/>
+                <a:latin typeface="+mn-lt"/>
+                <a:ea typeface="+mn-ea"/>
+                <a:cs typeface="+mn-cs"/>
+              </a:rPr>
+              <a:t>WebM</a:t>
+            </a:r>
+            <a:r>
+              <a:rPr lang="en-US" sz="1200" b="0" i="0" kern="1200" dirty="0">
+                <a:solidFill>
+                  <a:schemeClr val="tx1"/>
+                </a:solidFill>
+                <a:effectLst/>
+                <a:latin typeface="+mn-lt"/>
+                <a:ea typeface="+mn-ea"/>
+                <a:cs typeface="+mn-cs"/>
+              </a:rPr>
+              <a:t>.</a:t>
+            </a:r>
+            <a:br>
+              <a:rPr lang="en-US" sz="1200" b="0" i="0" kern="1200" dirty="0">
+                <a:solidFill>
+                  <a:schemeClr val="tx1"/>
+                </a:solidFill>
+                <a:effectLst/>
+                <a:latin typeface="+mn-lt"/>
+                <a:ea typeface="+mn-ea"/>
+                <a:cs typeface="+mn-cs"/>
+              </a:rPr>
+            </a:br>
+            <a:r>
+              <a:rPr lang="en-US" sz="1200" b="0" i="0" kern="1200" dirty="0">
+                <a:solidFill>
+                  <a:schemeClr val="tx1"/>
+                </a:solidFill>
+                <a:effectLst/>
+                <a:latin typeface="+mn-lt"/>
+                <a:ea typeface="+mn-ea"/>
+                <a:cs typeface="+mn-cs"/>
+              </a:rPr>
+              <a:t>The cost savings between a GIF and a video can be pretty significant.</a:t>
+            </a:r>
+            <a:br>
+              <a:rPr lang="en-US" sz="1200" b="0" i="0" kern="1200" dirty="0">
+                <a:solidFill>
+                  <a:schemeClr val="tx1"/>
+                </a:solidFill>
+                <a:effectLst/>
+                <a:latin typeface="+mn-lt"/>
+                <a:ea typeface="+mn-ea"/>
+                <a:cs typeface="+mn-cs"/>
+              </a:rPr>
+            </a:br>
+            <a:r>
+              <a:rPr lang="en-US" sz="1200" b="0" i="0" kern="1200" dirty="0">
+                <a:solidFill>
+                  <a:schemeClr val="tx1"/>
+                </a:solidFill>
+                <a:effectLst/>
+                <a:latin typeface="+mn-lt"/>
+                <a:ea typeface="+mn-ea"/>
+                <a:cs typeface="+mn-cs"/>
+              </a:rPr>
+              <a:t>For example, GIF in size of </a:t>
+            </a:r>
+            <a:r>
+              <a:rPr lang="en-US" sz="1200" b="1" i="0" kern="1200" dirty="0">
+                <a:solidFill>
+                  <a:schemeClr val="tx1"/>
+                </a:solidFill>
+                <a:effectLst/>
+                <a:latin typeface="+mn-lt"/>
+                <a:ea typeface="+mn-ea"/>
+                <a:cs typeface="+mn-cs"/>
+              </a:rPr>
+              <a:t>3.7 MB</a:t>
+            </a:r>
+            <a:r>
+              <a:rPr lang="en-US" sz="1200" b="0" i="0" kern="1200" dirty="0">
+                <a:solidFill>
+                  <a:schemeClr val="tx1"/>
+                </a:solidFill>
+                <a:effectLst/>
+                <a:latin typeface="+mn-lt"/>
+                <a:ea typeface="+mn-ea"/>
+                <a:cs typeface="+mn-cs"/>
+              </a:rPr>
+              <a:t>,</a:t>
+            </a:r>
+            <a:br>
+              <a:rPr lang="en-US" sz="1200" b="0" i="0" kern="1200" dirty="0">
+                <a:solidFill>
+                  <a:schemeClr val="tx1"/>
+                </a:solidFill>
+                <a:effectLst/>
+                <a:latin typeface="+mn-lt"/>
+                <a:ea typeface="+mn-ea"/>
+                <a:cs typeface="+mn-cs"/>
+              </a:rPr>
+            </a:br>
+            <a:r>
+              <a:rPr lang="en-US" sz="1200" b="0" i="0" kern="1200" dirty="0">
+                <a:solidFill>
+                  <a:schemeClr val="tx1"/>
+                </a:solidFill>
+                <a:effectLst/>
+                <a:latin typeface="+mn-lt"/>
+                <a:ea typeface="+mn-ea"/>
+                <a:cs typeface="+mn-cs"/>
+              </a:rPr>
+              <a:t>will be </a:t>
+            </a:r>
+            <a:r>
+              <a:rPr lang="en-US" sz="1200" b="1" i="0" kern="1200" dirty="0">
+                <a:solidFill>
+                  <a:schemeClr val="tx1"/>
+                </a:solidFill>
+                <a:effectLst/>
+                <a:latin typeface="+mn-lt"/>
+                <a:ea typeface="+mn-ea"/>
+                <a:cs typeface="+mn-cs"/>
+              </a:rPr>
+              <a:t>551 KB</a:t>
+            </a:r>
+            <a:r>
+              <a:rPr lang="en-US" sz="1200" b="0" i="0" kern="1200" dirty="0">
+                <a:solidFill>
+                  <a:schemeClr val="tx1"/>
+                </a:solidFill>
+                <a:effectLst/>
+                <a:latin typeface="+mn-lt"/>
+                <a:ea typeface="+mn-ea"/>
+                <a:cs typeface="+mn-cs"/>
+              </a:rPr>
+              <a:t> in MP4 version</a:t>
+            </a:r>
+            <a:br>
+              <a:rPr lang="en-US" sz="1200" b="0" i="0" kern="1200" dirty="0">
+                <a:solidFill>
+                  <a:schemeClr val="tx1"/>
+                </a:solidFill>
+                <a:effectLst/>
+                <a:latin typeface="+mn-lt"/>
+                <a:ea typeface="+mn-ea"/>
+                <a:cs typeface="+mn-cs"/>
+              </a:rPr>
+            </a:br>
+            <a:r>
+              <a:rPr lang="en-US" sz="1200" b="0" i="0" kern="1200" dirty="0">
+                <a:solidFill>
+                  <a:schemeClr val="tx1"/>
+                </a:solidFill>
+                <a:effectLst/>
+                <a:latin typeface="+mn-lt"/>
+                <a:ea typeface="+mn-ea"/>
+                <a:cs typeface="+mn-cs"/>
+              </a:rPr>
+              <a:t>and in </a:t>
+            </a:r>
+            <a:r>
+              <a:rPr lang="en-US" sz="1200" b="0" i="0" kern="1200" dirty="0" err="1">
+                <a:solidFill>
+                  <a:schemeClr val="tx1"/>
+                </a:solidFill>
+                <a:effectLst/>
+                <a:latin typeface="+mn-lt"/>
+                <a:ea typeface="+mn-ea"/>
+                <a:cs typeface="+mn-cs"/>
+              </a:rPr>
+              <a:t>WebM</a:t>
+            </a:r>
+            <a:r>
+              <a:rPr lang="en-US" sz="1200" b="0" i="0" kern="1200" dirty="0">
+                <a:solidFill>
+                  <a:schemeClr val="tx1"/>
+                </a:solidFill>
+                <a:effectLst/>
+                <a:latin typeface="+mn-lt"/>
+                <a:ea typeface="+mn-ea"/>
+                <a:cs typeface="+mn-cs"/>
+              </a:rPr>
+              <a:t> version will be </a:t>
+            </a:r>
+            <a:r>
+              <a:rPr lang="en-US" sz="1200" b="1" i="0" kern="1200" dirty="0">
+                <a:solidFill>
+                  <a:schemeClr val="tx1"/>
+                </a:solidFill>
+                <a:effectLst/>
+                <a:latin typeface="+mn-lt"/>
+                <a:ea typeface="+mn-ea"/>
+                <a:cs typeface="+mn-cs"/>
+              </a:rPr>
+              <a:t>341 KB</a:t>
+            </a:r>
+            <a:r>
+              <a:rPr lang="en-US" sz="1200" b="0" i="0" kern="1200" dirty="0">
+                <a:solidFill>
+                  <a:schemeClr val="tx1"/>
+                </a:solidFill>
+                <a:effectLst/>
+                <a:latin typeface="+mn-lt"/>
+                <a:ea typeface="+mn-ea"/>
+                <a:cs typeface="+mn-cs"/>
+              </a:rPr>
+              <a:t>!</a:t>
+            </a:r>
+            <a:br>
+              <a:rPr lang="en-US" sz="1200" b="0" i="0" kern="1200" dirty="0">
+                <a:solidFill>
+                  <a:schemeClr val="tx1"/>
+                </a:solidFill>
+                <a:effectLst/>
+                <a:latin typeface="+mn-lt"/>
+                <a:ea typeface="+mn-ea"/>
+                <a:cs typeface="+mn-cs"/>
+              </a:rPr>
+            </a:br>
+            <a:r>
+              <a:rPr lang="en-US" sz="1200" b="0" i="0" kern="1200" dirty="0">
+                <a:solidFill>
+                  <a:schemeClr val="tx1"/>
+                </a:solidFill>
+                <a:effectLst/>
+                <a:latin typeface="+mn-lt"/>
+                <a:ea typeface="+mn-ea"/>
+                <a:cs typeface="+mn-cs"/>
+              </a:rPr>
+              <a:t>Animated GIFs have three key traits that a video needs to replicate:</a:t>
+            </a:r>
+          </a:p>
+          <a:p>
+            <a:pPr marL="1085850" marR="0" lvl="2" indent="-171450" algn="l" defTabSz="914400" rtl="0" eaLnBrk="1" fontAlgn="auto" latinLnBrk="0" hangingPunct="1">
+              <a:lnSpc>
+                <a:spcPct val="100000"/>
+              </a:lnSpc>
+              <a:spcBef>
+                <a:spcPts val="0"/>
+              </a:spcBef>
+              <a:spcAft>
+                <a:spcPts val="0"/>
+              </a:spcAft>
+              <a:buClrTx/>
+              <a:buSzTx/>
+              <a:buFontTx/>
+              <a:buChar char="-"/>
+              <a:tabLst/>
+              <a:defRPr/>
+            </a:pPr>
+            <a:r>
+              <a:rPr lang="en-US" sz="1200" b="0" i="0" kern="1200" dirty="0">
+                <a:solidFill>
+                  <a:schemeClr val="tx1"/>
+                </a:solidFill>
+                <a:effectLst/>
+                <a:latin typeface="+mn-lt"/>
+                <a:ea typeface="+mn-ea"/>
+                <a:cs typeface="+mn-cs"/>
+              </a:rPr>
+              <a:t>They play automatically.</a:t>
+            </a:r>
+          </a:p>
+          <a:p>
+            <a:pPr marL="1085850" marR="0" lvl="2" indent="-171450" algn="l" defTabSz="914400" rtl="0" eaLnBrk="1" fontAlgn="auto" latinLnBrk="0" hangingPunct="1">
+              <a:lnSpc>
+                <a:spcPct val="100000"/>
+              </a:lnSpc>
+              <a:spcBef>
+                <a:spcPts val="0"/>
+              </a:spcBef>
+              <a:spcAft>
+                <a:spcPts val="0"/>
+              </a:spcAft>
+              <a:buClrTx/>
+              <a:buSzTx/>
+              <a:buFontTx/>
+              <a:buChar char="-"/>
+              <a:tabLst/>
+              <a:defRPr/>
+            </a:pPr>
+            <a:r>
+              <a:rPr lang="en-US" sz="1200" b="0" i="0" kern="1200" dirty="0">
+                <a:solidFill>
+                  <a:schemeClr val="tx1"/>
+                </a:solidFill>
+                <a:effectLst/>
+                <a:latin typeface="+mn-lt"/>
+                <a:ea typeface="+mn-ea"/>
+                <a:cs typeface="+mn-cs"/>
+              </a:rPr>
+              <a:t>They loop continuously (usually, but it is possible to prevent looping).	</a:t>
+            </a:r>
+          </a:p>
+          <a:p>
+            <a:pPr marL="1085850" marR="0" lvl="2" indent="-171450" algn="l" defTabSz="914400" rtl="0" eaLnBrk="1" fontAlgn="auto" latinLnBrk="0" hangingPunct="1">
+              <a:lnSpc>
+                <a:spcPct val="100000"/>
+              </a:lnSpc>
+              <a:spcBef>
+                <a:spcPts val="0"/>
+              </a:spcBef>
+              <a:spcAft>
+                <a:spcPts val="0"/>
+              </a:spcAft>
+              <a:buClrTx/>
+              <a:buSzTx/>
+              <a:buFontTx/>
+              <a:buChar char="-"/>
+              <a:tabLst/>
+              <a:defRPr/>
+            </a:pPr>
+            <a:r>
+              <a:rPr lang="en-US" sz="1200" b="0" i="0" kern="1200" dirty="0">
+                <a:solidFill>
+                  <a:schemeClr val="tx1"/>
+                </a:solidFill>
+                <a:effectLst/>
+                <a:latin typeface="+mn-lt"/>
+                <a:ea typeface="+mn-ea"/>
+                <a:cs typeface="+mn-cs"/>
+              </a:rPr>
+              <a:t>They're silent.</a:t>
+            </a:r>
+          </a:p>
+          <a:p>
+            <a:pPr marL="457200" marR="0" lvl="1" indent="0" algn="l" defTabSz="914400" rtl="0" eaLnBrk="1" fontAlgn="auto" latinLnBrk="0" hangingPunct="1">
+              <a:lnSpc>
+                <a:spcPct val="100000"/>
+              </a:lnSpc>
+              <a:spcBef>
+                <a:spcPts val="0"/>
+              </a:spcBef>
+              <a:spcAft>
+                <a:spcPts val="0"/>
+              </a:spcAft>
+              <a:buClrTx/>
+              <a:buSzTx/>
+              <a:buFontTx/>
+              <a:buNone/>
+              <a:tabLst/>
+              <a:defRPr/>
+            </a:pPr>
+            <a:r>
+              <a:rPr lang="en-US" sz="1200" b="0" i="0" kern="1200" dirty="0">
+                <a:solidFill>
+                  <a:schemeClr val="tx1"/>
+                </a:solidFill>
+                <a:effectLst/>
+                <a:latin typeface="+mn-lt"/>
+                <a:ea typeface="+mn-ea"/>
+                <a:cs typeface="+mn-cs"/>
+              </a:rPr>
+              <a:t>    We can achieve all of that in videos</a:t>
+            </a:r>
+          </a:p>
+          <a:p>
+            <a:pPr marL="628650" marR="0" lvl="1" indent="-171450" algn="l" defTabSz="914400" rtl="0" eaLnBrk="1" fontAlgn="auto" latinLnBrk="0" hangingPunct="1">
+              <a:lnSpc>
+                <a:spcPct val="100000"/>
+              </a:lnSpc>
+              <a:spcBef>
+                <a:spcPts val="0"/>
+              </a:spcBef>
+              <a:spcAft>
+                <a:spcPts val="0"/>
+              </a:spcAft>
+              <a:buClrTx/>
+              <a:buSzTx/>
+              <a:buFontTx/>
+              <a:buChar char="-"/>
+              <a:tabLst/>
+              <a:defRPr/>
+            </a:pPr>
+            <a:r>
+              <a:rPr lang="en-US" b="0" dirty="0"/>
+              <a:t>Reduce quality, especially for background images – most of the time we can reduce image quality without user notice it spicily for background images</a:t>
+            </a:r>
+          </a:p>
+          <a:p>
+            <a:pPr marL="628650" marR="0" lvl="1" indent="-171450" algn="l" defTabSz="914400" rtl="0" eaLnBrk="1" fontAlgn="auto" latinLnBrk="0" hangingPunct="1">
+              <a:lnSpc>
+                <a:spcPct val="100000"/>
+              </a:lnSpc>
+              <a:spcBef>
+                <a:spcPts val="0"/>
+              </a:spcBef>
+              <a:spcAft>
+                <a:spcPts val="0"/>
+              </a:spcAft>
+              <a:buClrTx/>
+              <a:buSzTx/>
+              <a:buFontTx/>
+              <a:buChar char="-"/>
+              <a:tabLst/>
+              <a:defRPr/>
+            </a:pPr>
+            <a:r>
+              <a:rPr lang="en-US" b="0" dirty="0"/>
+              <a:t>Woff2 - </a:t>
+            </a:r>
+            <a:r>
+              <a:rPr lang="en-US" sz="1200" b="0" i="0" kern="1200" dirty="0">
+                <a:solidFill>
+                  <a:schemeClr val="tx1"/>
+                </a:solidFill>
+                <a:effectLst/>
+                <a:latin typeface="+mn-lt"/>
+                <a:ea typeface="+mn-ea"/>
+                <a:cs typeface="+mn-cs"/>
+              </a:rPr>
+              <a:t>WOFF2 is a font format that provides, on average, a 30% reduction in file size, thus helping Web fonts load more quickly in compatible browsers.</a:t>
+            </a:r>
+            <a:endParaRPr lang="en-US" b="0" dirty="0"/>
+          </a:p>
+          <a:p>
+            <a:pPr marL="171450" marR="0" lvl="0" indent="-171450" algn="l" defTabSz="914400" rtl="0" eaLnBrk="1" fontAlgn="auto" latinLnBrk="0" hangingPunct="1">
+              <a:lnSpc>
+                <a:spcPct val="100000"/>
+              </a:lnSpc>
+              <a:spcBef>
+                <a:spcPts val="0"/>
+              </a:spcBef>
+              <a:spcAft>
+                <a:spcPts val="0"/>
+              </a:spcAft>
+              <a:buClrTx/>
+              <a:buSzTx/>
+              <a:buFontTx/>
+              <a:buChar char="-"/>
+              <a:tabLst/>
+              <a:defRPr/>
+            </a:pPr>
+            <a:endParaRPr lang="en-US" b="0" dirty="0"/>
+          </a:p>
+          <a:p>
+            <a:pPr marL="171450" marR="0" lvl="0" indent="-171450" algn="l" defTabSz="914400" rtl="0" eaLnBrk="1" fontAlgn="auto" latinLnBrk="0" hangingPunct="1">
+              <a:lnSpc>
+                <a:spcPct val="100000"/>
+              </a:lnSpc>
+              <a:spcBef>
+                <a:spcPts val="0"/>
+              </a:spcBef>
+              <a:spcAft>
+                <a:spcPts val="0"/>
+              </a:spcAft>
+              <a:buClrTx/>
+              <a:buSzTx/>
+              <a:buFontTx/>
+              <a:buChar char="-"/>
+              <a:tabLst/>
+              <a:defRPr/>
+            </a:pPr>
+            <a:endParaRPr lang="en-US" b="0" dirty="0"/>
+          </a:p>
+          <a:p>
+            <a:pPr marL="171450" marR="0" lvl="0" indent="-171450" algn="l" defTabSz="914400" rtl="0" eaLnBrk="1" fontAlgn="auto" latinLnBrk="0" hangingPunct="1">
+              <a:lnSpc>
+                <a:spcPct val="100000"/>
+              </a:lnSpc>
+              <a:spcBef>
+                <a:spcPts val="0"/>
+              </a:spcBef>
+              <a:spcAft>
+                <a:spcPts val="0"/>
+              </a:spcAft>
+              <a:buClrTx/>
+              <a:buSzTx/>
+              <a:buFontTx/>
+              <a:buChar char="-"/>
+              <a:tabLst/>
+              <a:defRPr/>
+            </a:pPr>
+            <a:endParaRPr lang="en-US" b="0" dirty="0"/>
+          </a:p>
+          <a:p>
+            <a:pPr marL="171450" marR="0" lvl="0" indent="-171450" algn="l" defTabSz="914400" rtl="0" eaLnBrk="1" fontAlgn="auto" latinLnBrk="0" hangingPunct="1">
+              <a:lnSpc>
+                <a:spcPct val="100000"/>
+              </a:lnSpc>
+              <a:spcBef>
+                <a:spcPts val="0"/>
+              </a:spcBef>
+              <a:spcAft>
+                <a:spcPts val="0"/>
+              </a:spcAft>
+              <a:buClrTx/>
+              <a:buSzTx/>
+              <a:buFontTx/>
+              <a:buChar char="-"/>
+              <a:tabLst/>
+              <a:defRPr/>
+            </a:pPr>
+            <a:endParaRPr lang="en-US" b="0" dirty="0"/>
+          </a:p>
+          <a:p>
+            <a:pPr marL="171450" marR="0" lvl="0" indent="-171450" algn="l" defTabSz="914400" rtl="0" eaLnBrk="1" fontAlgn="auto" latinLnBrk="0" hangingPunct="1">
+              <a:lnSpc>
+                <a:spcPct val="100000"/>
+              </a:lnSpc>
+              <a:spcBef>
+                <a:spcPts val="0"/>
+              </a:spcBef>
+              <a:spcAft>
+                <a:spcPts val="0"/>
+              </a:spcAft>
+              <a:buClrTx/>
+              <a:buSzTx/>
+              <a:buFontTx/>
+              <a:buChar char="-"/>
+              <a:tabLst/>
+              <a:defRPr/>
+            </a:pPr>
+            <a:r>
+              <a:rPr lang="en-US" dirty="0">
+                <a:hlinkClick r:id="rId3"/>
+              </a:rPr>
+              <a:t>https://web.dev/replace-gifs-with-videos</a:t>
+            </a:r>
+            <a:endParaRPr lang="en-US" b="0" dirty="0"/>
+          </a:p>
+          <a:p>
+            <a:pPr marL="171450" marR="0" lvl="0" indent="-171450" algn="l" defTabSz="914400" rtl="0" eaLnBrk="1" fontAlgn="auto" latinLnBrk="0" hangingPunct="1">
+              <a:lnSpc>
+                <a:spcPct val="100000"/>
+              </a:lnSpc>
+              <a:spcBef>
+                <a:spcPts val="0"/>
+              </a:spcBef>
+              <a:spcAft>
+                <a:spcPts val="0"/>
+              </a:spcAft>
+              <a:buClrTx/>
+              <a:buSzTx/>
+              <a:buFontTx/>
+              <a:buChar char="-"/>
+              <a:tabLst/>
+              <a:defRPr/>
+            </a:pPr>
+            <a:endParaRPr lang="en-US" b="0" dirty="0"/>
+          </a:p>
+        </p:txBody>
+      </p:sp>
+      <p:sp>
+        <p:nvSpPr>
+          <p:cNvPr id="4" name="Slide Number Placeholder 3"/>
+          <p:cNvSpPr>
+            <a:spLocks noGrp="1"/>
+          </p:cNvSpPr>
+          <p:nvPr>
+            <p:ph type="sldNum" sz="quarter" idx="10"/>
+          </p:nvPr>
+        </p:nvSpPr>
+        <p:spPr/>
+        <p:txBody>
+          <a:bodyPr/>
+          <a:lstStyle/>
+          <a:p>
+            <a:fld id="{595D0871-5AD0-4670-BDA8-FBE649F625DD}" type="slidenum">
+              <a:rPr lang="he-IL" smtClean="0"/>
+              <a:t>4</a:t>
+            </a:fld>
+            <a:endParaRPr lang="he-IL"/>
+          </a:p>
+        </p:txBody>
+      </p:sp>
+    </p:spTree>
+    <p:extLst>
+      <p:ext uri="{BB962C8B-B14F-4D97-AF65-F5344CB8AC3E}">
+        <p14:creationId xmlns:p14="http://schemas.microsoft.com/office/powerpoint/2010/main" val="3682652353"/>
+      </p:ext>
+    </p:extLst>
+  </p:cSld>
+  <p:clrMapOvr>
+    <a:masterClrMapping/>
+  </p:clrMapOvr>
+</p:notes>
+</file>
+
+<file path=ppt/notesSlides/notesSlide5.xml><?xml version="1.0" encoding="utf-8"?>
+<p:notes xmlns:a="http://schemas.openxmlformats.org/drawingml/2006/main" xmlns:r="http://schemas.openxmlformats.org/officeDocument/2006/relationships" xmlns:p="http://schemas.openxmlformats.org/presentationml/2006/main">
+  <p:cSld>
+    <p:spTree>
+      <p:nvGrpSpPr>
+        <p:cNvPr id="1" name=""/>
+        <p:cNvGrpSpPr/>
+        <p:nvPr/>
+      </p:nvGrpSpPr>
+      <p:grpSpPr>
+        <a:xfrm>
+          <a:off x="0" y="0"/>
+          <a:ext cx="0" cy="0"/>
+          <a:chOff x="0" y="0"/>
+          <a:chExt cx="0" cy="0"/>
+        </a:xfrm>
+      </p:grpSpPr>
+      <p:sp>
+        <p:nvSpPr>
+          <p:cNvPr id="2" name="Slide Image Placeholder 1"/>
+          <p:cNvSpPr>
+            <a:spLocks noGrp="1" noRot="1" noChangeAspect="1"/>
+          </p:cNvSpPr>
+          <p:nvPr>
+            <p:ph type="sldImg"/>
+          </p:nvPr>
+        </p:nvSpPr>
+        <p:spPr/>
+      </p:sp>
+      <p:sp>
+        <p:nvSpPr>
+          <p:cNvPr id="3" name="Notes Placeholder 2"/>
+          <p:cNvSpPr>
+            <a:spLocks noGrp="1"/>
+          </p:cNvSpPr>
+          <p:nvPr>
+            <p:ph type="body" idx="1"/>
+          </p:nvPr>
+        </p:nvSpPr>
+        <p:spPr/>
+        <p:txBody>
+          <a:bodyPr/>
+          <a:lstStyle/>
+          <a:p>
+            <a:pPr algn="l" rtl="0"/>
+            <a:r>
+              <a:rPr lang="en-US" sz="1200" b="0" i="0" kern="1200" dirty="0">
+                <a:solidFill>
+                  <a:schemeClr val="tx1"/>
+                </a:solidFill>
+                <a:effectLst/>
+                <a:latin typeface="+mn-lt"/>
+                <a:ea typeface="+mn-ea"/>
+                <a:cs typeface="+mn-cs"/>
+              </a:rPr>
+              <a:t>Code splitting is a technique where, rather than loading your scripts as one big file, you break it up into smaller parts and only load what’s needed on that page.</a:t>
+            </a:r>
+          </a:p>
+          <a:p>
+            <a:pPr algn="l" rtl="0"/>
+            <a:r>
+              <a:rPr lang="en-US" sz="1200" b="0" i="0" kern="1200" dirty="0">
+                <a:solidFill>
+                  <a:schemeClr val="tx1"/>
+                </a:solidFill>
+                <a:effectLst/>
+                <a:latin typeface="+mn-lt"/>
+                <a:ea typeface="+mn-ea"/>
+                <a:cs typeface="+mn-cs"/>
+              </a:rPr>
+              <a:t>For projects with large amounts of JavaScript, this can have a big improvement on performance.</a:t>
+            </a:r>
+          </a:p>
+          <a:p>
+            <a:pPr marL="0" marR="0" lvl="0" indent="0" algn="l" defTabSz="914400" rtl="0" eaLnBrk="1" fontAlgn="auto" latinLnBrk="0" hangingPunct="1">
+              <a:lnSpc>
+                <a:spcPct val="100000"/>
+              </a:lnSpc>
+              <a:spcBef>
+                <a:spcPts val="0"/>
+              </a:spcBef>
+              <a:spcAft>
+                <a:spcPts val="0"/>
+              </a:spcAft>
+              <a:buClrTx/>
+              <a:buSzTx/>
+              <a:buFontTx/>
+              <a:buNone/>
+              <a:tabLst/>
+              <a:defRPr/>
+            </a:pPr>
+            <a:endParaRPr lang="en-US" b="0" dirty="0"/>
+          </a:p>
+          <a:p>
+            <a:pPr marL="0" marR="0" lvl="0" indent="0" algn="l" defTabSz="914400" rtl="0" eaLnBrk="1" fontAlgn="auto" latinLnBrk="0" hangingPunct="1">
+              <a:lnSpc>
+                <a:spcPct val="100000"/>
+              </a:lnSpc>
+              <a:spcBef>
+                <a:spcPts val="0"/>
+              </a:spcBef>
+              <a:spcAft>
+                <a:spcPts val="0"/>
+              </a:spcAft>
+              <a:buClrTx/>
+              <a:buSzTx/>
+              <a:buFontTx/>
+              <a:buNone/>
+              <a:tabLst/>
+              <a:defRPr/>
+            </a:pPr>
+            <a:r>
+              <a:rPr lang="en-US" b="0" dirty="0"/>
+              <a:t>In react we are doing it by import (we can give the chunk a name by putting a comment)</a:t>
+            </a:r>
+          </a:p>
+          <a:p>
+            <a:pPr marL="0" marR="0" lvl="0" indent="0" algn="l" defTabSz="914400" rtl="0" eaLnBrk="1" fontAlgn="auto" latinLnBrk="0" hangingPunct="1">
+              <a:lnSpc>
+                <a:spcPct val="100000"/>
+              </a:lnSpc>
+              <a:spcBef>
+                <a:spcPts val="0"/>
+              </a:spcBef>
+              <a:spcAft>
+                <a:spcPts val="0"/>
+              </a:spcAft>
+              <a:buClrTx/>
+              <a:buSzTx/>
+              <a:buFontTx/>
+              <a:buNone/>
+              <a:tabLst/>
+              <a:defRPr/>
+            </a:pPr>
+            <a:r>
+              <a:rPr lang="en-US" b="0" dirty="0"/>
+              <a:t>In angular 8 they change the syntax to be align with the industry, in your route, under </a:t>
+            </a:r>
+            <a:r>
+              <a:rPr lang="en-US" b="0" dirty="0" err="1"/>
+              <a:t>loadChildren</a:t>
+            </a:r>
+            <a:r>
+              <a:rPr lang="en-US" b="0" dirty="0"/>
+              <a:t> defined your dynamic import and webpack will do the rest for you.</a:t>
+            </a:r>
+          </a:p>
+          <a:p>
+            <a:pPr marL="171450" marR="0" lvl="0" indent="-171450" algn="l" defTabSz="914400" rtl="0" eaLnBrk="1" fontAlgn="auto" latinLnBrk="0" hangingPunct="1">
+              <a:lnSpc>
+                <a:spcPct val="100000"/>
+              </a:lnSpc>
+              <a:spcBef>
+                <a:spcPts val="0"/>
+              </a:spcBef>
+              <a:spcAft>
+                <a:spcPts val="0"/>
+              </a:spcAft>
+              <a:buClrTx/>
+              <a:buSzTx/>
+              <a:buFontTx/>
+              <a:buChar char="-"/>
+              <a:tabLst/>
+              <a:defRPr/>
+            </a:pPr>
+            <a:endParaRPr lang="en-US" b="0" dirty="0"/>
+          </a:p>
+          <a:p>
+            <a:pPr marL="171450" marR="0" lvl="0" indent="-171450" algn="l" defTabSz="914400" rtl="0" eaLnBrk="1" fontAlgn="auto" latinLnBrk="0" hangingPunct="1">
+              <a:lnSpc>
+                <a:spcPct val="100000"/>
+              </a:lnSpc>
+              <a:spcBef>
+                <a:spcPts val="0"/>
+              </a:spcBef>
+              <a:spcAft>
+                <a:spcPts val="0"/>
+              </a:spcAft>
+              <a:buClrTx/>
+              <a:buSzTx/>
+              <a:buFontTx/>
+              <a:buChar char="-"/>
+              <a:tabLst/>
+              <a:defRPr/>
+            </a:pPr>
+            <a:endParaRPr lang="en-US" b="0" dirty="0"/>
+          </a:p>
+          <a:p>
+            <a:pPr marL="171450" marR="0" lvl="0" indent="-171450" algn="l" defTabSz="914400" rtl="0" eaLnBrk="1" fontAlgn="auto" latinLnBrk="0" hangingPunct="1">
+              <a:lnSpc>
+                <a:spcPct val="100000"/>
+              </a:lnSpc>
+              <a:spcBef>
+                <a:spcPts val="0"/>
+              </a:spcBef>
+              <a:spcAft>
+                <a:spcPts val="0"/>
+              </a:spcAft>
+              <a:buClrTx/>
+              <a:buSzTx/>
+              <a:buFontTx/>
+              <a:buChar char="-"/>
+              <a:tabLst/>
+              <a:defRPr/>
+            </a:pPr>
+            <a:endParaRPr lang="en-US" b="0" dirty="0"/>
+          </a:p>
+          <a:p>
+            <a:pPr marL="171450" marR="0" lvl="0" indent="-171450" algn="l" defTabSz="914400" rtl="0" eaLnBrk="1" fontAlgn="auto" latinLnBrk="0" hangingPunct="1">
+              <a:lnSpc>
+                <a:spcPct val="100000"/>
+              </a:lnSpc>
+              <a:spcBef>
+                <a:spcPts val="0"/>
+              </a:spcBef>
+              <a:spcAft>
+                <a:spcPts val="0"/>
+              </a:spcAft>
+              <a:buClrTx/>
+              <a:buSzTx/>
+              <a:buFontTx/>
+              <a:buChar char="-"/>
+              <a:tabLst/>
+              <a:defRPr/>
+            </a:pPr>
+            <a:endParaRPr lang="en-US" b="0" dirty="0"/>
+          </a:p>
+          <a:p>
+            <a:pPr marL="171450" marR="0" lvl="0" indent="-171450" algn="l" defTabSz="914400" rtl="0" eaLnBrk="1" fontAlgn="auto" latinLnBrk="0" hangingPunct="1">
+              <a:lnSpc>
+                <a:spcPct val="100000"/>
+              </a:lnSpc>
+              <a:spcBef>
+                <a:spcPts val="0"/>
+              </a:spcBef>
+              <a:spcAft>
+                <a:spcPts val="0"/>
+              </a:spcAft>
+              <a:buClrTx/>
+              <a:buSzTx/>
+              <a:buFontTx/>
+              <a:buChar char="-"/>
+              <a:tabLst/>
+              <a:defRPr/>
+            </a:pPr>
+            <a:r>
+              <a:rPr lang="en-US" dirty="0">
+                <a:hlinkClick r:id="rId3"/>
+              </a:rPr>
+              <a:t>https://webpack.js.org/guides/code-splitting/#dynamic-imports</a:t>
+            </a:r>
+            <a:endParaRPr lang="en-US" dirty="0"/>
+          </a:p>
+          <a:p>
+            <a:pPr marL="171450" marR="0" lvl="0" indent="-171450" algn="l" defTabSz="914400" rtl="0" eaLnBrk="1" fontAlgn="auto" latinLnBrk="0" hangingPunct="1">
+              <a:lnSpc>
+                <a:spcPct val="100000"/>
+              </a:lnSpc>
+              <a:spcBef>
+                <a:spcPts val="0"/>
+              </a:spcBef>
+              <a:spcAft>
+                <a:spcPts val="0"/>
+              </a:spcAft>
+              <a:buClrTx/>
+              <a:buSzTx/>
+              <a:buFontTx/>
+              <a:buChar char="-"/>
+              <a:tabLst/>
+              <a:defRPr/>
+            </a:pPr>
+            <a:r>
+              <a:rPr lang="en-US" dirty="0">
+                <a:hlinkClick r:id="rId4"/>
+              </a:rPr>
+              <a:t>https://gomakethings.com/code-splitting-with-vanilla-js/</a:t>
+            </a:r>
+            <a:endParaRPr lang="en-US" b="0" dirty="0"/>
+          </a:p>
+        </p:txBody>
+      </p:sp>
+      <p:sp>
+        <p:nvSpPr>
+          <p:cNvPr id="4" name="Slide Number Placeholder 3"/>
+          <p:cNvSpPr>
+            <a:spLocks noGrp="1"/>
+          </p:cNvSpPr>
+          <p:nvPr>
+            <p:ph type="sldNum" sz="quarter" idx="10"/>
+          </p:nvPr>
+        </p:nvSpPr>
+        <p:spPr/>
+        <p:txBody>
+          <a:bodyPr/>
+          <a:lstStyle/>
+          <a:p>
+            <a:fld id="{595D0871-5AD0-4670-BDA8-FBE649F625DD}" type="slidenum">
+              <a:rPr lang="he-IL" smtClean="0"/>
+              <a:t>5</a:t>
+            </a:fld>
+            <a:endParaRPr lang="he-IL"/>
+          </a:p>
+        </p:txBody>
+      </p:sp>
+    </p:spTree>
+    <p:extLst>
+      <p:ext uri="{BB962C8B-B14F-4D97-AF65-F5344CB8AC3E}">
+        <p14:creationId xmlns:p14="http://schemas.microsoft.com/office/powerpoint/2010/main" val="118983993"/>
+      </p:ext>
+    </p:extLst>
+  </p:cSld>
+  <p:clrMapOvr>
+    <a:masterClrMapping/>
+  </p:clrMapOvr>
+</p:notes>
+</file>
+
+<file path=ppt/notesSlides/notesSlide6.xml><?xml version="1.0" encoding="utf-8"?>
+<p:notes xmlns:a="http://schemas.openxmlformats.org/drawingml/2006/main" xmlns:r="http://schemas.openxmlformats.org/officeDocument/2006/relationships" xmlns:p="http://schemas.openxmlformats.org/presentationml/2006/main">
+  <p:cSld>
+    <p:spTree>
+      <p:nvGrpSpPr>
+        <p:cNvPr id="1" name=""/>
+        <p:cNvGrpSpPr/>
+        <p:nvPr/>
+      </p:nvGrpSpPr>
+      <p:grpSpPr>
+        <a:xfrm>
+          <a:off x="0" y="0"/>
+          <a:ext cx="0" cy="0"/>
+          <a:chOff x="0" y="0"/>
+          <a:chExt cx="0" cy="0"/>
+        </a:xfrm>
+      </p:grpSpPr>
+      <p:sp>
+        <p:nvSpPr>
+          <p:cNvPr id="2" name="Slide Image Placeholder 1"/>
+          <p:cNvSpPr>
+            <a:spLocks noGrp="1" noRot="1" noChangeAspect="1"/>
+          </p:cNvSpPr>
+          <p:nvPr>
+            <p:ph type="sldImg"/>
+          </p:nvPr>
+        </p:nvSpPr>
+        <p:spPr/>
+      </p:sp>
+      <p:sp>
+        <p:nvSpPr>
+          <p:cNvPr id="3" name="Notes Placeholder 2"/>
+          <p:cNvSpPr>
+            <a:spLocks noGrp="1"/>
+          </p:cNvSpPr>
+          <p:nvPr>
+            <p:ph type="body" idx="1"/>
+          </p:nvPr>
+        </p:nvSpPr>
+        <p:spPr/>
+        <p:txBody>
+          <a:bodyPr/>
+          <a:lstStyle/>
+          <a:p>
+            <a:pPr algn="l" rtl="0"/>
+            <a:r>
+              <a:rPr lang="en-US" sz="1200" b="0" i="0" kern="1200" dirty="0">
+                <a:solidFill>
+                  <a:schemeClr val="tx1"/>
+                </a:solidFill>
+                <a:effectLst/>
+                <a:latin typeface="+mn-lt"/>
+                <a:ea typeface="+mn-ea"/>
+                <a:cs typeface="+mn-cs"/>
+              </a:rPr>
+              <a:t>Web pages often contain a large number of images, which contribute to data-usage, </a:t>
+            </a:r>
+            <a:r>
+              <a:rPr lang="en-US" sz="1200" b="0" i="0" u="none" strike="noStrike" kern="1200" dirty="0">
+                <a:solidFill>
+                  <a:schemeClr val="tx1"/>
+                </a:solidFill>
+                <a:effectLst/>
+                <a:latin typeface="+mn-lt"/>
+                <a:ea typeface="+mn-ea"/>
+                <a:cs typeface="+mn-cs"/>
+                <a:hlinkClick r:id="rId3"/>
+              </a:rPr>
+              <a:t>page-bloat</a:t>
+            </a:r>
+            <a:r>
+              <a:rPr lang="en-US" sz="1200" b="0" i="0" kern="1200" dirty="0">
+                <a:solidFill>
+                  <a:schemeClr val="tx1"/>
+                </a:solidFill>
+                <a:effectLst/>
+                <a:latin typeface="+mn-lt"/>
+                <a:ea typeface="+mn-ea"/>
+                <a:cs typeface="+mn-cs"/>
+              </a:rPr>
+              <a:t> and how fast a page can load. Many of these images are offscreen, requiring a user to scroll in order to view them.</a:t>
+            </a:r>
+          </a:p>
+          <a:p>
+            <a:pPr algn="l" rtl="0"/>
+            <a:endParaRPr lang="en-US" sz="1200" b="0" i="0" kern="1200" dirty="0">
+              <a:solidFill>
+                <a:schemeClr val="tx1"/>
+              </a:solidFill>
+              <a:effectLst/>
+              <a:latin typeface="+mn-lt"/>
+              <a:ea typeface="+mn-ea"/>
+              <a:cs typeface="+mn-cs"/>
+            </a:endParaRPr>
+          </a:p>
+          <a:p>
+            <a:pPr algn="l" rtl="0"/>
+            <a:r>
+              <a:rPr lang="en-US" sz="1200" b="0" kern="1200" dirty="0">
+                <a:solidFill>
+                  <a:schemeClr val="tx1"/>
+                </a:solidFill>
+                <a:effectLst/>
+                <a:latin typeface="+mn-lt"/>
+                <a:ea typeface="+mn-ea"/>
+                <a:cs typeface="+mn-cs"/>
+              </a:rPr>
+              <a:t>Why lazy load images or video instead of just </a:t>
+            </a:r>
+            <a:r>
+              <a:rPr lang="en-US" sz="1200" b="0" i="1" kern="1200" dirty="0">
+                <a:solidFill>
+                  <a:schemeClr val="tx1"/>
+                </a:solidFill>
+                <a:effectLst/>
+                <a:latin typeface="+mn-lt"/>
+                <a:ea typeface="+mn-ea"/>
+                <a:cs typeface="+mn-cs"/>
+              </a:rPr>
+              <a:t>loading</a:t>
+            </a:r>
+            <a:r>
+              <a:rPr lang="en-US" sz="1200" b="0" kern="1200" dirty="0">
+                <a:solidFill>
+                  <a:schemeClr val="tx1"/>
+                </a:solidFill>
+                <a:effectLst/>
+                <a:latin typeface="+mn-lt"/>
+                <a:ea typeface="+mn-ea"/>
+                <a:cs typeface="+mn-cs"/>
+              </a:rPr>
+              <a:t> them?</a:t>
+            </a:r>
+          </a:p>
+          <a:p>
+            <a:pPr algn="l" rtl="0"/>
+            <a:r>
+              <a:rPr lang="en-US" sz="1200" b="0" i="0" kern="1200" dirty="0">
+                <a:solidFill>
+                  <a:schemeClr val="tx1"/>
+                </a:solidFill>
+                <a:effectLst/>
+                <a:latin typeface="+mn-lt"/>
+                <a:ea typeface="+mn-ea"/>
+                <a:cs typeface="+mn-cs"/>
+              </a:rPr>
+              <a:t>Because it's possible you're loading stuff the user may never see. This is problematic for a couple reasons:</a:t>
+            </a:r>
+          </a:p>
+          <a:p>
+            <a:pPr marL="171450" indent="-171450" algn="l" rtl="0">
+              <a:buFontTx/>
+              <a:buChar char="-"/>
+            </a:pPr>
+            <a:r>
+              <a:rPr lang="en-US" sz="1200" b="0" i="0" kern="1200" dirty="0">
+                <a:solidFill>
+                  <a:schemeClr val="tx1"/>
+                </a:solidFill>
+                <a:effectLst/>
+                <a:latin typeface="+mn-lt"/>
+                <a:ea typeface="+mn-ea"/>
+                <a:cs typeface="+mn-cs"/>
+              </a:rPr>
+              <a:t>It wastes data. On unmetered connections, this isn't the worst thing that could happen (although you could be using that precious bandwidth for downloading other resources that are indeed going to be seen by the user). On limited data plans, however, loading stuff the user never sees could effectively be a waste of their money.</a:t>
+            </a:r>
+          </a:p>
+          <a:p>
+            <a:pPr marL="171450" indent="-171450" algn="l" rtl="0">
+              <a:buFontTx/>
+              <a:buChar char="-"/>
+            </a:pPr>
+            <a:r>
+              <a:rPr lang="en-US" sz="1200" b="0" i="0" kern="1200" dirty="0">
+                <a:solidFill>
+                  <a:schemeClr val="tx1"/>
+                </a:solidFill>
+                <a:effectLst/>
+                <a:latin typeface="+mn-lt"/>
+                <a:ea typeface="+mn-ea"/>
+                <a:cs typeface="+mn-cs"/>
+              </a:rPr>
+              <a:t>It wastes processing time, battery, and other system resources. After a media resource is downloaded, the browser must decode it and render its content in the viewport.</a:t>
+            </a:r>
+          </a:p>
+          <a:p>
+            <a:pPr algn="l" rtl="0"/>
+            <a:br>
+              <a:rPr lang="en-US" sz="1200" b="0" i="0" kern="1200" dirty="0">
+                <a:solidFill>
+                  <a:schemeClr val="tx1"/>
+                </a:solidFill>
+                <a:effectLst/>
+                <a:latin typeface="+mn-lt"/>
+                <a:ea typeface="+mn-ea"/>
+                <a:cs typeface="+mn-cs"/>
+              </a:rPr>
+            </a:br>
+            <a:r>
+              <a:rPr lang="en-US" sz="1200" b="0" i="0" kern="1200" dirty="0">
+                <a:solidFill>
+                  <a:schemeClr val="tx1"/>
+                </a:solidFill>
+                <a:effectLst/>
+                <a:latin typeface="+mn-lt"/>
+                <a:ea typeface="+mn-ea"/>
+                <a:cs typeface="+mn-cs"/>
+              </a:rPr>
+              <a:t>When we lazy load images and video, we reduce initial page load time, initial page weight, and system resource usage, all of which have positive impacts on performance. In this guide, we'll cover some techniques and offer guidance for lazy loading images and video, as well as </a:t>
+            </a:r>
+            <a:r>
+              <a:rPr lang="en-US" sz="1200" b="0" i="0" u="none" strike="noStrike" kern="1200" dirty="0">
+                <a:solidFill>
+                  <a:schemeClr val="tx1"/>
+                </a:solidFill>
+                <a:effectLst/>
+                <a:latin typeface="+mn-lt"/>
+                <a:ea typeface="+mn-ea"/>
+                <a:cs typeface="+mn-cs"/>
+                <a:hlinkClick r:id="rId4"/>
+              </a:rPr>
+              <a:t>a short list of some commonly used libraries</a:t>
+            </a:r>
+            <a:r>
+              <a:rPr lang="en-US" sz="1200" b="0" i="0" kern="1200" dirty="0">
+                <a:solidFill>
+                  <a:schemeClr val="tx1"/>
+                </a:solidFill>
+                <a:effectLst/>
+                <a:latin typeface="+mn-lt"/>
+                <a:ea typeface="+mn-ea"/>
+                <a:cs typeface="+mn-cs"/>
+              </a:rPr>
+              <a:t>.</a:t>
+            </a:r>
+          </a:p>
+          <a:p>
+            <a:pPr algn="l" rtl="0"/>
+            <a:endParaRPr lang="en-US" sz="1200" b="0" i="0" kern="1200" dirty="0">
+              <a:solidFill>
+                <a:schemeClr val="tx1"/>
+              </a:solidFill>
+              <a:effectLst/>
+              <a:latin typeface="+mn-lt"/>
+              <a:ea typeface="+mn-ea"/>
+              <a:cs typeface="+mn-cs"/>
+            </a:endParaRPr>
+          </a:p>
+          <a:p>
+            <a:pPr algn="l" rtl="0"/>
+            <a:r>
+              <a:rPr lang="en-US" b="0" dirty="0"/>
+              <a:t>[Thus images we don’t want to load at all (or load very low quality) and load them only when they are in user view port.]</a:t>
+            </a:r>
+          </a:p>
+          <a:p>
+            <a:pPr algn="l" rtl="0"/>
+            <a:endParaRPr lang="en-US" b="0" dirty="0"/>
+          </a:p>
+          <a:p>
+            <a:pPr algn="l" rtl="0"/>
+            <a:r>
+              <a:rPr lang="en-US" b="0" dirty="0"/>
+              <a:t>How can we achieve it?</a:t>
+            </a:r>
+          </a:p>
+          <a:p>
+            <a:pPr marL="171450" marR="0" lvl="0" indent="-171450" algn="l" defTabSz="914400" rtl="0" eaLnBrk="1" fontAlgn="auto" latinLnBrk="0" hangingPunct="1">
+              <a:lnSpc>
+                <a:spcPct val="100000"/>
+              </a:lnSpc>
+              <a:spcBef>
+                <a:spcPts val="0"/>
+              </a:spcBef>
+              <a:spcAft>
+                <a:spcPts val="0"/>
+              </a:spcAft>
+              <a:buClrTx/>
+              <a:buSzTx/>
+              <a:buFontTx/>
+              <a:buChar char="-"/>
+              <a:tabLst/>
+              <a:defRPr/>
+            </a:pPr>
+            <a:r>
+              <a:rPr lang="en-US" b="0" dirty="0"/>
+              <a:t>New native </a:t>
+            </a:r>
+            <a:r>
+              <a:rPr lang="en-US" sz="1200" b="0" i="0" kern="1200" dirty="0">
+                <a:solidFill>
+                  <a:schemeClr val="tx1"/>
+                </a:solidFill>
+                <a:effectLst/>
+                <a:latin typeface="+mn-lt"/>
+                <a:ea typeface="+mn-ea"/>
+                <a:cs typeface="+mn-cs"/>
+              </a:rPr>
+              <a:t>loading attribute. We have 3 arguments:</a:t>
+            </a:r>
+            <a:br>
+              <a:rPr lang="en-US" sz="1200" b="0" i="0" kern="1200" dirty="0">
+                <a:solidFill>
+                  <a:schemeClr val="tx1"/>
+                </a:solidFill>
+                <a:effectLst/>
+                <a:latin typeface="+mn-lt"/>
+                <a:ea typeface="+mn-ea"/>
+                <a:cs typeface="+mn-cs"/>
+              </a:rPr>
+            </a:br>
+            <a:r>
+              <a:rPr lang="en-US" sz="1200" b="0" i="0" kern="1200" dirty="0">
+                <a:solidFill>
+                  <a:schemeClr val="tx1"/>
+                </a:solidFill>
+                <a:effectLst/>
+                <a:latin typeface="+mn-lt"/>
+                <a:ea typeface="+mn-ea"/>
+                <a:cs typeface="+mn-cs"/>
+              </a:rPr>
+              <a:t>	lazy: is a good candidate for lazy loading.</a:t>
+            </a:r>
+            <a:br>
+              <a:rPr lang="en-US" sz="1200" b="0" i="0" kern="1200" dirty="0">
+                <a:solidFill>
+                  <a:schemeClr val="tx1"/>
+                </a:solidFill>
+                <a:effectLst/>
+                <a:latin typeface="+mn-lt"/>
+                <a:ea typeface="+mn-ea"/>
+                <a:cs typeface="+mn-cs"/>
+              </a:rPr>
+            </a:br>
+            <a:r>
+              <a:rPr lang="en-US" sz="1200" b="0" i="0" kern="1200" dirty="0">
+                <a:solidFill>
+                  <a:schemeClr val="tx1"/>
+                </a:solidFill>
+                <a:effectLst/>
+                <a:latin typeface="+mn-lt"/>
+                <a:ea typeface="+mn-ea"/>
+                <a:cs typeface="+mn-cs"/>
+              </a:rPr>
+              <a:t>	eager: is not a good candidate for lazy loading. Load right away.</a:t>
+            </a:r>
+            <a:br>
+              <a:rPr lang="en-US" sz="1200" b="0" i="0" kern="1200" dirty="0">
+                <a:solidFill>
+                  <a:schemeClr val="tx1"/>
+                </a:solidFill>
+                <a:effectLst/>
+                <a:latin typeface="+mn-lt"/>
+                <a:ea typeface="+mn-ea"/>
+                <a:cs typeface="+mn-cs"/>
+              </a:rPr>
+            </a:br>
+            <a:r>
+              <a:rPr lang="en-US" sz="1200" b="0" i="0" kern="1200" dirty="0">
+                <a:solidFill>
+                  <a:schemeClr val="tx1"/>
+                </a:solidFill>
+                <a:effectLst/>
+                <a:latin typeface="+mn-lt"/>
+                <a:ea typeface="+mn-ea"/>
+                <a:cs typeface="+mn-cs"/>
+              </a:rPr>
+              <a:t>	auto: browser will determine whether or not to lazily load.</a:t>
+            </a:r>
+          </a:p>
+          <a:p>
+            <a:pPr marL="171450" marR="0" lvl="0" indent="-171450" algn="l" defTabSz="914400" rtl="0" eaLnBrk="1" fontAlgn="auto" latinLnBrk="0" hangingPunct="1">
+              <a:lnSpc>
+                <a:spcPct val="100000"/>
+              </a:lnSpc>
+              <a:spcBef>
+                <a:spcPts val="0"/>
+              </a:spcBef>
+              <a:spcAft>
+                <a:spcPts val="0"/>
+              </a:spcAft>
+              <a:buClrTx/>
+              <a:buSzTx/>
+              <a:buFontTx/>
+              <a:buChar char="-"/>
+              <a:tabLst/>
+              <a:defRPr/>
+            </a:pPr>
+            <a:endParaRPr lang="en-US" b="0" dirty="0"/>
+          </a:p>
+          <a:p>
+            <a:pPr marL="171450" marR="0" lvl="0" indent="-171450" algn="l" defTabSz="914400" rtl="0" eaLnBrk="1" fontAlgn="auto" latinLnBrk="0" hangingPunct="1">
+              <a:lnSpc>
+                <a:spcPct val="100000"/>
+              </a:lnSpc>
+              <a:spcBef>
+                <a:spcPts val="0"/>
+              </a:spcBef>
+              <a:spcAft>
+                <a:spcPts val="0"/>
+              </a:spcAft>
+              <a:buClrTx/>
+              <a:buSzTx/>
+              <a:buFontTx/>
+              <a:buChar char="-"/>
+              <a:tabLst/>
+              <a:defRPr/>
+            </a:pPr>
+            <a:r>
+              <a:rPr lang="en-US" b="0" dirty="0"/>
+              <a:t>Second option is by </a:t>
+            </a:r>
+            <a:r>
+              <a:rPr lang="en-US" sz="1200" b="0" kern="1200" dirty="0">
+                <a:solidFill>
+                  <a:schemeClr val="tx1"/>
+                </a:solidFill>
+                <a:effectLst/>
+                <a:latin typeface="+mn-lt"/>
+                <a:ea typeface="+mn-ea"/>
+                <a:cs typeface="+mn-cs"/>
+              </a:rPr>
+              <a:t>Intersection observer - </a:t>
+            </a:r>
+            <a:r>
+              <a:rPr lang="en-US" sz="1200" b="0" i="0" kern="1200" dirty="0">
+                <a:solidFill>
+                  <a:schemeClr val="tx1"/>
+                </a:solidFill>
+                <a:effectLst/>
+                <a:latin typeface="+mn-lt"/>
+                <a:ea typeface="+mn-ea"/>
+                <a:cs typeface="+mn-cs"/>
+              </a:rPr>
+              <a:t>Intersection observer is easier to use and read than code relying on various event handlers, because developers only need to register an observer to watch elements rather than writing tedious element visibility detection code. All that's left to do for the developer is to decide what to do when an element is visible.</a:t>
+            </a:r>
+            <a:endParaRPr lang="en-US" sz="1200" b="0" kern="1200" dirty="0">
+              <a:solidFill>
+                <a:schemeClr val="tx1"/>
+              </a:solidFill>
+              <a:effectLst/>
+              <a:latin typeface="+mn-lt"/>
+              <a:ea typeface="+mn-ea"/>
+              <a:cs typeface="+mn-cs"/>
+            </a:endParaRPr>
+          </a:p>
+          <a:p>
+            <a:pPr marL="171450" marR="0" lvl="0" indent="-171450" algn="l" defTabSz="914400" rtl="0" eaLnBrk="1" fontAlgn="auto" latinLnBrk="0" hangingPunct="1">
+              <a:lnSpc>
+                <a:spcPct val="100000"/>
+              </a:lnSpc>
+              <a:spcBef>
+                <a:spcPts val="0"/>
+              </a:spcBef>
+              <a:spcAft>
+                <a:spcPts val="0"/>
+              </a:spcAft>
+              <a:buClrTx/>
+              <a:buSzTx/>
+              <a:buFontTx/>
+              <a:buChar char="-"/>
+              <a:tabLst/>
+              <a:defRPr/>
+            </a:pPr>
+            <a:endParaRPr lang="en-US" b="0" dirty="0"/>
+          </a:p>
+          <a:p>
+            <a:pPr marL="171450" marR="0" lvl="0" indent="-171450" algn="l" defTabSz="914400" rtl="0" eaLnBrk="1" fontAlgn="auto" latinLnBrk="0" hangingPunct="1">
+              <a:lnSpc>
+                <a:spcPct val="100000"/>
+              </a:lnSpc>
+              <a:spcBef>
+                <a:spcPts val="0"/>
+              </a:spcBef>
+              <a:spcAft>
+                <a:spcPts val="0"/>
+              </a:spcAft>
+              <a:buClrTx/>
+              <a:buSzTx/>
+              <a:buFontTx/>
+              <a:buChar char="-"/>
+              <a:tabLst/>
+              <a:defRPr/>
+            </a:pPr>
+            <a:endParaRPr lang="en-US" dirty="0"/>
+          </a:p>
+          <a:p>
+            <a:pPr marL="171450" marR="0" lvl="0" indent="-171450" algn="l" defTabSz="914400" rtl="0" eaLnBrk="1" fontAlgn="auto" latinLnBrk="0" hangingPunct="1">
+              <a:lnSpc>
+                <a:spcPct val="100000"/>
+              </a:lnSpc>
+              <a:spcBef>
+                <a:spcPts val="0"/>
+              </a:spcBef>
+              <a:spcAft>
+                <a:spcPts val="0"/>
+              </a:spcAft>
+              <a:buClrTx/>
+              <a:buSzTx/>
+              <a:buFontTx/>
+              <a:buChar char="-"/>
+              <a:tabLst/>
+              <a:defRPr/>
+            </a:pPr>
+            <a:r>
+              <a:rPr lang="en-US" dirty="0">
+                <a:hlinkClick r:id="rId5"/>
+              </a:rPr>
+              <a:t>https://developers.google.com/web/fundamentals/performance/lazy-loading-guidance/images-and-video/</a:t>
+            </a:r>
+            <a:endParaRPr lang="en-US" b="0" dirty="0"/>
+          </a:p>
+          <a:p>
+            <a:pPr marL="171450" marR="0" lvl="0" indent="-171450" algn="l" defTabSz="914400" rtl="0" eaLnBrk="1" fontAlgn="auto" latinLnBrk="0" hangingPunct="1">
+              <a:lnSpc>
+                <a:spcPct val="100000"/>
+              </a:lnSpc>
+              <a:spcBef>
+                <a:spcPts val="0"/>
+              </a:spcBef>
+              <a:spcAft>
+                <a:spcPts val="0"/>
+              </a:spcAft>
+              <a:buClrTx/>
+              <a:buSzTx/>
+              <a:buFontTx/>
+              <a:buChar char="-"/>
+              <a:tabLst/>
+              <a:defRPr/>
+            </a:pPr>
+            <a:r>
+              <a:rPr lang="en-US" dirty="0">
+                <a:hlinkClick r:id="rId6"/>
+              </a:rPr>
+              <a:t>https://addyosmani.com/blog/lazy-loading/</a:t>
+            </a:r>
+            <a:endParaRPr lang="en-US" dirty="0"/>
+          </a:p>
+          <a:p>
+            <a:pPr marL="171450" marR="0" lvl="0" indent="-171450" algn="l" defTabSz="914400" rtl="0" eaLnBrk="1" fontAlgn="auto" latinLnBrk="0" hangingPunct="1">
+              <a:lnSpc>
+                <a:spcPct val="100000"/>
+              </a:lnSpc>
+              <a:spcBef>
+                <a:spcPts val="0"/>
+              </a:spcBef>
+              <a:spcAft>
+                <a:spcPts val="0"/>
+              </a:spcAft>
+              <a:buClrTx/>
+              <a:buSzTx/>
+              <a:buFontTx/>
+              <a:buChar char="-"/>
+              <a:tabLst/>
+              <a:defRPr/>
+            </a:pPr>
+            <a:r>
+              <a:rPr lang="en-US" dirty="0">
+                <a:hlinkClick r:id="rId7"/>
+              </a:rPr>
+              <a:t>https://www.sitepoint.com/five-techniques-lazy-load-images-website-performance/</a:t>
+            </a:r>
+            <a:endParaRPr lang="en-US" dirty="0"/>
+          </a:p>
+          <a:p>
+            <a:pPr marL="171450" marR="0" lvl="0" indent="-171450" algn="l" defTabSz="914400" rtl="0" eaLnBrk="1" fontAlgn="auto" latinLnBrk="0" hangingPunct="1">
+              <a:lnSpc>
+                <a:spcPct val="100000"/>
+              </a:lnSpc>
+              <a:spcBef>
+                <a:spcPts val="0"/>
+              </a:spcBef>
+              <a:spcAft>
+                <a:spcPts val="0"/>
+              </a:spcAft>
+              <a:buClrTx/>
+              <a:buSzTx/>
+              <a:buFontTx/>
+              <a:buChar char="-"/>
+              <a:tabLst/>
+              <a:defRPr/>
+            </a:pPr>
+            <a:r>
+              <a:rPr lang="en-US" dirty="0">
+                <a:hlinkClick r:id="rId8"/>
+              </a:rPr>
+              <a:t>https://html.com/attributes/img-srcset/</a:t>
+            </a:r>
+            <a:endParaRPr lang="en-US" dirty="0"/>
+          </a:p>
+          <a:p>
+            <a:pPr marL="171450" marR="0" lvl="0" indent="-171450" algn="l" defTabSz="914400" rtl="0" eaLnBrk="1" fontAlgn="auto" latinLnBrk="0" hangingPunct="1">
+              <a:lnSpc>
+                <a:spcPct val="100000"/>
+              </a:lnSpc>
+              <a:spcBef>
+                <a:spcPts val="0"/>
+              </a:spcBef>
+              <a:spcAft>
+                <a:spcPts val="0"/>
+              </a:spcAft>
+              <a:buClrTx/>
+              <a:buSzTx/>
+              <a:buFontTx/>
+              <a:buChar char="-"/>
+              <a:tabLst/>
+              <a:defRPr/>
+            </a:pPr>
+            <a:endParaRPr lang="en-US" b="0" dirty="0"/>
+          </a:p>
+        </p:txBody>
+      </p:sp>
+      <p:sp>
+        <p:nvSpPr>
+          <p:cNvPr id="4" name="Slide Number Placeholder 3"/>
+          <p:cNvSpPr>
+            <a:spLocks noGrp="1"/>
+          </p:cNvSpPr>
+          <p:nvPr>
+            <p:ph type="sldNum" sz="quarter" idx="10"/>
+          </p:nvPr>
+        </p:nvSpPr>
+        <p:spPr/>
+        <p:txBody>
+          <a:bodyPr/>
+          <a:lstStyle/>
+          <a:p>
+            <a:fld id="{595D0871-5AD0-4670-BDA8-FBE649F625DD}" type="slidenum">
+              <a:rPr lang="he-IL" smtClean="0"/>
+              <a:t>6</a:t>
+            </a:fld>
+            <a:endParaRPr lang="he-IL"/>
+          </a:p>
+        </p:txBody>
+      </p:sp>
+    </p:spTree>
+    <p:extLst>
+      <p:ext uri="{BB962C8B-B14F-4D97-AF65-F5344CB8AC3E}">
+        <p14:creationId xmlns:p14="http://schemas.microsoft.com/office/powerpoint/2010/main" val="2121580689"/>
+      </p:ext>
+    </p:extLst>
+  </p:cSld>
+  <p:clrMapOvr>
+    <a:masterClrMapping/>
+  </p:clrMapOvr>
+</p:notes>
+</file>
+
+<file path=ppt/notesSlides/notesSlide7.xml><?xml version="1.0" encoding="utf-8"?>
+<p:notes xmlns:a="http://schemas.openxmlformats.org/drawingml/2006/main" xmlns:r="http://schemas.openxmlformats.org/officeDocument/2006/relationships" xmlns:p="http://schemas.openxmlformats.org/presentationml/2006/main">
+  <p:cSld>
+    <p:spTree>
+      <p:nvGrpSpPr>
+        <p:cNvPr id="1" name=""/>
+        <p:cNvGrpSpPr/>
+        <p:nvPr/>
+      </p:nvGrpSpPr>
+      <p:grpSpPr>
+        <a:xfrm>
+          <a:off x="0" y="0"/>
+          <a:ext cx="0" cy="0"/>
+          <a:chOff x="0" y="0"/>
+          <a:chExt cx="0" cy="0"/>
+        </a:xfrm>
+      </p:grpSpPr>
+      <p:sp>
+        <p:nvSpPr>
+          <p:cNvPr id="2" name="Slide Image Placeholder 1"/>
+          <p:cNvSpPr>
+            <a:spLocks noGrp="1" noRot="1" noChangeAspect="1"/>
+          </p:cNvSpPr>
+          <p:nvPr>
+            <p:ph type="sldImg"/>
+          </p:nvPr>
+        </p:nvSpPr>
+        <p:spPr/>
+      </p:sp>
+      <p:sp>
+        <p:nvSpPr>
+          <p:cNvPr id="3" name="Notes Placeholder 2"/>
+          <p:cNvSpPr>
+            <a:spLocks noGrp="1"/>
+          </p:cNvSpPr>
+          <p:nvPr>
+            <p:ph type="body" idx="1"/>
+          </p:nvPr>
+        </p:nvSpPr>
+        <p:spPr/>
+        <p:txBody>
+          <a:bodyPr/>
+          <a:lstStyle/>
+          <a:p>
+            <a:pPr algn="l" rtl="0"/>
+            <a:endParaRPr lang="en-US" sz="1200" b="0" i="0" kern="1200" dirty="0">
+              <a:solidFill>
+                <a:schemeClr val="tx1"/>
+              </a:solidFill>
+              <a:effectLst/>
+              <a:latin typeface="+mn-lt"/>
+              <a:ea typeface="+mn-ea"/>
+              <a:cs typeface="+mn-cs"/>
+            </a:endParaRPr>
+          </a:p>
+          <a:p>
+            <a:pPr algn="l" rtl="0"/>
+            <a:r>
+              <a:rPr lang="en-US" sz="1200" b="0" i="0" kern="1200" dirty="0">
+                <a:solidFill>
+                  <a:schemeClr val="tx1"/>
+                </a:solidFill>
+                <a:effectLst/>
+                <a:latin typeface="+mn-lt"/>
+                <a:ea typeface="+mn-ea"/>
+                <a:cs typeface="+mn-cs"/>
+              </a:rPr>
+              <a:t>If we have a really large CSS file and it takes a while to download, our users will end up waiting until the </a:t>
+            </a:r>
+            <a:r>
+              <a:rPr lang="en-US" sz="1200" b="0" i="1" kern="1200" dirty="0">
+                <a:solidFill>
+                  <a:schemeClr val="tx1"/>
+                </a:solidFill>
+                <a:effectLst/>
+                <a:latin typeface="+mn-lt"/>
+                <a:ea typeface="+mn-ea"/>
+                <a:cs typeface="+mn-cs"/>
+              </a:rPr>
+              <a:t>whole file</a:t>
+            </a:r>
+            <a:r>
+              <a:rPr lang="en-US" sz="1200" b="0" i="0" kern="1200" dirty="0">
+                <a:solidFill>
+                  <a:schemeClr val="tx1"/>
+                </a:solidFill>
+                <a:effectLst/>
+                <a:latin typeface="+mn-lt"/>
+                <a:ea typeface="+mn-ea"/>
+                <a:cs typeface="+mn-cs"/>
+              </a:rPr>
+              <a:t> has been downloaded before the browser can begin rendering the page. Fortunately, there is a sneaky technique that allows us to optimize the delivery of our CSS and mitigate the blocking. This technique is known as optimizing the </a:t>
+            </a:r>
+            <a:r>
+              <a:rPr lang="en-US" sz="1200" b="0" i="0" u="none" strike="noStrike" kern="1200" dirty="0">
+                <a:solidFill>
+                  <a:schemeClr val="tx1"/>
+                </a:solidFill>
+                <a:effectLst/>
+                <a:latin typeface="+mn-lt"/>
+                <a:ea typeface="+mn-ea"/>
+                <a:cs typeface="+mn-cs"/>
+                <a:hlinkClick r:id="rId3"/>
+              </a:rPr>
+              <a:t>critical rendering path.</a:t>
+            </a:r>
+            <a:endParaRPr lang="en-US" sz="1200" b="0" kern="1200" dirty="0">
+              <a:solidFill>
+                <a:schemeClr val="tx1"/>
+              </a:solidFill>
+              <a:effectLst/>
+              <a:latin typeface="+mn-lt"/>
+              <a:ea typeface="+mn-ea"/>
+              <a:cs typeface="+mn-cs"/>
+            </a:endParaRPr>
+          </a:p>
+          <a:p>
+            <a:pPr marL="171450" marR="0" lvl="0" indent="-171450" algn="l" defTabSz="914400" rtl="0" eaLnBrk="1" fontAlgn="auto" latinLnBrk="0" hangingPunct="1">
+              <a:lnSpc>
+                <a:spcPct val="100000"/>
+              </a:lnSpc>
+              <a:spcBef>
+                <a:spcPts val="0"/>
+              </a:spcBef>
+              <a:spcAft>
+                <a:spcPts val="0"/>
+              </a:spcAft>
+              <a:buClrTx/>
+              <a:buSzTx/>
+              <a:buFontTx/>
+              <a:buChar char="-"/>
+              <a:tabLst/>
+              <a:defRPr/>
+            </a:pPr>
+            <a:endParaRPr lang="en-US" b="0" dirty="0"/>
+          </a:p>
+          <a:p>
+            <a:pPr marL="171450" marR="0" lvl="0" indent="-171450" algn="l" defTabSz="914400" rtl="0" eaLnBrk="1" fontAlgn="auto" latinLnBrk="0" hangingPunct="1">
+              <a:lnSpc>
+                <a:spcPct val="100000"/>
+              </a:lnSpc>
+              <a:spcBef>
+                <a:spcPts val="0"/>
+              </a:spcBef>
+              <a:spcAft>
+                <a:spcPts val="0"/>
+              </a:spcAft>
+              <a:buClrTx/>
+              <a:buSzTx/>
+              <a:buFontTx/>
+              <a:buChar char="-"/>
+              <a:tabLst/>
+              <a:defRPr/>
+            </a:pPr>
+            <a:endParaRPr lang="en-US" dirty="0"/>
+          </a:p>
+          <a:p>
+            <a:pPr marL="171450" marR="0" lvl="0" indent="-171450" algn="l" defTabSz="914400" rtl="0" eaLnBrk="1" fontAlgn="auto" latinLnBrk="0" hangingPunct="1">
+              <a:lnSpc>
+                <a:spcPct val="100000"/>
+              </a:lnSpc>
+              <a:spcBef>
+                <a:spcPts val="0"/>
+              </a:spcBef>
+              <a:spcAft>
+                <a:spcPts val="0"/>
+              </a:spcAft>
+              <a:buClrTx/>
+              <a:buSzTx/>
+              <a:buFontTx/>
+              <a:buChar char="-"/>
+              <a:tabLst/>
+              <a:defRPr/>
+            </a:pPr>
+            <a:r>
+              <a:rPr lang="en-US" dirty="0">
+                <a:hlinkClick r:id="rId4"/>
+              </a:rPr>
+              <a:t>https://www.smashingmagazine.com/2015/08/understanding-critical-css/</a:t>
+            </a:r>
+            <a:endParaRPr lang="en-US" dirty="0"/>
+          </a:p>
+          <a:p>
+            <a:pPr marL="171450" marR="0" lvl="0" indent="-171450" algn="l" defTabSz="914400" rtl="0" eaLnBrk="1" fontAlgn="auto" latinLnBrk="0" hangingPunct="1">
+              <a:lnSpc>
+                <a:spcPct val="100000"/>
+              </a:lnSpc>
+              <a:spcBef>
+                <a:spcPts val="0"/>
+              </a:spcBef>
+              <a:spcAft>
+                <a:spcPts val="0"/>
+              </a:spcAft>
+              <a:buClrTx/>
+              <a:buSzTx/>
+              <a:buFontTx/>
+              <a:buChar char="-"/>
+              <a:tabLst/>
+              <a:defRPr/>
+            </a:pPr>
+            <a:r>
+              <a:rPr lang="en-US" dirty="0">
+                <a:hlinkClick r:id="rId5"/>
+              </a:rPr>
+              <a:t>https://github.com/addyosmani/critical-path-css-demo</a:t>
+            </a:r>
+            <a:endParaRPr lang="en-US" dirty="0"/>
+          </a:p>
+          <a:p>
+            <a:pPr marL="171450" marR="0" lvl="0" indent="-171450" algn="l" defTabSz="914400" rtl="0" eaLnBrk="1" fontAlgn="auto" latinLnBrk="0" hangingPunct="1">
+              <a:lnSpc>
+                <a:spcPct val="100000"/>
+              </a:lnSpc>
+              <a:spcBef>
+                <a:spcPts val="0"/>
+              </a:spcBef>
+              <a:spcAft>
+                <a:spcPts val="0"/>
+              </a:spcAft>
+              <a:buClrTx/>
+              <a:buSzTx/>
+              <a:buFontTx/>
+              <a:buChar char="-"/>
+              <a:tabLst/>
+              <a:defRPr/>
+            </a:pPr>
+            <a:endParaRPr lang="en-US" dirty="0"/>
+          </a:p>
+          <a:p>
+            <a:pPr marL="171450" marR="0" lvl="0" indent="-171450" algn="l" defTabSz="914400" rtl="0" eaLnBrk="1" fontAlgn="auto" latinLnBrk="0" hangingPunct="1">
+              <a:lnSpc>
+                <a:spcPct val="100000"/>
+              </a:lnSpc>
+              <a:spcBef>
+                <a:spcPts val="0"/>
+              </a:spcBef>
+              <a:spcAft>
+                <a:spcPts val="0"/>
+              </a:spcAft>
+              <a:buClrTx/>
+              <a:buSzTx/>
+              <a:buFontTx/>
+              <a:buChar char="-"/>
+              <a:tabLst/>
+              <a:defRPr/>
+            </a:pPr>
+            <a:endParaRPr lang="en-US" b="0" dirty="0"/>
+          </a:p>
+        </p:txBody>
+      </p:sp>
+      <p:sp>
+        <p:nvSpPr>
+          <p:cNvPr id="4" name="Slide Number Placeholder 3"/>
+          <p:cNvSpPr>
+            <a:spLocks noGrp="1"/>
+          </p:cNvSpPr>
+          <p:nvPr>
+            <p:ph type="sldNum" sz="quarter" idx="10"/>
+          </p:nvPr>
+        </p:nvSpPr>
+        <p:spPr/>
+        <p:txBody>
+          <a:bodyPr/>
+          <a:lstStyle/>
+          <a:p>
+            <a:fld id="{595D0871-5AD0-4670-BDA8-FBE649F625DD}" type="slidenum">
+              <a:rPr lang="he-IL" smtClean="0"/>
+              <a:t>7</a:t>
+            </a:fld>
+            <a:endParaRPr lang="he-IL"/>
+          </a:p>
+        </p:txBody>
+      </p:sp>
+    </p:spTree>
+    <p:extLst>
+      <p:ext uri="{BB962C8B-B14F-4D97-AF65-F5344CB8AC3E}">
+        <p14:creationId xmlns:p14="http://schemas.microsoft.com/office/powerpoint/2010/main" val="3778175964"/>
+      </p:ext>
+    </p:extLst>
+  </p:cSld>
+  <p:clrMapOvr>
+    <a:masterClrMapping/>
+  </p:clrMapOvr>
+</p:notes>
+</file>
+
+<file path=ppt/notesSlides/notesSlide8.xml><?xml version="1.0" encoding="utf-8"?>
+<p:notes xmlns:a="http://schemas.openxmlformats.org/drawingml/2006/main" xmlns:r="http://schemas.openxmlformats.org/officeDocument/2006/relationships" xmlns:p="http://schemas.openxmlformats.org/presentationml/2006/main">
+  <p:cSld>
+    <p:spTree>
+      <p:nvGrpSpPr>
+        <p:cNvPr id="1" name=""/>
+        <p:cNvGrpSpPr/>
+        <p:nvPr/>
+      </p:nvGrpSpPr>
+      <p:grpSpPr>
+        <a:xfrm>
+          <a:off x="0" y="0"/>
+          <a:ext cx="0" cy="0"/>
+          <a:chOff x="0" y="0"/>
+          <a:chExt cx="0" cy="0"/>
+        </a:xfrm>
+      </p:grpSpPr>
+      <p:sp>
+        <p:nvSpPr>
+          <p:cNvPr id="2" name="Slide Image Placeholder 1"/>
+          <p:cNvSpPr>
+            <a:spLocks noGrp="1" noRot="1" noChangeAspect="1"/>
+          </p:cNvSpPr>
+          <p:nvPr>
+            <p:ph type="sldImg"/>
+          </p:nvPr>
+        </p:nvSpPr>
+        <p:spPr/>
+      </p:sp>
+      <p:sp>
+        <p:nvSpPr>
+          <p:cNvPr id="3" name="Notes Placeholder 2"/>
+          <p:cNvSpPr>
+            <a:spLocks noGrp="1"/>
+          </p:cNvSpPr>
+          <p:nvPr>
+            <p:ph type="body" idx="1"/>
+          </p:nvPr>
+        </p:nvSpPr>
+        <p:spPr/>
+        <p:txBody>
+          <a:bodyPr/>
+          <a:lstStyle/>
+          <a:p>
+            <a:pPr algn="l" rtl="0"/>
+            <a:endParaRPr lang="en-US" sz="1200" b="0" i="0" kern="1200" dirty="0">
+              <a:solidFill>
+                <a:schemeClr val="tx1"/>
+              </a:solidFill>
+              <a:effectLst/>
+              <a:latin typeface="+mn-lt"/>
+              <a:ea typeface="+mn-ea"/>
+              <a:cs typeface="+mn-cs"/>
+            </a:endParaRPr>
+          </a:p>
+          <a:p>
+            <a:pPr algn="l" rtl="0"/>
+            <a:r>
+              <a:rPr lang="en-US" sz="1200" b="0" i="0" kern="1200" dirty="0">
+                <a:solidFill>
+                  <a:schemeClr val="tx1"/>
+                </a:solidFill>
+                <a:effectLst/>
+                <a:latin typeface="+mn-lt"/>
+                <a:ea typeface="+mn-ea"/>
+                <a:cs typeface="+mn-cs"/>
+              </a:rPr>
+              <a:t>If we have a really large CSS file and it takes a while to download, our users will end up waiting until the </a:t>
+            </a:r>
+            <a:r>
+              <a:rPr lang="en-US" sz="1200" b="0" i="1" kern="1200" dirty="0">
+                <a:solidFill>
+                  <a:schemeClr val="tx1"/>
+                </a:solidFill>
+                <a:effectLst/>
+                <a:latin typeface="+mn-lt"/>
+                <a:ea typeface="+mn-ea"/>
+                <a:cs typeface="+mn-cs"/>
+              </a:rPr>
+              <a:t>whole file</a:t>
+            </a:r>
+            <a:r>
+              <a:rPr lang="en-US" sz="1200" b="0" i="0" kern="1200" dirty="0">
+                <a:solidFill>
+                  <a:schemeClr val="tx1"/>
+                </a:solidFill>
+                <a:effectLst/>
+                <a:latin typeface="+mn-lt"/>
+                <a:ea typeface="+mn-ea"/>
+                <a:cs typeface="+mn-cs"/>
+              </a:rPr>
+              <a:t> has been downloaded before the browser can begin rendering the page. Fortunately, there is a sneaky technique that allows us to optimize the delivery of our CSS and mitigate the blocking. This technique is known as optimizing the </a:t>
+            </a:r>
+            <a:r>
+              <a:rPr lang="en-US" sz="1200" b="0" i="0" u="none" strike="noStrike" kern="1200" dirty="0">
+                <a:solidFill>
+                  <a:schemeClr val="tx1"/>
+                </a:solidFill>
+                <a:effectLst/>
+                <a:latin typeface="+mn-lt"/>
+                <a:ea typeface="+mn-ea"/>
+                <a:cs typeface="+mn-cs"/>
+                <a:hlinkClick r:id="rId3"/>
+              </a:rPr>
+              <a:t>critical rendering path.</a:t>
+            </a:r>
+            <a:endParaRPr lang="en-US" sz="1200" b="0" kern="1200" dirty="0">
+              <a:solidFill>
+                <a:schemeClr val="tx1"/>
+              </a:solidFill>
+              <a:effectLst/>
+              <a:latin typeface="+mn-lt"/>
+              <a:ea typeface="+mn-ea"/>
+              <a:cs typeface="+mn-cs"/>
+            </a:endParaRPr>
+          </a:p>
+          <a:p>
+            <a:pPr marL="171450" marR="0" lvl="0" indent="-171450" algn="l" defTabSz="914400" rtl="0" eaLnBrk="1" fontAlgn="auto" latinLnBrk="0" hangingPunct="1">
+              <a:lnSpc>
+                <a:spcPct val="100000"/>
+              </a:lnSpc>
+              <a:spcBef>
+                <a:spcPts val="0"/>
+              </a:spcBef>
+              <a:spcAft>
+                <a:spcPts val="0"/>
+              </a:spcAft>
+              <a:buClrTx/>
+              <a:buSzTx/>
+              <a:buFontTx/>
+              <a:buChar char="-"/>
+              <a:tabLst/>
+              <a:defRPr/>
+            </a:pPr>
+            <a:endParaRPr lang="en-US" b="0" dirty="0"/>
+          </a:p>
+          <a:p>
+            <a:pPr marL="171450" marR="0" lvl="0" indent="-171450" algn="l" defTabSz="914400" rtl="0" eaLnBrk="1" fontAlgn="auto" latinLnBrk="0" hangingPunct="1">
+              <a:lnSpc>
+                <a:spcPct val="100000"/>
+              </a:lnSpc>
+              <a:spcBef>
+                <a:spcPts val="0"/>
+              </a:spcBef>
+              <a:spcAft>
+                <a:spcPts val="0"/>
+              </a:spcAft>
+              <a:buClrTx/>
+              <a:buSzTx/>
+              <a:buFontTx/>
+              <a:buChar char="-"/>
+              <a:tabLst/>
+              <a:defRPr/>
+            </a:pPr>
+            <a:endParaRPr lang="en-US" dirty="0"/>
+          </a:p>
+          <a:p>
+            <a:pPr marL="171450" marR="0" lvl="0" indent="-171450" algn="l" defTabSz="914400" rtl="0" eaLnBrk="1" fontAlgn="auto" latinLnBrk="0" hangingPunct="1">
+              <a:lnSpc>
+                <a:spcPct val="100000"/>
+              </a:lnSpc>
+              <a:spcBef>
+                <a:spcPts val="0"/>
+              </a:spcBef>
+              <a:spcAft>
+                <a:spcPts val="0"/>
+              </a:spcAft>
+              <a:buClrTx/>
+              <a:buSzTx/>
+              <a:buFontTx/>
+              <a:buChar char="-"/>
+              <a:tabLst/>
+              <a:defRPr/>
+            </a:pPr>
+            <a:r>
+              <a:rPr lang="en-US" dirty="0">
+                <a:hlinkClick r:id="rId4"/>
+              </a:rPr>
+              <a:t>https://freecontent.manning.com/tag/http-2-in-action/</a:t>
+            </a:r>
+            <a:endParaRPr lang="en-US" dirty="0"/>
+          </a:p>
+          <a:p>
+            <a:pPr marL="171450" marR="0" lvl="0" indent="-171450" algn="l" defTabSz="914400" rtl="0" eaLnBrk="1" fontAlgn="auto" latinLnBrk="0" hangingPunct="1">
+              <a:lnSpc>
+                <a:spcPct val="100000"/>
+              </a:lnSpc>
+              <a:spcBef>
+                <a:spcPts val="0"/>
+              </a:spcBef>
+              <a:spcAft>
+                <a:spcPts val="0"/>
+              </a:spcAft>
+              <a:buClrTx/>
+              <a:buSzTx/>
+              <a:buFontTx/>
+              <a:buChar char="-"/>
+              <a:tabLst/>
+              <a:defRPr/>
+            </a:pPr>
+            <a:endParaRPr lang="en-US" b="0" dirty="0"/>
+          </a:p>
+        </p:txBody>
+      </p:sp>
+      <p:sp>
+        <p:nvSpPr>
+          <p:cNvPr id="4" name="Slide Number Placeholder 3"/>
+          <p:cNvSpPr>
+            <a:spLocks noGrp="1"/>
+          </p:cNvSpPr>
+          <p:nvPr>
+            <p:ph type="sldNum" sz="quarter" idx="10"/>
+          </p:nvPr>
+        </p:nvSpPr>
+        <p:spPr/>
+        <p:txBody>
+          <a:bodyPr/>
+          <a:lstStyle/>
+          <a:p>
+            <a:fld id="{595D0871-5AD0-4670-BDA8-FBE649F625DD}" type="slidenum">
+              <a:rPr lang="he-IL" smtClean="0"/>
+              <a:t>8</a:t>
+            </a:fld>
+            <a:endParaRPr lang="he-IL"/>
+          </a:p>
+        </p:txBody>
+      </p:sp>
+    </p:spTree>
+    <p:extLst>
+      <p:ext uri="{BB962C8B-B14F-4D97-AF65-F5344CB8AC3E}">
+        <p14:creationId xmlns:p14="http://schemas.microsoft.com/office/powerpoint/2010/main" val="1755384819"/>
       </p:ext>
     </p:extLst>
   </p:cSld>
@@ -820,7 +4495,7 @@
           <a:p>
             <a:fld id="{F472E424-CC75-4448-A1B5-6FCA6BFEE599}" type="datetimeFigureOut">
               <a:rPr lang="he-IL" smtClean="0"/>
-              <a:t>כ"ז/סיון/תשע"ט</a:t>
+              <a:t>י"א/תמוז/תשע"ט</a:t>
             </a:fld>
             <a:endParaRPr lang="he-IL"/>
           </a:p>
@@ -988,7 +4663,7 @@
           <a:p>
             <a:fld id="{F472E424-CC75-4448-A1B5-6FCA6BFEE599}" type="datetimeFigureOut">
               <a:rPr lang="he-IL" smtClean="0"/>
-              <a:t>כ"ז/סיון/תשע"ט</a:t>
+              <a:t>י"א/תמוז/תשע"ט</a:t>
             </a:fld>
             <a:endParaRPr lang="he-IL"/>
           </a:p>
@@ -1166,7 +4841,7 @@
           <a:p>
             <a:fld id="{F472E424-CC75-4448-A1B5-6FCA6BFEE599}" type="datetimeFigureOut">
               <a:rPr lang="he-IL" smtClean="0"/>
-              <a:t>כ"ז/סיון/תשע"ט</a:t>
+              <a:t>י"א/תמוז/תשע"ט</a:t>
             </a:fld>
             <a:endParaRPr lang="he-IL"/>
           </a:p>
@@ -1334,7 +5009,7 @@
           <a:p>
             <a:fld id="{F472E424-CC75-4448-A1B5-6FCA6BFEE599}" type="datetimeFigureOut">
               <a:rPr lang="he-IL" smtClean="0"/>
-              <a:t>כ"ז/סיון/תשע"ט</a:t>
+              <a:t>י"א/תמוז/תשע"ט</a:t>
             </a:fld>
             <a:endParaRPr lang="he-IL"/>
           </a:p>
@@ -1579,7 +5254,7 @@
           <a:p>
             <a:fld id="{F472E424-CC75-4448-A1B5-6FCA6BFEE599}" type="datetimeFigureOut">
               <a:rPr lang="he-IL" smtClean="0"/>
-              <a:t>כ"ז/סיון/תשע"ט</a:t>
+              <a:t>י"א/תמוז/תשע"ט</a:t>
             </a:fld>
             <a:endParaRPr lang="he-IL"/>
           </a:p>
@@ -1808,7 +5483,7 @@
           <a:p>
             <a:fld id="{F472E424-CC75-4448-A1B5-6FCA6BFEE599}" type="datetimeFigureOut">
               <a:rPr lang="he-IL" smtClean="0"/>
-              <a:t>כ"ז/סיון/תשע"ט</a:t>
+              <a:t>י"א/תמוז/תשע"ט</a:t>
             </a:fld>
             <a:endParaRPr lang="he-IL"/>
           </a:p>
@@ -2172,7 +5847,7 @@
           <a:p>
             <a:fld id="{F472E424-CC75-4448-A1B5-6FCA6BFEE599}" type="datetimeFigureOut">
               <a:rPr lang="he-IL" smtClean="0"/>
-              <a:t>כ"ז/סיון/תשע"ט</a:t>
+              <a:t>י"א/תמוז/תשע"ט</a:t>
             </a:fld>
             <a:endParaRPr lang="he-IL"/>
           </a:p>
@@ -2289,7 +5964,7 @@
           <a:p>
             <a:fld id="{F472E424-CC75-4448-A1B5-6FCA6BFEE599}" type="datetimeFigureOut">
               <a:rPr lang="he-IL" smtClean="0"/>
-              <a:t>כ"ז/סיון/תשע"ט</a:t>
+              <a:t>י"א/תמוז/תשע"ט</a:t>
             </a:fld>
             <a:endParaRPr lang="he-IL"/>
           </a:p>
@@ -2384,7 +6059,7 @@
           <a:p>
             <a:fld id="{F472E424-CC75-4448-A1B5-6FCA6BFEE599}" type="datetimeFigureOut">
               <a:rPr lang="he-IL" smtClean="0"/>
-              <a:t>כ"ז/סיון/תשע"ט</a:t>
+              <a:t>י"א/תמוז/תשע"ט</a:t>
             </a:fld>
             <a:endParaRPr lang="he-IL"/>
           </a:p>
@@ -2659,7 +6334,7 @@
           <a:p>
             <a:fld id="{F472E424-CC75-4448-A1B5-6FCA6BFEE599}" type="datetimeFigureOut">
               <a:rPr lang="he-IL" smtClean="0"/>
-              <a:t>כ"ז/סיון/תשע"ט</a:t>
+              <a:t>י"א/תמוז/תשע"ט</a:t>
             </a:fld>
             <a:endParaRPr lang="he-IL"/>
           </a:p>
@@ -2911,7 +6586,7 @@
           <a:p>
             <a:fld id="{F472E424-CC75-4448-A1B5-6FCA6BFEE599}" type="datetimeFigureOut">
               <a:rPr lang="he-IL" smtClean="0"/>
-              <a:t>כ"ז/סיון/תשע"ט</a:t>
+              <a:t>י"א/תמוז/תשע"ט</a:t>
             </a:fld>
             <a:endParaRPr lang="he-IL"/>
           </a:p>
@@ -3122,7 +6797,7 @@
           <a:p>
             <a:fld id="{F472E424-CC75-4448-A1B5-6FCA6BFEE599}" type="datetimeFigureOut">
               <a:rPr lang="he-IL" smtClean="0"/>
-              <a:t>כ"ז/סיון/תשע"ט</a:t>
+              <a:t>י"א/תמוז/תשע"ט</a:t>
             </a:fld>
             <a:endParaRPr lang="he-IL"/>
           </a:p>
@@ -3760,6 +7435,798 @@
     <p:extLst>
       <p:ext uri="{BB962C8B-B14F-4D97-AF65-F5344CB8AC3E}">
         <p14:creationId xmlns:p14="http://schemas.microsoft.com/office/powerpoint/2010/main" val="2260368804"/>
+      </p:ext>
+    </p:extLst>
+  </p:cSld>
+  <p:clrMapOvr>
+    <a:masterClrMapping/>
+  </p:clrMapOvr>
+  <mc:AlternateContent xmlns:mc="http://schemas.openxmlformats.org/markup-compatibility/2006" xmlns:p14="http://schemas.microsoft.com/office/powerpoint/2010/main">
+    <mc:Choice Requires="p14">
+      <p:transition spd="med" p14:dur="700">
+        <p:fade/>
+      </p:transition>
+    </mc:Choice>
+    <mc:Fallback xmlns="">
+      <p:transition xmlns:p14="http://schemas.microsoft.com/office/powerpoint/2010/main" spd="med">
+        <p:fade/>
+      </p:transition>
+    </mc:Fallback>
+  </mc:AlternateContent>
+</p:sld>
+</file>
+
+<file path=ppt/slides/slide3.xml><?xml version="1.0" encoding="utf-8"?>
+<p:sld xmlns:a="http://schemas.openxmlformats.org/drawingml/2006/main" xmlns:r="http://schemas.openxmlformats.org/officeDocument/2006/relationships" xmlns:p="http://schemas.openxmlformats.org/presentationml/2006/main">
+  <p:cSld>
+    <p:spTree>
+      <p:nvGrpSpPr>
+        <p:cNvPr id="1" name=""/>
+        <p:cNvGrpSpPr/>
+        <p:nvPr/>
+      </p:nvGrpSpPr>
+      <p:grpSpPr>
+        <a:xfrm>
+          <a:off x="0" y="0"/>
+          <a:ext cx="0" cy="0"/>
+          <a:chOff x="0" y="0"/>
+          <a:chExt cx="0" cy="0"/>
+        </a:xfrm>
+      </p:grpSpPr>
+      <p:sp>
+        <p:nvSpPr>
+          <p:cNvPr id="6" name="Rectangle 5"/>
+          <p:cNvSpPr/>
+          <p:nvPr/>
+        </p:nvSpPr>
+        <p:spPr>
+          <a:xfrm>
+            <a:off x="-215115" y="0"/>
+            <a:ext cx="12407115" cy="6858000"/>
+          </a:xfrm>
+          <a:prstGeom prst="rect">
+            <a:avLst/>
+          </a:prstGeom>
+          <a:solidFill>
+            <a:schemeClr val="accent1">
+              <a:lumMod val="75000"/>
+            </a:schemeClr>
+          </a:solidFill>
+          <a:ln>
+            <a:noFill/>
+          </a:ln>
+        </p:spPr>
+        <p:style>
+          <a:lnRef idx="1">
+            <a:schemeClr val="accent1"/>
+          </a:lnRef>
+          <a:fillRef idx="3">
+            <a:schemeClr val="accent1"/>
+          </a:fillRef>
+          <a:effectRef idx="2">
+            <a:schemeClr val="accent1"/>
+          </a:effectRef>
+          <a:fontRef idx="minor">
+            <a:schemeClr val="lt1"/>
+          </a:fontRef>
+        </p:style>
+        <p:txBody>
+          <a:bodyPr rtlCol="0" anchor="ctr"/>
+          <a:lstStyle/>
+          <a:p>
+            <a:pPr algn="ctr"/>
+            <a:endParaRPr lang="en-US" sz="2400"/>
+          </a:p>
+        </p:txBody>
+      </p:sp>
+      <p:sp>
+        <p:nvSpPr>
+          <p:cNvPr id="24" name="Title 1"/>
+          <p:cNvSpPr>
+            <a:spLocks noGrp="1"/>
+          </p:cNvSpPr>
+          <p:nvPr>
+            <p:ph type="title"/>
+          </p:nvPr>
+        </p:nvSpPr>
+        <p:spPr>
+          <a:xfrm>
+            <a:off x="502042" y="1936377"/>
+            <a:ext cx="10972800" cy="2985246"/>
+          </a:xfrm>
+        </p:spPr>
+        <p:txBody>
+          <a:bodyPr>
+            <a:noAutofit/>
+          </a:bodyPr>
+          <a:lstStyle/>
+          <a:p>
+            <a:pPr algn="ctr" rtl="0" eaLnBrk="0" fontAlgn="base" hangingPunct="0">
+              <a:spcAft>
+                <a:spcPct val="0"/>
+              </a:spcAft>
+            </a:pPr>
+            <a:r>
+              <a:rPr lang="en-US" sz="6000" dirty="0">
+                <a:solidFill>
+                  <a:schemeClr val="bg1"/>
+                </a:solidFill>
+              </a:rPr>
+              <a:t>Decrease payload</a:t>
+            </a:r>
+            <a:endParaRPr lang="en-US" altLang="en-US" sz="6000" b="1" dirty="0">
+              <a:solidFill>
+                <a:schemeClr val="bg1"/>
+              </a:solidFill>
+              <a:latin typeface="Calibri (Body)"/>
+            </a:endParaRPr>
+          </a:p>
+        </p:txBody>
+      </p:sp>
+    </p:spTree>
+    <p:extLst>
+      <p:ext uri="{BB962C8B-B14F-4D97-AF65-F5344CB8AC3E}">
+        <p14:creationId xmlns:p14="http://schemas.microsoft.com/office/powerpoint/2010/main" val="2525637651"/>
+      </p:ext>
+    </p:extLst>
+  </p:cSld>
+  <p:clrMapOvr>
+    <a:masterClrMapping/>
+  </p:clrMapOvr>
+  <mc:AlternateContent xmlns:mc="http://schemas.openxmlformats.org/markup-compatibility/2006" xmlns:p14="http://schemas.microsoft.com/office/powerpoint/2010/main">
+    <mc:Choice Requires="p14">
+      <p:transition spd="med" p14:dur="700">
+        <p:fade/>
+      </p:transition>
+    </mc:Choice>
+    <mc:Fallback xmlns="">
+      <p:transition xmlns:p14="http://schemas.microsoft.com/office/powerpoint/2010/main" spd="med">
+        <p:fade/>
+      </p:transition>
+    </mc:Fallback>
+  </mc:AlternateContent>
+</p:sld>
+</file>
+
+<file path=ppt/slides/slide4.xml><?xml version="1.0" encoding="utf-8"?>
+<p:sld xmlns:a="http://schemas.openxmlformats.org/drawingml/2006/main" xmlns:r="http://schemas.openxmlformats.org/officeDocument/2006/relationships" xmlns:p="http://schemas.openxmlformats.org/presentationml/2006/main">
+  <p:cSld>
+    <p:spTree>
+      <p:nvGrpSpPr>
+        <p:cNvPr id="1" name=""/>
+        <p:cNvGrpSpPr/>
+        <p:nvPr/>
+      </p:nvGrpSpPr>
+      <p:grpSpPr>
+        <a:xfrm>
+          <a:off x="0" y="0"/>
+          <a:ext cx="0" cy="0"/>
+          <a:chOff x="0" y="0"/>
+          <a:chExt cx="0" cy="0"/>
+        </a:xfrm>
+      </p:grpSpPr>
+      <p:sp>
+        <p:nvSpPr>
+          <p:cNvPr id="6" name="Rectangle 5"/>
+          <p:cNvSpPr/>
+          <p:nvPr/>
+        </p:nvSpPr>
+        <p:spPr>
+          <a:xfrm>
+            <a:off x="-215115" y="0"/>
+            <a:ext cx="12407115" cy="6858000"/>
+          </a:xfrm>
+          <a:prstGeom prst="rect">
+            <a:avLst/>
+          </a:prstGeom>
+          <a:solidFill>
+            <a:schemeClr val="accent1">
+              <a:lumMod val="75000"/>
+            </a:schemeClr>
+          </a:solidFill>
+          <a:ln>
+            <a:noFill/>
+          </a:ln>
+        </p:spPr>
+        <p:style>
+          <a:lnRef idx="1">
+            <a:schemeClr val="accent1"/>
+          </a:lnRef>
+          <a:fillRef idx="3">
+            <a:schemeClr val="accent1"/>
+          </a:fillRef>
+          <a:effectRef idx="2">
+            <a:schemeClr val="accent1"/>
+          </a:effectRef>
+          <a:fontRef idx="minor">
+            <a:schemeClr val="lt1"/>
+          </a:fontRef>
+        </p:style>
+        <p:txBody>
+          <a:bodyPr rtlCol="0" anchor="ctr"/>
+          <a:lstStyle/>
+          <a:p>
+            <a:pPr algn="ctr"/>
+            <a:endParaRPr lang="en-US" sz="2400"/>
+          </a:p>
+        </p:txBody>
+      </p:sp>
+      <p:sp>
+        <p:nvSpPr>
+          <p:cNvPr id="24" name="Title 1"/>
+          <p:cNvSpPr>
+            <a:spLocks noGrp="1"/>
+          </p:cNvSpPr>
+          <p:nvPr>
+            <p:ph type="title"/>
+          </p:nvPr>
+        </p:nvSpPr>
+        <p:spPr>
+          <a:xfrm>
+            <a:off x="502042" y="1936377"/>
+            <a:ext cx="10972800" cy="2985246"/>
+          </a:xfrm>
+        </p:spPr>
+        <p:txBody>
+          <a:bodyPr>
+            <a:noAutofit/>
+          </a:bodyPr>
+          <a:lstStyle/>
+          <a:p>
+            <a:pPr algn="ctr" rtl="0" eaLnBrk="0" fontAlgn="base" hangingPunct="0">
+              <a:spcAft>
+                <a:spcPct val="0"/>
+              </a:spcAft>
+            </a:pPr>
+            <a:r>
+              <a:rPr lang="en-US" sz="6000" dirty="0">
+                <a:solidFill>
+                  <a:schemeClr val="bg1"/>
+                </a:solidFill>
+              </a:rPr>
+              <a:t>Decrease payload</a:t>
+            </a:r>
+            <a:endParaRPr lang="en-US" altLang="en-US" sz="6000" b="1" dirty="0">
+              <a:solidFill>
+                <a:schemeClr val="bg1"/>
+              </a:solidFill>
+              <a:latin typeface="Calibri (Body)"/>
+            </a:endParaRPr>
+          </a:p>
+        </p:txBody>
+      </p:sp>
+    </p:spTree>
+    <p:extLst>
+      <p:ext uri="{BB962C8B-B14F-4D97-AF65-F5344CB8AC3E}">
+        <p14:creationId xmlns:p14="http://schemas.microsoft.com/office/powerpoint/2010/main" val="4204715039"/>
+      </p:ext>
+    </p:extLst>
+  </p:cSld>
+  <p:clrMapOvr>
+    <a:masterClrMapping/>
+  </p:clrMapOvr>
+  <mc:AlternateContent xmlns:mc="http://schemas.openxmlformats.org/markup-compatibility/2006" xmlns:p14="http://schemas.microsoft.com/office/powerpoint/2010/main">
+    <mc:Choice Requires="p14">
+      <p:transition spd="med" p14:dur="700">
+        <p:fade/>
+      </p:transition>
+    </mc:Choice>
+    <mc:Fallback xmlns="">
+      <p:transition xmlns:p14="http://schemas.microsoft.com/office/powerpoint/2010/main" spd="med">
+        <p:fade/>
+      </p:transition>
+    </mc:Fallback>
+  </mc:AlternateContent>
+</p:sld>
+</file>
+
+<file path=ppt/slides/slide5.xml><?xml version="1.0" encoding="utf-8"?>
+<p:sld xmlns:a="http://schemas.openxmlformats.org/drawingml/2006/main" xmlns:r="http://schemas.openxmlformats.org/officeDocument/2006/relationships" xmlns:p="http://schemas.openxmlformats.org/presentationml/2006/main">
+  <p:cSld>
+    <p:spTree>
+      <p:nvGrpSpPr>
+        <p:cNvPr id="1" name=""/>
+        <p:cNvGrpSpPr/>
+        <p:nvPr/>
+      </p:nvGrpSpPr>
+      <p:grpSpPr>
+        <a:xfrm>
+          <a:off x="0" y="0"/>
+          <a:ext cx="0" cy="0"/>
+          <a:chOff x="0" y="0"/>
+          <a:chExt cx="0" cy="0"/>
+        </a:xfrm>
+      </p:grpSpPr>
+      <p:sp>
+        <p:nvSpPr>
+          <p:cNvPr id="6" name="Rectangle 5"/>
+          <p:cNvSpPr/>
+          <p:nvPr/>
+        </p:nvSpPr>
+        <p:spPr>
+          <a:xfrm>
+            <a:off x="-215115" y="0"/>
+            <a:ext cx="12407115" cy="6858000"/>
+          </a:xfrm>
+          <a:prstGeom prst="rect">
+            <a:avLst/>
+          </a:prstGeom>
+          <a:solidFill>
+            <a:schemeClr val="accent1">
+              <a:lumMod val="75000"/>
+            </a:schemeClr>
+          </a:solidFill>
+          <a:ln>
+            <a:noFill/>
+          </a:ln>
+        </p:spPr>
+        <p:style>
+          <a:lnRef idx="1">
+            <a:schemeClr val="accent1"/>
+          </a:lnRef>
+          <a:fillRef idx="3">
+            <a:schemeClr val="accent1"/>
+          </a:fillRef>
+          <a:effectRef idx="2">
+            <a:schemeClr val="accent1"/>
+          </a:effectRef>
+          <a:fontRef idx="minor">
+            <a:schemeClr val="lt1"/>
+          </a:fontRef>
+        </p:style>
+        <p:txBody>
+          <a:bodyPr rtlCol="0" anchor="ctr"/>
+          <a:lstStyle/>
+          <a:p>
+            <a:pPr algn="ctr"/>
+            <a:endParaRPr lang="en-US" sz="2400"/>
+          </a:p>
+        </p:txBody>
+      </p:sp>
+      <p:sp>
+        <p:nvSpPr>
+          <p:cNvPr id="24" name="Title 1"/>
+          <p:cNvSpPr>
+            <a:spLocks noGrp="1"/>
+          </p:cNvSpPr>
+          <p:nvPr>
+            <p:ph type="title"/>
+          </p:nvPr>
+        </p:nvSpPr>
+        <p:spPr>
+          <a:xfrm>
+            <a:off x="502042" y="1936377"/>
+            <a:ext cx="10972800" cy="2985246"/>
+          </a:xfrm>
+        </p:spPr>
+        <p:txBody>
+          <a:bodyPr>
+            <a:noAutofit/>
+          </a:bodyPr>
+          <a:lstStyle/>
+          <a:p>
+            <a:pPr algn="ctr" rtl="0" eaLnBrk="0" fontAlgn="base" hangingPunct="0">
+              <a:spcAft>
+                <a:spcPct val="0"/>
+              </a:spcAft>
+            </a:pPr>
+            <a:r>
+              <a:rPr lang="en-US" sz="6000" dirty="0">
+                <a:solidFill>
+                  <a:schemeClr val="bg1"/>
+                </a:solidFill>
+              </a:rPr>
+              <a:t>Code Splitting</a:t>
+            </a:r>
+            <a:endParaRPr lang="en-US" altLang="en-US" sz="6000" b="1" dirty="0">
+              <a:solidFill>
+                <a:schemeClr val="bg1"/>
+              </a:solidFill>
+              <a:latin typeface="Calibri (Body)"/>
+            </a:endParaRPr>
+          </a:p>
+        </p:txBody>
+      </p:sp>
+    </p:spTree>
+    <p:extLst>
+      <p:ext uri="{BB962C8B-B14F-4D97-AF65-F5344CB8AC3E}">
+        <p14:creationId xmlns:p14="http://schemas.microsoft.com/office/powerpoint/2010/main" val="2103383662"/>
+      </p:ext>
+    </p:extLst>
+  </p:cSld>
+  <p:clrMapOvr>
+    <a:masterClrMapping/>
+  </p:clrMapOvr>
+  <mc:AlternateContent xmlns:mc="http://schemas.openxmlformats.org/markup-compatibility/2006" xmlns:p14="http://schemas.microsoft.com/office/powerpoint/2010/main">
+    <mc:Choice Requires="p14">
+      <p:transition spd="med" p14:dur="700">
+        <p:fade/>
+      </p:transition>
+    </mc:Choice>
+    <mc:Fallback xmlns="">
+      <p:transition xmlns:p14="http://schemas.microsoft.com/office/powerpoint/2010/main" spd="med">
+        <p:fade/>
+      </p:transition>
+    </mc:Fallback>
+  </mc:AlternateContent>
+</p:sld>
+</file>
+
+<file path=ppt/slides/slide6.xml><?xml version="1.0" encoding="utf-8"?>
+<p:sld xmlns:a="http://schemas.openxmlformats.org/drawingml/2006/main" xmlns:r="http://schemas.openxmlformats.org/officeDocument/2006/relationships" xmlns:p="http://schemas.openxmlformats.org/presentationml/2006/main">
+  <p:cSld>
+    <p:spTree>
+      <p:nvGrpSpPr>
+        <p:cNvPr id="1" name=""/>
+        <p:cNvGrpSpPr/>
+        <p:nvPr/>
+      </p:nvGrpSpPr>
+      <p:grpSpPr>
+        <a:xfrm>
+          <a:off x="0" y="0"/>
+          <a:ext cx="0" cy="0"/>
+          <a:chOff x="0" y="0"/>
+          <a:chExt cx="0" cy="0"/>
+        </a:xfrm>
+      </p:grpSpPr>
+      <p:sp>
+        <p:nvSpPr>
+          <p:cNvPr id="6" name="Rectangle 5"/>
+          <p:cNvSpPr/>
+          <p:nvPr/>
+        </p:nvSpPr>
+        <p:spPr>
+          <a:xfrm>
+            <a:off x="-215115" y="0"/>
+            <a:ext cx="12407115" cy="6858000"/>
+          </a:xfrm>
+          <a:prstGeom prst="rect">
+            <a:avLst/>
+          </a:prstGeom>
+          <a:solidFill>
+            <a:schemeClr val="accent1">
+              <a:lumMod val="75000"/>
+            </a:schemeClr>
+          </a:solidFill>
+          <a:ln>
+            <a:noFill/>
+          </a:ln>
+        </p:spPr>
+        <p:style>
+          <a:lnRef idx="1">
+            <a:schemeClr val="accent1"/>
+          </a:lnRef>
+          <a:fillRef idx="3">
+            <a:schemeClr val="accent1"/>
+          </a:fillRef>
+          <a:effectRef idx="2">
+            <a:schemeClr val="accent1"/>
+          </a:effectRef>
+          <a:fontRef idx="minor">
+            <a:schemeClr val="lt1"/>
+          </a:fontRef>
+        </p:style>
+        <p:txBody>
+          <a:bodyPr rtlCol="0" anchor="ctr"/>
+          <a:lstStyle/>
+          <a:p>
+            <a:pPr algn="ctr"/>
+            <a:endParaRPr lang="en-US" sz="2400"/>
+          </a:p>
+        </p:txBody>
+      </p:sp>
+      <p:sp>
+        <p:nvSpPr>
+          <p:cNvPr id="24" name="Title 1"/>
+          <p:cNvSpPr>
+            <a:spLocks noGrp="1"/>
+          </p:cNvSpPr>
+          <p:nvPr>
+            <p:ph type="title"/>
+          </p:nvPr>
+        </p:nvSpPr>
+        <p:spPr>
+          <a:xfrm>
+            <a:off x="502042" y="1936377"/>
+            <a:ext cx="10972800" cy="2985246"/>
+          </a:xfrm>
+        </p:spPr>
+        <p:txBody>
+          <a:bodyPr>
+            <a:noAutofit/>
+          </a:bodyPr>
+          <a:lstStyle/>
+          <a:p>
+            <a:pPr algn="ctr" rtl="0" eaLnBrk="0" fontAlgn="base" hangingPunct="0">
+              <a:spcAft>
+                <a:spcPct val="0"/>
+              </a:spcAft>
+            </a:pPr>
+            <a:r>
+              <a:rPr lang="en-US" sz="6000" dirty="0">
+                <a:solidFill>
+                  <a:schemeClr val="bg1"/>
+                </a:solidFill>
+              </a:rPr>
+              <a:t>Offscreen images</a:t>
+            </a:r>
+            <a:endParaRPr lang="en-US" altLang="en-US" sz="6000" b="1" dirty="0">
+              <a:solidFill>
+                <a:schemeClr val="bg1"/>
+              </a:solidFill>
+              <a:latin typeface="Calibri (Body)"/>
+            </a:endParaRPr>
+          </a:p>
+        </p:txBody>
+      </p:sp>
+    </p:spTree>
+    <p:extLst>
+      <p:ext uri="{BB962C8B-B14F-4D97-AF65-F5344CB8AC3E}">
+        <p14:creationId xmlns:p14="http://schemas.microsoft.com/office/powerpoint/2010/main" val="1925242782"/>
+      </p:ext>
+    </p:extLst>
+  </p:cSld>
+  <p:clrMapOvr>
+    <a:masterClrMapping/>
+  </p:clrMapOvr>
+  <mc:AlternateContent xmlns:mc="http://schemas.openxmlformats.org/markup-compatibility/2006" xmlns:p14="http://schemas.microsoft.com/office/powerpoint/2010/main">
+    <mc:Choice Requires="p14">
+      <p:transition spd="med" p14:dur="700">
+        <p:fade/>
+      </p:transition>
+    </mc:Choice>
+    <mc:Fallback xmlns="">
+      <p:transition xmlns:p14="http://schemas.microsoft.com/office/powerpoint/2010/main" spd="med">
+        <p:fade/>
+      </p:transition>
+    </mc:Fallback>
+  </mc:AlternateContent>
+</p:sld>
+</file>
+
+<file path=ppt/slides/slide7.xml><?xml version="1.0" encoding="utf-8"?>
+<p:sld xmlns:a="http://schemas.openxmlformats.org/drawingml/2006/main" xmlns:r="http://schemas.openxmlformats.org/officeDocument/2006/relationships" xmlns:p="http://schemas.openxmlformats.org/presentationml/2006/main">
+  <p:cSld>
+    <p:spTree>
+      <p:nvGrpSpPr>
+        <p:cNvPr id="1" name=""/>
+        <p:cNvGrpSpPr/>
+        <p:nvPr/>
+      </p:nvGrpSpPr>
+      <p:grpSpPr>
+        <a:xfrm>
+          <a:off x="0" y="0"/>
+          <a:ext cx="0" cy="0"/>
+          <a:chOff x="0" y="0"/>
+          <a:chExt cx="0" cy="0"/>
+        </a:xfrm>
+      </p:grpSpPr>
+      <p:sp>
+        <p:nvSpPr>
+          <p:cNvPr id="6" name="Rectangle 5"/>
+          <p:cNvSpPr/>
+          <p:nvPr/>
+        </p:nvSpPr>
+        <p:spPr>
+          <a:xfrm>
+            <a:off x="-215115" y="0"/>
+            <a:ext cx="12407115" cy="6858000"/>
+          </a:xfrm>
+          <a:prstGeom prst="rect">
+            <a:avLst/>
+          </a:prstGeom>
+          <a:solidFill>
+            <a:schemeClr val="accent1">
+              <a:lumMod val="75000"/>
+            </a:schemeClr>
+          </a:solidFill>
+          <a:ln>
+            <a:noFill/>
+          </a:ln>
+        </p:spPr>
+        <p:style>
+          <a:lnRef idx="1">
+            <a:schemeClr val="accent1"/>
+          </a:lnRef>
+          <a:fillRef idx="3">
+            <a:schemeClr val="accent1"/>
+          </a:fillRef>
+          <a:effectRef idx="2">
+            <a:schemeClr val="accent1"/>
+          </a:effectRef>
+          <a:fontRef idx="minor">
+            <a:schemeClr val="lt1"/>
+          </a:fontRef>
+        </p:style>
+        <p:txBody>
+          <a:bodyPr rtlCol="0" anchor="ctr"/>
+          <a:lstStyle/>
+          <a:p>
+            <a:pPr algn="ctr"/>
+            <a:endParaRPr lang="en-US" sz="2400"/>
+          </a:p>
+        </p:txBody>
+      </p:sp>
+      <p:sp>
+        <p:nvSpPr>
+          <p:cNvPr id="24" name="Title 1"/>
+          <p:cNvSpPr>
+            <a:spLocks noGrp="1"/>
+          </p:cNvSpPr>
+          <p:nvPr>
+            <p:ph type="title"/>
+          </p:nvPr>
+        </p:nvSpPr>
+        <p:spPr>
+          <a:xfrm>
+            <a:off x="502042" y="1936377"/>
+            <a:ext cx="10972800" cy="2985246"/>
+          </a:xfrm>
+        </p:spPr>
+        <p:txBody>
+          <a:bodyPr>
+            <a:noAutofit/>
+          </a:bodyPr>
+          <a:lstStyle/>
+          <a:p>
+            <a:pPr algn="ctr" rtl="0" eaLnBrk="0" fontAlgn="base" hangingPunct="0">
+              <a:spcAft>
+                <a:spcPct val="0"/>
+              </a:spcAft>
+            </a:pPr>
+            <a:r>
+              <a:rPr lang="en-US" sz="6000" dirty="0">
+                <a:solidFill>
+                  <a:schemeClr val="bg1"/>
+                </a:solidFill>
+              </a:rPr>
+              <a:t>CSS critical path</a:t>
+            </a:r>
+            <a:endParaRPr lang="en-US" altLang="en-US" sz="6000" b="1" dirty="0">
+              <a:solidFill>
+                <a:schemeClr val="bg1"/>
+              </a:solidFill>
+              <a:latin typeface="Calibri (Body)"/>
+            </a:endParaRPr>
+          </a:p>
+        </p:txBody>
+      </p:sp>
+    </p:spTree>
+    <p:extLst>
+      <p:ext uri="{BB962C8B-B14F-4D97-AF65-F5344CB8AC3E}">
+        <p14:creationId xmlns:p14="http://schemas.microsoft.com/office/powerpoint/2010/main" val="781785105"/>
+      </p:ext>
+    </p:extLst>
+  </p:cSld>
+  <p:clrMapOvr>
+    <a:masterClrMapping/>
+  </p:clrMapOvr>
+  <mc:AlternateContent xmlns:mc="http://schemas.openxmlformats.org/markup-compatibility/2006" xmlns:p14="http://schemas.microsoft.com/office/powerpoint/2010/main">
+    <mc:Choice Requires="p14">
+      <p:transition spd="med" p14:dur="700">
+        <p:fade/>
+      </p:transition>
+    </mc:Choice>
+    <mc:Fallback xmlns="">
+      <p:transition xmlns:p14="http://schemas.microsoft.com/office/powerpoint/2010/main" spd="med">
+        <p:fade/>
+      </p:transition>
+    </mc:Fallback>
+  </mc:AlternateContent>
+</p:sld>
+</file>
+
+<file path=ppt/slides/slide8.xml><?xml version="1.0" encoding="utf-8"?>
+<p:sld xmlns:a="http://schemas.openxmlformats.org/drawingml/2006/main" xmlns:r="http://schemas.openxmlformats.org/officeDocument/2006/relationships" xmlns:p="http://schemas.openxmlformats.org/presentationml/2006/main">
+  <p:cSld>
+    <p:spTree>
+      <p:nvGrpSpPr>
+        <p:cNvPr id="1" name=""/>
+        <p:cNvGrpSpPr/>
+        <p:nvPr/>
+      </p:nvGrpSpPr>
+      <p:grpSpPr>
+        <a:xfrm>
+          <a:off x="0" y="0"/>
+          <a:ext cx="0" cy="0"/>
+          <a:chOff x="0" y="0"/>
+          <a:chExt cx="0" cy="0"/>
+        </a:xfrm>
+      </p:grpSpPr>
+      <p:sp>
+        <p:nvSpPr>
+          <p:cNvPr id="6" name="Rectangle 5"/>
+          <p:cNvSpPr/>
+          <p:nvPr/>
+        </p:nvSpPr>
+        <p:spPr>
+          <a:xfrm>
+            <a:off x="-215115" y="0"/>
+            <a:ext cx="12407115" cy="6858000"/>
+          </a:xfrm>
+          <a:prstGeom prst="rect">
+            <a:avLst/>
+          </a:prstGeom>
+          <a:solidFill>
+            <a:schemeClr val="accent1">
+              <a:lumMod val="75000"/>
+            </a:schemeClr>
+          </a:solidFill>
+          <a:ln>
+            <a:noFill/>
+          </a:ln>
+        </p:spPr>
+        <p:style>
+          <a:lnRef idx="1">
+            <a:schemeClr val="accent1"/>
+          </a:lnRef>
+          <a:fillRef idx="3">
+            <a:schemeClr val="accent1"/>
+          </a:fillRef>
+          <a:effectRef idx="2">
+            <a:schemeClr val="accent1"/>
+          </a:effectRef>
+          <a:fontRef idx="minor">
+            <a:schemeClr val="lt1"/>
+          </a:fontRef>
+        </p:style>
+        <p:txBody>
+          <a:bodyPr rtlCol="0" anchor="ctr"/>
+          <a:lstStyle/>
+          <a:p>
+            <a:pPr algn="ctr"/>
+            <a:endParaRPr lang="en-US" sz="2400"/>
+          </a:p>
+        </p:txBody>
+      </p:sp>
+      <p:sp>
+        <p:nvSpPr>
+          <p:cNvPr id="24" name="Title 1"/>
+          <p:cNvSpPr>
+            <a:spLocks noGrp="1"/>
+          </p:cNvSpPr>
+          <p:nvPr>
+            <p:ph type="title"/>
+          </p:nvPr>
+        </p:nvSpPr>
+        <p:spPr>
+          <a:xfrm>
+            <a:off x="502042" y="1936377"/>
+            <a:ext cx="10972800" cy="2985246"/>
+          </a:xfrm>
+        </p:spPr>
+        <p:txBody>
+          <a:bodyPr>
+            <a:noAutofit/>
+          </a:bodyPr>
+          <a:lstStyle/>
+          <a:p>
+            <a:pPr algn="ctr" rtl="0" eaLnBrk="0" fontAlgn="base" hangingPunct="0">
+              <a:spcAft>
+                <a:spcPct val="0"/>
+              </a:spcAft>
+            </a:pPr>
+            <a:r>
+              <a:rPr lang="en-US" sz="6000">
+                <a:solidFill>
+                  <a:schemeClr val="bg1"/>
+                </a:solidFill>
+              </a:rPr>
+              <a:t>HTTP2</a:t>
+            </a:r>
+            <a:endParaRPr lang="en-US" altLang="en-US" sz="6000" b="1" dirty="0">
+              <a:solidFill>
+                <a:schemeClr val="bg1"/>
+              </a:solidFill>
+              <a:latin typeface="Calibri (Body)"/>
+            </a:endParaRPr>
+          </a:p>
+        </p:txBody>
+      </p:sp>
+    </p:spTree>
+    <p:extLst>
+      <p:ext uri="{BB962C8B-B14F-4D97-AF65-F5344CB8AC3E}">
+        <p14:creationId xmlns:p14="http://schemas.microsoft.com/office/powerpoint/2010/main" val="4259968551"/>
       </p:ext>
     </p:extLst>
   </p:cSld>

</xml_diff>

<commit_message>
Add Critical Path slide
</commit_message>
<xml_diff>
--- a/presentations/chapter-7/Practical Web Dev.pptx
+++ b/presentations/chapter-7/Practical Web Dev.pptx
@@ -234,7 +234,7 @@
           <a:p>
             <a:fld id="{B53C1D94-E0DD-4250-8C1B-3D8C3DA9B2B6}" type="datetimeFigureOut">
               <a:rPr lang="he-IL" smtClean="0"/>
-              <a:t>י"א/תמוז/תשע"ט</a:t>
+              <a:t>י"ב/תמוז/תשע"ט</a:t>
             </a:fld>
             <a:endParaRPr lang="he-IL"/>
           </a:p>
@@ -3885,6 +3885,153 @@
           <a:lstStyle/>
           <a:p>
             <a:pPr algn="l" rtl="0"/>
+            <a:r>
+              <a:rPr lang="en-US" sz="1200" dirty="0">
+                <a:solidFill>
+                  <a:schemeClr val="bg1"/>
+                </a:solidFill>
+              </a:rPr>
+              <a:t>CSS critical path</a:t>
+            </a:r>
+          </a:p>
+          <a:p>
+            <a:pPr algn="l" rtl="0"/>
+            <a:endParaRPr lang="en-US" sz="1200" dirty="0">
+              <a:solidFill>
+                <a:schemeClr val="bg1"/>
+              </a:solidFill>
+            </a:endParaRPr>
+          </a:p>
+          <a:p>
+            <a:pPr algn="l" rtl="0"/>
+            <a:r>
+              <a:rPr lang="en-US" sz="1200" dirty="0">
+                <a:solidFill>
+                  <a:schemeClr val="bg1"/>
+                </a:solidFill>
+              </a:rPr>
+              <a:t>Let’s take a look at the next picture, what we are seen here?</a:t>
+            </a:r>
+          </a:p>
+          <a:p>
+            <a:pPr algn="l" rtl="0"/>
+            <a:r>
+              <a:rPr lang="en-US" sz="1200" dirty="0">
+                <a:solidFill>
+                  <a:schemeClr val="bg1"/>
+                </a:solidFill>
+              </a:rPr>
+              <a:t>When we are going to a web site we are receiving an index.html file and our browser start to parse it and build the our DOM.</a:t>
+            </a:r>
+            <a:br>
+              <a:rPr lang="en-US" sz="1200" dirty="0">
+                <a:solidFill>
+                  <a:schemeClr val="bg1"/>
+                </a:solidFill>
+              </a:rPr>
+            </a:br>
+            <a:r>
+              <a:rPr lang="en-US" sz="1200" dirty="0">
+                <a:solidFill>
+                  <a:schemeClr val="bg1"/>
+                </a:solidFill>
+              </a:rPr>
+              <a:t>The browser is reading header an start to fetch the data in it.</a:t>
+            </a:r>
+          </a:p>
+          <a:p>
+            <a:pPr algn="l" rtl="0"/>
+            <a:r>
+              <a:rPr lang="en-US" sz="1200" dirty="0">
+                <a:solidFill>
+                  <a:schemeClr val="bg1"/>
+                </a:solidFill>
+              </a:rPr>
+              <a:t>Over there we will have our CSS file and we will fetch it, when it will be received we will build our CSSOM and then the browser will render the page. </a:t>
+            </a:r>
+          </a:p>
+          <a:p>
+            <a:pPr algn="l" rtl="0"/>
+            <a:r>
+              <a:rPr lang="en-US" sz="1200" dirty="0">
+                <a:solidFill>
+                  <a:schemeClr val="bg1"/>
+                </a:solidFill>
+              </a:rPr>
+              <a:t>This is very high level how it’s working.</a:t>
+            </a:r>
+          </a:p>
+          <a:p>
+            <a:pPr algn="l" rtl="0"/>
+            <a:endParaRPr lang="en-US" sz="1200" dirty="0">
+              <a:solidFill>
+                <a:schemeClr val="bg1"/>
+              </a:solidFill>
+            </a:endParaRPr>
+          </a:p>
+          <a:p>
+            <a:pPr algn="l" rtl="0"/>
+            <a:r>
+              <a:rPr lang="en-US" sz="1200" b="0" i="0" kern="1200" dirty="0">
+                <a:solidFill>
+                  <a:schemeClr val="tx1"/>
+                </a:solidFill>
+                <a:effectLst/>
+                <a:latin typeface="+mn-lt"/>
+                <a:ea typeface="+mn-ea"/>
+                <a:cs typeface="+mn-cs"/>
+              </a:rPr>
+              <a:t>Now, as you can see, A request for a CSS file can significantly increase the time it takes a web page to render.</a:t>
+            </a:r>
+          </a:p>
+          <a:p>
+            <a:pPr algn="l" rtl="0"/>
+            <a:r>
+              <a:rPr lang="en-US" sz="1200" b="0" i="0" kern="1200" dirty="0">
+                <a:solidFill>
+                  <a:schemeClr val="tx1"/>
+                </a:solidFill>
+                <a:effectLst/>
+                <a:latin typeface="+mn-lt"/>
+                <a:ea typeface="+mn-ea"/>
+                <a:cs typeface="+mn-cs"/>
+              </a:rPr>
+              <a:t>The reason is that by default the browser will delay page rendering until it has finished loading, parsing and executing all the CSS files referenced in the </a:t>
+            </a:r>
+            <a:r>
+              <a:rPr lang="en-US" dirty="0"/>
+              <a:t>&lt;head&gt;</a:t>
+            </a:r>
+            <a:r>
+              <a:rPr lang="en-US" sz="1200" b="0" i="0" kern="1200" dirty="0">
+                <a:solidFill>
+                  <a:schemeClr val="tx1"/>
+                </a:solidFill>
+                <a:effectLst/>
+                <a:latin typeface="+mn-lt"/>
+                <a:ea typeface="+mn-ea"/>
+                <a:cs typeface="+mn-cs"/>
+              </a:rPr>
+              <a:t> of your page.</a:t>
+            </a:r>
+          </a:p>
+          <a:p>
+            <a:pPr algn="l" rtl="0"/>
+            <a:r>
+              <a:rPr lang="en-US" sz="1200" b="0" i="0" kern="1200" dirty="0">
+                <a:solidFill>
+                  <a:schemeClr val="tx1"/>
+                </a:solidFill>
+                <a:effectLst/>
+                <a:latin typeface="+mn-lt"/>
+                <a:ea typeface="+mn-ea"/>
+                <a:cs typeface="+mn-cs"/>
+              </a:rPr>
+              <a:t>It does this because it needs to calculate the layout of the page.</a:t>
+            </a:r>
+          </a:p>
+          <a:p>
+            <a:pPr algn="l" rtl="0"/>
             <a:endParaRPr lang="en-US" sz="1200" b="0" i="0" kern="1200" dirty="0">
               <a:solidFill>
                 <a:schemeClr val="tx1"/>
@@ -3907,7 +4054,22 @@
                 <a:ea typeface="+mn-ea"/>
                 <a:cs typeface="+mn-cs"/>
               </a:rPr>
-              <a:t>If we have a really large CSS file and it takes a while to download, our users will end up waiting until the </a:t>
+              <a:t>Unfortunately, this means that if we have a really large CSS file and it takes a while to download,</a:t>
+            </a:r>
+          </a:p>
+          <a:p>
+            <a:pPr algn="l" rtl="0"/>
+            <a:r>
+              <a:rPr lang="en-US" sz="1200" b="0" i="0" kern="1200" dirty="0">
+                <a:solidFill>
+                  <a:schemeClr val="tx1"/>
+                </a:solidFill>
+                <a:effectLst/>
+                <a:latin typeface="+mn-lt"/>
+                <a:ea typeface="+mn-ea"/>
+                <a:cs typeface="+mn-cs"/>
+              </a:rPr>
+              <a:t>our users will end up waiting until the </a:t>
             </a:r>
             <a:r>
               <a:rPr lang="en-US" sz="1200" b="0" i="1" kern="1200" dirty="0">
@@ -3931,7 +4093,37 @@
                 <a:ea typeface="+mn-ea"/>
                 <a:cs typeface="+mn-cs"/>
               </a:rPr>
-              <a:t> has been downloaded before the browser can begin rendering the page. Fortunately, there is a sneaky technique that allows us to optimize the delivery of our CSS and mitigate the blocking. This technique is known as optimizing the </a:t>
+              <a:t> has been downloaded before the browser can begin rendering the page.</a:t>
+            </a:r>
+          </a:p>
+          <a:p>
+            <a:pPr algn="l" rtl="0"/>
+            <a:r>
+              <a:rPr lang="en-US" sz="1200" b="0" i="0" kern="1200" dirty="0">
+                <a:solidFill>
+                  <a:schemeClr val="tx1"/>
+                </a:solidFill>
+                <a:effectLst/>
+                <a:latin typeface="+mn-lt"/>
+                <a:ea typeface="+mn-ea"/>
+                <a:cs typeface="+mn-cs"/>
+              </a:rPr>
+              <a:t>Fortunately, there is a sneaky technique that allows us to optimize the delivery of our CSS and mitigate the blocking.</a:t>
+            </a:r>
+          </a:p>
+          <a:p>
+            <a:pPr algn="l" rtl="0"/>
+            <a:r>
+              <a:rPr lang="en-US" sz="1200" b="0" i="0" kern="1200" dirty="0">
+                <a:solidFill>
+                  <a:schemeClr val="tx1"/>
+                </a:solidFill>
+                <a:effectLst/>
+                <a:latin typeface="+mn-lt"/>
+                <a:ea typeface="+mn-ea"/>
+                <a:cs typeface="+mn-cs"/>
+              </a:rPr>
+              <a:t>This technique is known as optimizing the </a:t>
             </a:r>
             <a:r>
               <a:rPr lang="en-US" sz="1200" b="0" i="0" u="none" strike="noStrike" kern="1200" dirty="0">
@@ -3957,6 +4149,960 @@
             </a:endParaRPr>
           </a:p>
           <a:p>
+            <a:pPr marL="0" marR="0" lvl="0" indent="0" algn="l" defTabSz="914400" rtl="0" eaLnBrk="1" fontAlgn="auto" latinLnBrk="0" hangingPunct="1">
+              <a:lnSpc>
+                <a:spcPct val="100000"/>
+              </a:lnSpc>
+              <a:spcBef>
+                <a:spcPts val="0"/>
+              </a:spcBef>
+              <a:spcAft>
+                <a:spcPts val="0"/>
+              </a:spcAft>
+              <a:buClrTx/>
+              <a:buSzTx/>
+              <a:buFontTx/>
+              <a:buNone/>
+              <a:tabLst/>
+              <a:defRPr/>
+            </a:pPr>
+            <a:endParaRPr lang="en-US" b="0" dirty="0"/>
+          </a:p>
+          <a:p>
+            <a:pPr marL="0" marR="0" lvl="0" indent="0" algn="l" defTabSz="914400" rtl="0" eaLnBrk="1" fontAlgn="auto" latinLnBrk="0" hangingPunct="1">
+              <a:lnSpc>
+                <a:spcPct val="100000"/>
+              </a:lnSpc>
+              <a:spcBef>
+                <a:spcPts val="0"/>
+              </a:spcBef>
+              <a:spcAft>
+                <a:spcPts val="0"/>
+              </a:spcAft>
+              <a:buClrTx/>
+              <a:buSzTx/>
+              <a:buFontTx/>
+              <a:buNone/>
+              <a:tabLst/>
+              <a:defRPr/>
+            </a:pPr>
+            <a:r>
+              <a:rPr lang="en-US" sz="1200" b="0" i="0" kern="1200" dirty="0">
+                <a:solidFill>
+                  <a:schemeClr val="tx1"/>
+                </a:solidFill>
+                <a:effectLst/>
+                <a:latin typeface="+mn-lt"/>
+                <a:ea typeface="+mn-ea"/>
+                <a:cs typeface="+mn-cs"/>
+              </a:rPr>
+              <a:t>To start working with the critical CSS for our web page, we need to change our approach to the way we handle the CSS – this means splitting it into two files.</a:t>
+            </a:r>
+          </a:p>
+          <a:p>
+            <a:pPr marL="0" marR="0" lvl="0" indent="0" algn="l" defTabSz="914400" rtl="0" eaLnBrk="1" fontAlgn="auto" latinLnBrk="0" hangingPunct="1">
+              <a:lnSpc>
+                <a:spcPct val="100000"/>
+              </a:lnSpc>
+              <a:spcBef>
+                <a:spcPts val="0"/>
+              </a:spcBef>
+              <a:spcAft>
+                <a:spcPts val="0"/>
+              </a:spcAft>
+              <a:buClrTx/>
+              <a:buSzTx/>
+              <a:buFontTx/>
+              <a:buNone/>
+              <a:tabLst/>
+              <a:defRPr/>
+            </a:pPr>
+            <a:r>
+              <a:rPr lang="en-US" sz="1200" b="0" i="0" kern="1200" dirty="0">
+                <a:solidFill>
+                  <a:schemeClr val="tx1"/>
+                </a:solidFill>
+                <a:effectLst/>
+                <a:latin typeface="+mn-lt"/>
+                <a:ea typeface="+mn-ea"/>
+                <a:cs typeface="+mn-cs"/>
+              </a:rPr>
+              <a:t>For the first file, we extract only the minimum set of CSS required to render the above-the-fold content,</a:t>
+            </a:r>
+          </a:p>
+          <a:p>
+            <a:pPr marL="0" marR="0" lvl="0" indent="0" algn="l" defTabSz="914400" rtl="0" eaLnBrk="1" fontAlgn="auto" latinLnBrk="0" hangingPunct="1">
+              <a:lnSpc>
+                <a:spcPct val="100000"/>
+              </a:lnSpc>
+              <a:spcBef>
+                <a:spcPts val="0"/>
+              </a:spcBef>
+              <a:spcAft>
+                <a:spcPts val="0"/>
+              </a:spcAft>
+              <a:buClrTx/>
+              <a:buSzTx/>
+              <a:buFontTx/>
+              <a:buNone/>
+              <a:tabLst/>
+              <a:defRPr/>
+            </a:pPr>
+            <a:r>
+              <a:rPr lang="en-US" sz="1200" b="0" i="0" kern="1200" dirty="0">
+                <a:solidFill>
+                  <a:schemeClr val="tx1"/>
+                </a:solidFill>
+                <a:effectLst/>
+                <a:latin typeface="+mn-lt"/>
+                <a:ea typeface="+mn-ea"/>
+                <a:cs typeface="+mn-cs"/>
+              </a:rPr>
+              <a:t>and then we inline it in the web page. For the second file, or the non-critical CSS, we asynchronously load it so as not to block the web page.</a:t>
+            </a:r>
+          </a:p>
+          <a:p>
+            <a:pPr marL="0" marR="0" lvl="0" indent="0" algn="l" defTabSz="914400" rtl="0" eaLnBrk="1" fontAlgn="auto" latinLnBrk="0" hangingPunct="1">
+              <a:lnSpc>
+                <a:spcPct val="100000"/>
+              </a:lnSpc>
+              <a:spcBef>
+                <a:spcPts val="0"/>
+              </a:spcBef>
+              <a:spcAft>
+                <a:spcPts val="0"/>
+              </a:spcAft>
+              <a:buClrTx/>
+              <a:buSzTx/>
+              <a:buFontTx/>
+              <a:buNone/>
+              <a:tabLst/>
+              <a:defRPr/>
+            </a:pPr>
+            <a:endParaRPr lang="en-US" sz="1200" b="0" i="0" kern="1200" dirty="0">
+              <a:solidFill>
+                <a:schemeClr val="tx1"/>
+              </a:solidFill>
+              <a:effectLst/>
+              <a:latin typeface="+mn-lt"/>
+              <a:ea typeface="+mn-ea"/>
+              <a:cs typeface="+mn-cs"/>
+            </a:endParaRPr>
+          </a:p>
+          <a:p>
+            <a:pPr marL="0" marR="0" lvl="0" indent="0" algn="l" defTabSz="914400" rtl="0" eaLnBrk="1" fontAlgn="auto" latinLnBrk="0" hangingPunct="1">
+              <a:lnSpc>
+                <a:spcPct val="100000"/>
+              </a:lnSpc>
+              <a:spcBef>
+                <a:spcPts val="0"/>
+              </a:spcBef>
+              <a:spcAft>
+                <a:spcPts val="0"/>
+              </a:spcAft>
+              <a:buClrTx/>
+              <a:buSzTx/>
+              <a:buFontTx/>
+              <a:buNone/>
+              <a:tabLst/>
+              <a:defRPr/>
+            </a:pPr>
+            <a:r>
+              <a:rPr lang="en-US" sz="1200" b="0" i="0" kern="1200" dirty="0">
+                <a:solidFill>
+                  <a:schemeClr val="tx1"/>
+                </a:solidFill>
+                <a:effectLst/>
+                <a:latin typeface="+mn-lt"/>
+                <a:ea typeface="+mn-ea"/>
+                <a:cs typeface="+mn-cs"/>
+              </a:rPr>
+              <a:t>It might seem a bit weird at first, but by </a:t>
+            </a:r>
+            <a:r>
+              <a:rPr lang="en-US" sz="1200" b="0" i="0" kern="1200" dirty="0" err="1">
+                <a:solidFill>
+                  <a:schemeClr val="tx1"/>
+                </a:solidFill>
+                <a:effectLst/>
+                <a:latin typeface="+mn-lt"/>
+                <a:ea typeface="+mn-ea"/>
+                <a:cs typeface="+mn-cs"/>
+              </a:rPr>
+              <a:t>inlining</a:t>
+            </a:r>
+            <a:r>
+              <a:rPr lang="en-US" sz="1200" b="0" i="0" kern="1200" dirty="0">
+                <a:solidFill>
+                  <a:schemeClr val="tx1"/>
+                </a:solidFill>
+                <a:effectLst/>
+                <a:latin typeface="+mn-lt"/>
+                <a:ea typeface="+mn-ea"/>
+                <a:cs typeface="+mn-cs"/>
+              </a:rPr>
+              <a:t> the critical CSS into our HTML, we can eliminate the additional round-trips in the critical path. This allows us to deliver the critical CSS in one round-trip and present something to users as soon as possible.</a:t>
+            </a:r>
+          </a:p>
+          <a:p>
+            <a:pPr marL="0" marR="0" lvl="0" indent="0" algn="l" defTabSz="914400" rtl="0" eaLnBrk="1" fontAlgn="auto" latinLnBrk="0" hangingPunct="1">
+              <a:lnSpc>
+                <a:spcPct val="100000"/>
+              </a:lnSpc>
+              <a:spcBef>
+                <a:spcPts val="0"/>
+              </a:spcBef>
+              <a:spcAft>
+                <a:spcPts val="0"/>
+              </a:spcAft>
+              <a:buClrTx/>
+              <a:buSzTx/>
+              <a:buFontTx/>
+              <a:buNone/>
+              <a:tabLst/>
+              <a:defRPr/>
+            </a:pPr>
+            <a:endParaRPr lang="en-US" sz="1200" b="0" i="0" kern="1200" dirty="0">
+              <a:solidFill>
+                <a:schemeClr val="tx1"/>
+              </a:solidFill>
+              <a:effectLst/>
+              <a:latin typeface="+mn-lt"/>
+              <a:ea typeface="+mn-ea"/>
+              <a:cs typeface="+mn-cs"/>
+            </a:endParaRPr>
+          </a:p>
+          <a:p>
+            <a:pPr marL="0" marR="0" lvl="0" indent="0" algn="l" defTabSz="914400" rtl="0" eaLnBrk="1" fontAlgn="auto" latinLnBrk="0" hangingPunct="1">
+              <a:lnSpc>
+                <a:spcPct val="100000"/>
+              </a:lnSpc>
+              <a:spcBef>
+                <a:spcPts val="0"/>
+              </a:spcBef>
+              <a:spcAft>
+                <a:spcPts val="0"/>
+              </a:spcAft>
+              <a:buClrTx/>
+              <a:buSzTx/>
+              <a:buFontTx/>
+              <a:buNone/>
+              <a:tabLst/>
+              <a:defRPr/>
+            </a:pPr>
+            <a:r>
+              <a:rPr lang="en-US" sz="1200" b="0" i="0" kern="1200" dirty="0">
+                <a:solidFill>
+                  <a:schemeClr val="tx1"/>
+                </a:solidFill>
+                <a:effectLst/>
+                <a:latin typeface="+mn-lt"/>
+                <a:ea typeface="+mn-ea"/>
+                <a:cs typeface="+mn-cs"/>
+              </a:rPr>
+              <a:t>In the code above, we are extracting the critical CSS and </a:t>
+            </a:r>
+            <a:r>
+              <a:rPr lang="en-US" sz="1200" b="0" i="0" kern="1200" dirty="0" err="1">
+                <a:solidFill>
+                  <a:schemeClr val="tx1"/>
+                </a:solidFill>
+                <a:effectLst/>
+                <a:latin typeface="+mn-lt"/>
+                <a:ea typeface="+mn-ea"/>
+                <a:cs typeface="+mn-cs"/>
+              </a:rPr>
+              <a:t>inlining</a:t>
+            </a:r>
+            <a:r>
+              <a:rPr lang="en-US" sz="1200" b="0" i="0" kern="1200" dirty="0">
+                <a:solidFill>
+                  <a:schemeClr val="tx1"/>
+                </a:solidFill>
+                <a:effectLst/>
+                <a:latin typeface="+mn-lt"/>
+                <a:ea typeface="+mn-ea"/>
+                <a:cs typeface="+mn-cs"/>
+              </a:rPr>
+              <a:t> it in the HTML between the </a:t>
+            </a:r>
+            <a:r>
+              <a:rPr lang="en-US" dirty="0"/>
+              <a:t>style</a:t>
+            </a:r>
+            <a:r>
+              <a:rPr lang="en-US" sz="1200" b="0" i="0" kern="1200" dirty="0">
+                <a:solidFill>
+                  <a:schemeClr val="tx1"/>
+                </a:solidFill>
+                <a:effectLst/>
+                <a:latin typeface="+mn-lt"/>
+                <a:ea typeface="+mn-ea"/>
+                <a:cs typeface="+mn-cs"/>
+              </a:rPr>
+              <a:t> tags.</a:t>
+            </a:r>
+          </a:p>
+          <a:p>
+            <a:pPr marL="0" marR="0" lvl="0" indent="0" algn="l" defTabSz="914400" rtl="0" eaLnBrk="1" fontAlgn="auto" latinLnBrk="0" hangingPunct="1">
+              <a:lnSpc>
+                <a:spcPct val="100000"/>
+              </a:lnSpc>
+              <a:spcBef>
+                <a:spcPts val="0"/>
+              </a:spcBef>
+              <a:spcAft>
+                <a:spcPts val="0"/>
+              </a:spcAft>
+              <a:buClrTx/>
+              <a:buSzTx/>
+              <a:buFontTx/>
+              <a:buNone/>
+              <a:tabLst/>
+              <a:defRPr/>
+            </a:pPr>
+            <a:r>
+              <a:rPr lang="en-US" sz="1200" b="0" i="0" kern="1200" dirty="0">
+                <a:solidFill>
+                  <a:schemeClr val="tx1"/>
+                </a:solidFill>
+                <a:effectLst/>
+                <a:latin typeface="+mn-lt"/>
+                <a:ea typeface="+mn-ea"/>
+                <a:cs typeface="+mn-cs"/>
+              </a:rPr>
+              <a:t>Next, we are using the </a:t>
+            </a:r>
+            <a:r>
+              <a:rPr lang="en-US" dirty="0" err="1"/>
+              <a:t>loadCSS</a:t>
+            </a:r>
+            <a:r>
+              <a:rPr lang="en-US" dirty="0"/>
+              <a:t>();</a:t>
+            </a:r>
+            <a:r>
+              <a:rPr lang="en-US" sz="1200" b="0" i="0" kern="1200" dirty="0">
+                <a:solidFill>
+                  <a:schemeClr val="tx1"/>
+                </a:solidFill>
+                <a:effectLst/>
+                <a:latin typeface="+mn-lt"/>
+                <a:ea typeface="+mn-ea"/>
+                <a:cs typeface="+mn-cs"/>
+              </a:rPr>
+              <a:t> function to asynchronously load the remaining, non-critical CSS.</a:t>
+            </a:r>
+          </a:p>
+          <a:p>
+            <a:pPr marL="0" marR="0" lvl="0" indent="0" algn="l" defTabSz="914400" rtl="0" eaLnBrk="1" fontAlgn="auto" latinLnBrk="0" hangingPunct="1">
+              <a:lnSpc>
+                <a:spcPct val="100000"/>
+              </a:lnSpc>
+              <a:spcBef>
+                <a:spcPts val="0"/>
+              </a:spcBef>
+              <a:spcAft>
+                <a:spcPts val="0"/>
+              </a:spcAft>
+              <a:buClrTx/>
+              <a:buSzTx/>
+              <a:buFontTx/>
+              <a:buNone/>
+              <a:tabLst/>
+              <a:defRPr/>
+            </a:pPr>
+            <a:r>
+              <a:rPr lang="en-US" sz="1200" b="0" i="0" kern="1200" dirty="0">
+                <a:solidFill>
+                  <a:schemeClr val="tx1"/>
+                </a:solidFill>
+                <a:effectLst/>
+                <a:latin typeface="+mn-lt"/>
+                <a:ea typeface="+mn-ea"/>
+                <a:cs typeface="+mn-cs"/>
+              </a:rPr>
+              <a:t>This is important because we are essentially off-loading the bulkier (</a:t>
+            </a:r>
+            <a:r>
+              <a:rPr lang="en-US" sz="1200" b="0" i="1" kern="1200" dirty="0">
+                <a:solidFill>
+                  <a:schemeClr val="tx1"/>
+                </a:solidFill>
+                <a:effectLst/>
+                <a:latin typeface="+mn-lt"/>
+                <a:ea typeface="+mn-ea"/>
+                <a:cs typeface="+mn-cs"/>
+              </a:rPr>
+              <a:t>non-critical</a:t>
+            </a:r>
+            <a:r>
+              <a:rPr lang="en-US" sz="1200" b="0" i="0" kern="1200" dirty="0">
+                <a:solidFill>
+                  <a:schemeClr val="tx1"/>
+                </a:solidFill>
+                <a:effectLst/>
+                <a:latin typeface="+mn-lt"/>
+                <a:ea typeface="+mn-ea"/>
+                <a:cs typeface="+mn-cs"/>
+              </a:rPr>
+              <a:t>) CSS and injecting it into the web page in the background.</a:t>
+            </a:r>
+          </a:p>
+          <a:p>
+            <a:pPr marL="0" marR="0" lvl="0" indent="0" algn="l" defTabSz="914400" rtl="0" eaLnBrk="1" fontAlgn="auto" latinLnBrk="0" hangingPunct="1">
+              <a:lnSpc>
+                <a:spcPct val="100000"/>
+              </a:lnSpc>
+              <a:spcBef>
+                <a:spcPts val="0"/>
+              </a:spcBef>
+              <a:spcAft>
+                <a:spcPts val="0"/>
+              </a:spcAft>
+              <a:buClrTx/>
+              <a:buSzTx/>
+              <a:buFontTx/>
+              <a:buNone/>
+              <a:tabLst/>
+              <a:defRPr/>
+            </a:pPr>
+            <a:endParaRPr lang="en-US" b="0" dirty="0"/>
+          </a:p>
+          <a:p>
+            <a:pPr marL="0" marR="0" lvl="0" indent="0" algn="l" defTabSz="914400" rtl="0" eaLnBrk="1" fontAlgn="auto" latinLnBrk="0" hangingPunct="1">
+              <a:lnSpc>
+                <a:spcPct val="100000"/>
+              </a:lnSpc>
+              <a:spcBef>
+                <a:spcPts val="0"/>
+              </a:spcBef>
+              <a:spcAft>
+                <a:spcPts val="0"/>
+              </a:spcAft>
+              <a:buClrTx/>
+              <a:buSzTx/>
+              <a:buFontTx/>
+              <a:buNone/>
+              <a:tabLst/>
+              <a:defRPr/>
+            </a:pPr>
+            <a:r>
+              <a:rPr lang="en-US" b="0" dirty="0"/>
+              <a:t>Let see a demo:</a:t>
+            </a:r>
+          </a:p>
+          <a:p>
+            <a:pPr marL="0" marR="0" lvl="0" indent="0" algn="l" defTabSz="914400" rtl="0" eaLnBrk="1" fontAlgn="auto" latinLnBrk="0" hangingPunct="1">
+              <a:lnSpc>
+                <a:spcPct val="100000"/>
+              </a:lnSpc>
+              <a:spcBef>
+                <a:spcPts val="0"/>
+              </a:spcBef>
+              <a:spcAft>
+                <a:spcPts val="0"/>
+              </a:spcAft>
+              <a:buClrTx/>
+              <a:buSzTx/>
+              <a:buFontTx/>
+              <a:buNone/>
+              <a:tabLst/>
+              <a:defRPr/>
+            </a:pPr>
+            <a:r>
+              <a:rPr lang="en-US" b="0" dirty="0"/>
+              <a:t>On before we critical changes let’s open dev tools and take a look at index.html file</a:t>
+            </a:r>
+          </a:p>
+          <a:p>
+            <a:pPr marL="0" marR="0" lvl="0" indent="0" algn="l" defTabSz="914400" rtl="0" eaLnBrk="1" fontAlgn="auto" latinLnBrk="0" hangingPunct="1">
+              <a:lnSpc>
+                <a:spcPct val="100000"/>
+              </a:lnSpc>
+              <a:spcBef>
+                <a:spcPts val="0"/>
+              </a:spcBef>
+              <a:spcAft>
+                <a:spcPts val="0"/>
+              </a:spcAft>
+              <a:buClrTx/>
+              <a:buSzTx/>
+              <a:buFontTx/>
+              <a:buNone/>
+              <a:tabLst/>
+              <a:defRPr/>
+            </a:pPr>
+            <a:r>
+              <a:rPr lang="en-US" b="0" dirty="0"/>
+              <a:t>We can see we have only one main.css file which contain all of our styles</a:t>
+            </a:r>
+          </a:p>
+          <a:p>
+            <a:pPr marL="0" marR="0" lvl="0" indent="0" algn="l" defTabSz="914400" rtl="0" eaLnBrk="1" fontAlgn="auto" latinLnBrk="0" hangingPunct="1">
+              <a:lnSpc>
+                <a:spcPct val="100000"/>
+              </a:lnSpc>
+              <a:spcBef>
+                <a:spcPts val="0"/>
+              </a:spcBef>
+              <a:spcAft>
+                <a:spcPts val="0"/>
+              </a:spcAft>
+              <a:buClrTx/>
+              <a:buSzTx/>
+              <a:buFontTx/>
+              <a:buNone/>
+              <a:tabLst/>
+              <a:defRPr/>
+            </a:pPr>
+            <a:endParaRPr lang="en-US" b="0" dirty="0"/>
+          </a:p>
+          <a:p>
+            <a:pPr marL="0" marR="0" lvl="0" indent="0" algn="l" defTabSz="914400" rtl="0" eaLnBrk="1" fontAlgn="auto" latinLnBrk="0" hangingPunct="1">
+              <a:lnSpc>
+                <a:spcPct val="100000"/>
+              </a:lnSpc>
+              <a:spcBef>
+                <a:spcPts val="0"/>
+              </a:spcBef>
+              <a:spcAft>
+                <a:spcPts val="0"/>
+              </a:spcAft>
+              <a:buClrTx/>
+              <a:buSzTx/>
+              <a:buFontTx/>
+              <a:buNone/>
+              <a:tabLst/>
+              <a:defRPr/>
+            </a:pPr>
+            <a:r>
+              <a:rPr lang="en-US" b="0" dirty="0"/>
+              <a:t>On after critical changes let’s open dev tools and take a look at index.html file,</a:t>
+            </a:r>
+          </a:p>
+          <a:p>
+            <a:pPr marL="0" marR="0" lvl="0" indent="0" algn="l" defTabSz="914400" rtl="0" eaLnBrk="1" fontAlgn="auto" latinLnBrk="0" hangingPunct="1">
+              <a:lnSpc>
+                <a:spcPct val="100000"/>
+              </a:lnSpc>
+              <a:spcBef>
+                <a:spcPts val="0"/>
+              </a:spcBef>
+              <a:spcAft>
+                <a:spcPts val="0"/>
+              </a:spcAft>
+              <a:buClrTx/>
+              <a:buSzTx/>
+              <a:buFontTx/>
+              <a:buNone/>
+              <a:tabLst/>
+              <a:defRPr/>
+            </a:pPr>
+            <a:r>
+              <a:rPr lang="en-US" b="0" dirty="0"/>
+              <a:t>We can see at header we are having inline CSS styles (for save network roundtrip) and after it we have our none critical main.css file.</a:t>
+            </a:r>
+          </a:p>
+          <a:p>
+            <a:pPr marL="0" marR="0" lvl="0" indent="0" algn="l" defTabSz="914400" rtl="0" eaLnBrk="1" fontAlgn="auto" latinLnBrk="0" hangingPunct="1">
+              <a:lnSpc>
+                <a:spcPct val="100000"/>
+              </a:lnSpc>
+              <a:spcBef>
+                <a:spcPts val="0"/>
+              </a:spcBef>
+              <a:spcAft>
+                <a:spcPts val="0"/>
+              </a:spcAft>
+              <a:buClrTx/>
+              <a:buSzTx/>
+              <a:buFontTx/>
+              <a:buNone/>
+              <a:tabLst/>
+              <a:defRPr/>
+            </a:pPr>
+            <a:r>
+              <a:rPr lang="en-US" b="0" dirty="0"/>
+              <a:t>If we will take a closer look we can see at the bottom of the file script which adding main.css file to our header for loading,</a:t>
+            </a:r>
+          </a:p>
+          <a:p>
+            <a:pPr marL="0" marR="0" lvl="0" indent="0" algn="l" defTabSz="914400" rtl="0" eaLnBrk="1" fontAlgn="auto" latinLnBrk="0" hangingPunct="1">
+              <a:lnSpc>
+                <a:spcPct val="100000"/>
+              </a:lnSpc>
+              <a:spcBef>
+                <a:spcPts val="0"/>
+              </a:spcBef>
+              <a:spcAft>
+                <a:spcPts val="0"/>
+              </a:spcAft>
+              <a:buClrTx/>
+              <a:buSzTx/>
+              <a:buFontTx/>
+              <a:buNone/>
+              <a:tabLst/>
+              <a:defRPr/>
+            </a:pPr>
+            <a:r>
+              <a:rPr lang="en-US" b="0" dirty="0"/>
+              <a:t>In other words we are loading our application and after it’s rendered we are loading the main.css file</a:t>
+            </a:r>
+          </a:p>
+          <a:p>
+            <a:pPr marL="0" marR="0" lvl="0" indent="0" algn="l" defTabSz="914400" rtl="0" eaLnBrk="1" fontAlgn="auto" latinLnBrk="0" hangingPunct="1">
+              <a:lnSpc>
+                <a:spcPct val="100000"/>
+              </a:lnSpc>
+              <a:spcBef>
+                <a:spcPts val="0"/>
+              </a:spcBef>
+              <a:spcAft>
+                <a:spcPts val="0"/>
+              </a:spcAft>
+              <a:buClrTx/>
+              <a:buSzTx/>
+              <a:buFontTx/>
+              <a:buNone/>
+              <a:tabLst/>
+              <a:defRPr/>
+            </a:pPr>
+            <a:endParaRPr lang="en-US" b="0" dirty="0"/>
+          </a:p>
+          <a:p>
+            <a:pPr marL="0" marR="0" lvl="0" indent="0" algn="l" defTabSz="914400" rtl="0" eaLnBrk="1" fontAlgn="auto" latinLnBrk="0" hangingPunct="1">
+              <a:lnSpc>
+                <a:spcPct val="100000"/>
+              </a:lnSpc>
+              <a:spcBef>
+                <a:spcPts val="0"/>
+              </a:spcBef>
+              <a:spcAft>
+                <a:spcPts val="0"/>
+              </a:spcAft>
+              <a:buClrTx/>
+              <a:buSzTx/>
+              <a:buFontTx/>
+              <a:buNone/>
+              <a:tabLst/>
+              <a:defRPr/>
+            </a:pPr>
+            <a:r>
+              <a:rPr lang="en-US" b="0" dirty="0"/>
+              <a:t>Another way to check what styles are critical is by using coverage tool (can be used also for JS files)</a:t>
+            </a:r>
+          </a:p>
+          <a:p>
+            <a:pPr marL="0" marR="0" lvl="0" indent="0" algn="l" defTabSz="914400" rtl="0" eaLnBrk="1" fontAlgn="auto" latinLnBrk="0" hangingPunct="1">
+              <a:lnSpc>
+                <a:spcPct val="100000"/>
+              </a:lnSpc>
+              <a:spcBef>
+                <a:spcPts val="0"/>
+              </a:spcBef>
+              <a:spcAft>
+                <a:spcPts val="0"/>
+              </a:spcAft>
+              <a:buClrTx/>
+              <a:buSzTx/>
+              <a:buFontTx/>
+              <a:buNone/>
+              <a:tabLst/>
+              <a:defRPr/>
+            </a:pPr>
+            <a:r>
+              <a:rPr lang="en-US" b="0" dirty="0"/>
+              <a:t>Let’s see an example on before, if we will do coverage we can see the files size is 100 KB, there is 95.4% of code we are not using, in other words will are downloading it for nothing we will want to remove them from our critical path</a:t>
+            </a:r>
+          </a:p>
+          <a:p>
+            <a:pPr marL="0" marR="0" lvl="0" indent="0" algn="l" defTabSz="914400" rtl="0" eaLnBrk="1" fontAlgn="auto" latinLnBrk="0" hangingPunct="1">
+              <a:lnSpc>
+                <a:spcPct val="100000"/>
+              </a:lnSpc>
+              <a:spcBef>
+                <a:spcPts val="0"/>
+              </a:spcBef>
+              <a:spcAft>
+                <a:spcPts val="0"/>
+              </a:spcAft>
+              <a:buClrTx/>
+              <a:buSzTx/>
+              <a:buFontTx/>
+              <a:buNone/>
+              <a:tabLst/>
+              <a:defRPr/>
+            </a:pPr>
+            <a:r>
+              <a:rPr lang="en-US" b="0" dirty="0"/>
+              <a:t>Let see after critical changes, we can see we reduce main.css to 3 KB, there is only 13.8% of code we are not using.</a:t>
+            </a:r>
+          </a:p>
+          <a:p>
+            <a:pPr marL="0" marR="0" lvl="0" indent="0" algn="l" defTabSz="914400" rtl="0" eaLnBrk="1" fontAlgn="auto" latinLnBrk="0" hangingPunct="1">
+              <a:lnSpc>
+                <a:spcPct val="100000"/>
+              </a:lnSpc>
+              <a:spcBef>
+                <a:spcPts val="0"/>
+              </a:spcBef>
+              <a:spcAft>
+                <a:spcPts val="0"/>
+              </a:spcAft>
+              <a:buClrTx/>
+              <a:buSzTx/>
+              <a:buFontTx/>
+              <a:buNone/>
+              <a:tabLst/>
+              <a:defRPr/>
+            </a:pPr>
+            <a:endParaRPr lang="en-US" b="0" dirty="0"/>
+          </a:p>
+          <a:p>
+            <a:pPr marL="0" marR="0" lvl="0" indent="0" algn="l" defTabSz="914400" rtl="0" eaLnBrk="1" fontAlgn="auto" latinLnBrk="0" hangingPunct="1">
+              <a:lnSpc>
+                <a:spcPct val="100000"/>
+              </a:lnSpc>
+              <a:spcBef>
+                <a:spcPts val="0"/>
+              </a:spcBef>
+              <a:spcAft>
+                <a:spcPts val="0"/>
+              </a:spcAft>
+              <a:buClrTx/>
+              <a:buSzTx/>
+              <a:buFontTx/>
+              <a:buNone/>
+              <a:tabLst/>
+              <a:defRPr/>
+            </a:pPr>
+            <a:r>
+              <a:rPr lang="en-US" b="0" dirty="0"/>
+              <a:t>Now, these will take a lot of effort to do it </a:t>
+            </a:r>
+            <a:r>
+              <a:rPr lang="en-US" b="0" dirty="0" err="1"/>
+              <a:t>manully</a:t>
+            </a:r>
+            <a:r>
+              <a:rPr lang="en-US" b="0" dirty="0"/>
+              <a:t> but lucky for use we can automate this </a:t>
+            </a:r>
+            <a:r>
+              <a:rPr lang="en-US" sz="1200" b="0" i="0" kern="1200" dirty="0">
+                <a:solidFill>
+                  <a:schemeClr val="tx1"/>
+                </a:solidFill>
+                <a:effectLst/>
+                <a:latin typeface="+mn-lt"/>
+                <a:ea typeface="+mn-ea"/>
+                <a:cs typeface="+mn-cs"/>
+              </a:rPr>
+              <a:t>process by plugin</a:t>
+            </a:r>
+          </a:p>
+          <a:p>
+            <a:pPr marL="0" marR="0" lvl="0" indent="0" algn="l" defTabSz="914400" rtl="0" eaLnBrk="1" fontAlgn="auto" latinLnBrk="0" hangingPunct="1">
+              <a:lnSpc>
+                <a:spcPct val="100000"/>
+              </a:lnSpc>
+              <a:spcBef>
+                <a:spcPts val="0"/>
+              </a:spcBef>
+              <a:spcAft>
+                <a:spcPts val="0"/>
+              </a:spcAft>
+              <a:buClrTx/>
+              <a:buSzTx/>
+              <a:buFontTx/>
+              <a:buNone/>
+              <a:tabLst/>
+              <a:defRPr/>
+            </a:pPr>
+            <a:endParaRPr lang="en-US" b="0" dirty="0"/>
+          </a:p>
+          <a:p>
+            <a:pPr marL="0" marR="0" lvl="0" indent="0" algn="l" defTabSz="914400" rtl="0" eaLnBrk="1" fontAlgn="auto" latinLnBrk="0" hangingPunct="1">
+              <a:lnSpc>
+                <a:spcPct val="100000"/>
+              </a:lnSpc>
+              <a:spcBef>
+                <a:spcPts val="0"/>
+              </a:spcBef>
+              <a:spcAft>
+                <a:spcPts val="0"/>
+              </a:spcAft>
+              <a:buClrTx/>
+              <a:buSzTx/>
+              <a:buFontTx/>
+              <a:buNone/>
+              <a:tabLst/>
+              <a:defRPr/>
+            </a:pPr>
+            <a:r>
+              <a:rPr lang="en-US" b="0" dirty="0"/>
+              <a:t>critical – </a:t>
+            </a:r>
+            <a:r>
+              <a:rPr lang="en-US" sz="1200" b="0" i="0" kern="1200" dirty="0">
+                <a:solidFill>
+                  <a:schemeClr val="tx1"/>
+                </a:solidFill>
+                <a:effectLst/>
+                <a:latin typeface="+mn-lt"/>
+                <a:ea typeface="+mn-ea"/>
+                <a:cs typeface="+mn-cs"/>
+              </a:rPr>
+              <a:t>Node.js module </a:t>
+            </a:r>
+            <a:r>
+              <a:rPr lang="en-US" b="0" dirty="0"/>
+              <a:t>- </a:t>
+            </a:r>
+            <a:r>
+              <a:rPr lang="en-US" dirty="0">
+                <a:hlinkClick r:id="rId4"/>
+              </a:rPr>
+              <a:t>https://github.com/addyosmani/critical</a:t>
+            </a:r>
+            <a:endParaRPr lang="en-US" dirty="0"/>
+          </a:p>
+          <a:p>
+            <a:pPr marL="0" marR="0" lvl="0" indent="0" algn="l" defTabSz="914400" rtl="0" eaLnBrk="1" fontAlgn="auto" latinLnBrk="0" hangingPunct="1">
+              <a:lnSpc>
+                <a:spcPct val="100000"/>
+              </a:lnSpc>
+              <a:spcBef>
+                <a:spcPts val="0"/>
+              </a:spcBef>
+              <a:spcAft>
+                <a:spcPts val="0"/>
+              </a:spcAft>
+              <a:buClrTx/>
+              <a:buSzTx/>
+              <a:buFontTx/>
+              <a:buNone/>
+              <a:tabLst/>
+              <a:defRPr/>
+            </a:pPr>
+            <a:r>
+              <a:rPr lang="en-US" sz="1200" b="0" i="0" u="none" strike="noStrike" kern="1200" dirty="0">
+                <a:solidFill>
+                  <a:schemeClr val="tx1"/>
+                </a:solidFill>
+                <a:effectLst/>
+                <a:latin typeface="+mn-lt"/>
+                <a:ea typeface="+mn-ea"/>
+                <a:cs typeface="+mn-cs"/>
+                <a:hlinkClick r:id="rId5"/>
+              </a:rPr>
+              <a:t>HTML Critical Webpack Plugin</a:t>
+            </a:r>
+            <a:r>
+              <a:rPr lang="en-US" sz="1200" b="0" i="0" u="none" strike="noStrike" kern="1200" dirty="0">
+                <a:solidFill>
+                  <a:schemeClr val="tx1"/>
+                </a:solidFill>
+                <a:effectLst/>
+                <a:latin typeface="+mn-lt"/>
+                <a:ea typeface="+mn-ea"/>
+                <a:cs typeface="+mn-cs"/>
+              </a:rPr>
+              <a:t> - </a:t>
+            </a:r>
+            <a:r>
+              <a:rPr lang="en-US" sz="1200" b="0" i="0" kern="1200" dirty="0">
+                <a:solidFill>
+                  <a:schemeClr val="tx1"/>
+                </a:solidFill>
+                <a:effectLst/>
+                <a:latin typeface="+mn-lt"/>
+                <a:ea typeface="+mn-ea"/>
+                <a:cs typeface="+mn-cs"/>
+              </a:rPr>
+              <a:t>Webpack plugin - </a:t>
+            </a:r>
+            <a:r>
+              <a:rPr lang="en-US" dirty="0">
+                <a:hlinkClick r:id="rId5"/>
+              </a:rPr>
+              <a:t>https://github.com/anthonygore/html-critical-webpack-plugin</a:t>
+            </a:r>
+            <a:endParaRPr lang="en-US" sz="1200" b="0" i="0" kern="1200" dirty="0">
+              <a:solidFill>
+                <a:schemeClr val="tx1"/>
+              </a:solidFill>
+              <a:effectLst/>
+              <a:latin typeface="+mn-lt"/>
+              <a:ea typeface="+mn-ea"/>
+              <a:cs typeface="+mn-cs"/>
+            </a:endParaRPr>
+          </a:p>
+          <a:p>
+            <a:pPr marL="0" marR="0" lvl="0" indent="0" algn="l" defTabSz="914400" rtl="0" eaLnBrk="1" fontAlgn="auto" latinLnBrk="0" hangingPunct="1">
+              <a:lnSpc>
+                <a:spcPct val="100000"/>
+              </a:lnSpc>
+              <a:spcBef>
+                <a:spcPts val="0"/>
+              </a:spcBef>
+              <a:spcAft>
+                <a:spcPts val="0"/>
+              </a:spcAft>
+              <a:buClrTx/>
+              <a:buSzTx/>
+              <a:buFontTx/>
+              <a:buNone/>
+              <a:tabLst/>
+              <a:defRPr/>
+            </a:pPr>
+            <a:r>
+              <a:rPr lang="en-US" sz="1200" b="0" i="0" u="sng" kern="1200" dirty="0">
+                <a:solidFill>
+                  <a:schemeClr val="tx1"/>
+                </a:solidFill>
+                <a:effectLst/>
+                <a:latin typeface="+mn-lt"/>
+                <a:ea typeface="+mn-ea"/>
+                <a:cs typeface="+mn-cs"/>
+                <a:hlinkClick r:id="rId6"/>
+              </a:rPr>
+              <a:t>grunt-critical</a:t>
+            </a:r>
+            <a:r>
+              <a:rPr lang="en-US" b="0" dirty="0"/>
+              <a:t> - Grunt task - </a:t>
+            </a:r>
+            <a:r>
+              <a:rPr lang="en-US" dirty="0">
+                <a:hlinkClick r:id="rId6"/>
+              </a:rPr>
+              <a:t>https://github.com/bezoerb/grunt-critical</a:t>
+            </a:r>
+            <a:endParaRPr lang="en-US" b="0" dirty="0"/>
+          </a:p>
+          <a:p>
+            <a:pPr marL="0" marR="0" lvl="0" indent="0" algn="l" defTabSz="914400" rtl="0" eaLnBrk="1" fontAlgn="auto" latinLnBrk="0" hangingPunct="1">
+              <a:lnSpc>
+                <a:spcPct val="100000"/>
+              </a:lnSpc>
+              <a:spcBef>
+                <a:spcPts val="0"/>
+              </a:spcBef>
+              <a:spcAft>
+                <a:spcPts val="0"/>
+              </a:spcAft>
+              <a:buClrTx/>
+              <a:buSzTx/>
+              <a:buFontTx/>
+              <a:buNone/>
+              <a:tabLst/>
+              <a:defRPr/>
+            </a:pPr>
+            <a:endParaRPr lang="en-US" b="0" dirty="0"/>
+          </a:p>
+          <a:p>
             <a:pPr marL="171450" marR="0" lvl="0" indent="-171450" algn="l" defTabSz="914400" rtl="0" eaLnBrk="1" fontAlgn="auto" latinLnBrk="0" hangingPunct="1">
               <a:lnSpc>
                 <a:spcPct val="100000"/>
@@ -3974,7 +5120,7 @@
               <a:tabLst/>
               <a:defRPr/>
             </a:pPr>
-            <a:endParaRPr lang="en-US" b="0" dirty="0"/>
+            <a:endParaRPr lang="en-US" dirty="0"/>
           </a:p>
           <a:p>
             <a:pPr marL="171450" marR="0" lvl="0" indent="-171450" algn="l" defTabSz="914400" rtl="0" eaLnBrk="1" fontAlgn="auto" latinLnBrk="0" hangingPunct="1">
@@ -3994,6 +5140,12 @@
               <a:tabLst/>
               <a:defRPr/>
             </a:pPr>
+            <a:r>
+              <a:rPr lang="en-US" dirty="0">
+                <a:hlinkClick r:id="rId7"/>
+              </a:rPr>
+              <a:t>https://www.smashingmagazine.com/2015/08/understanding-critical-css/</a:t>
+            </a:r>
             <a:endParaRPr lang="en-US" dirty="0"/>
           </a:p>
           <a:p>
@@ -4016,9 +5168,9 @@
             </a:pPr>
             <a:r>
               <a:rPr lang="en-US" dirty="0">
-                <a:hlinkClick r:id="rId4"/>
-              </a:rPr>
-              <a:t>https://www.smashingmagazine.com/2015/08/understanding-critical-css/</a:t>
+                <a:hlinkClick r:id="rId8"/>
+              </a:rPr>
+              <a:t>https://github.com/addyosmani/critical-path-css-demo</a:t>
             </a:r>
             <a:endParaRPr lang="en-US" dirty="0"/>
           </a:p>
@@ -4044,7 +5196,59 @@
               <a:rPr lang="en-US" dirty="0">
                 <a:hlinkClick r:id="rId5"/>
               </a:rPr>
-              <a:t>https://github.com/addyosmani/critical-path-css-demo</a:t>
+              <a:t>https://github.com/anthonygore/html-critical-webpack-plugin</a:t>
+            </a:r>
+            <a:endParaRPr lang="en-US" dirty="0"/>
+          </a:p>
+          <a:p>
+            <a:pPr marL="171450" marR="0" lvl="0" indent="-171450" algn="l" defTabSz="914400" rtl="0" eaLnBrk="1" fontAlgn="auto" latinLnBrk="0" hangingPunct="1">
+              <a:lnSpc>
+                <a:spcPct val="100000"/>
+              </a:lnSpc>
+              <a:spcBef>
+                <a:spcPts val="0"/>
+              </a:spcBef>
+              <a:spcAft>
+                <a:spcPts val="0"/>
+              </a:spcAft>
+              <a:buClrTx/>
+              <a:buSzTx/>
+              <a:buFontTx/>
+              <a:buChar char="-"/>
+              <a:tabLst/>
+              <a:defRPr/>
+            </a:pPr>
+            <a:r>
+              <a:rPr lang="en-US" dirty="0">
+                <a:hlinkClick r:id="rId9"/>
+              </a:rPr>
+              <a:t>https://vuejsdevelopers.com/2017/07/24/critical-css-webpack/</a:t>
+            </a:r>
+            <a:endParaRPr lang="en-US" dirty="0"/>
+          </a:p>
+          <a:p>
+            <a:pPr marL="171450" marR="0" lvl="0" indent="-171450" algn="l" defTabSz="914400" rtl="0" eaLnBrk="1" fontAlgn="auto" latinLnBrk="0" hangingPunct="1">
+              <a:lnSpc>
+                <a:spcPct val="100000"/>
+              </a:lnSpc>
+              <a:spcBef>
+                <a:spcPts val="0"/>
+              </a:spcBef>
+              <a:spcAft>
+                <a:spcPts val="0"/>
+              </a:spcAft>
+              <a:buClrTx/>
+              <a:buSzTx/>
+              <a:buFontTx/>
+              <a:buChar char="-"/>
+              <a:tabLst/>
+              <a:defRPr/>
+            </a:pPr>
+            <a:r>
+              <a:rPr lang="en-US" dirty="0">
+                <a:hlinkClick r:id="rId4"/>
+              </a:rPr>
+              <a:t>https://github.com/addyosmani/critical</a:t>
             </a:r>
             <a:endParaRPr lang="en-US" dirty="0"/>
           </a:p>
@@ -4182,65 +5386,64 @@
             </a:endParaRPr>
           </a:p>
           <a:p>
-            <a:pPr algn="l" rtl="0"/>
-            <a:r>
-              <a:rPr lang="en-US" sz="1200" b="0" i="0" kern="1200" dirty="0">
-                <a:solidFill>
-                  <a:schemeClr val="tx1"/>
-                </a:solidFill>
-                <a:effectLst/>
-                <a:latin typeface="+mn-lt"/>
-                <a:ea typeface="+mn-ea"/>
-                <a:cs typeface="+mn-cs"/>
-              </a:rPr>
-              <a:t>If we have a really large CSS file and it takes a while to download, our users will end up waiting until the </a:t>
-            </a:r>
-            <a:r>
-              <a:rPr lang="en-US" sz="1200" b="0" i="1" kern="1200" dirty="0">
-                <a:solidFill>
-                  <a:schemeClr val="tx1"/>
-                </a:solidFill>
-                <a:effectLst/>
-                <a:latin typeface="+mn-lt"/>
-                <a:ea typeface="+mn-ea"/>
-                <a:cs typeface="+mn-cs"/>
-              </a:rPr>
-              <a:t>whole file</a:t>
-            </a:r>
-            <a:r>
-              <a:rPr lang="en-US" sz="1200" b="0" i="0" kern="1200" dirty="0">
-                <a:solidFill>
-                  <a:schemeClr val="tx1"/>
-                </a:solidFill>
-                <a:effectLst/>
-                <a:latin typeface="+mn-lt"/>
-                <a:ea typeface="+mn-ea"/>
-                <a:cs typeface="+mn-cs"/>
-              </a:rPr>
-              <a:t> has been downloaded before the browser can begin rendering the page. Fortunately, there is a sneaky technique that allows us to optimize the delivery of our CSS and mitigate the blocking. This technique is known as optimizing the </a:t>
-            </a:r>
-            <a:r>
-              <a:rPr lang="en-US" sz="1200" b="0" i="0" u="none" strike="noStrike" kern="1200" dirty="0">
-                <a:solidFill>
-                  <a:schemeClr val="tx1"/>
-                </a:solidFill>
-                <a:effectLst/>
-                <a:latin typeface="+mn-lt"/>
-                <a:ea typeface="+mn-ea"/>
-                <a:cs typeface="+mn-cs"/>
-                <a:hlinkClick r:id="rId3"/>
-              </a:rPr>
-              <a:t>critical rendering path.</a:t>
-            </a:r>
-            <a:endParaRPr lang="en-US" sz="1200" b="0" kern="1200" dirty="0">
-              <a:solidFill>
-                <a:schemeClr val="tx1"/>
-              </a:solidFill>
-              <a:effectLst/>
-              <a:latin typeface="+mn-lt"/>
-              <a:ea typeface="+mn-ea"/>
-              <a:cs typeface="+mn-cs"/>
-            </a:endParaRPr>
+            <a:pPr marL="0" marR="0" lvl="0" indent="0" algn="l" defTabSz="914400" rtl="0" eaLnBrk="1" fontAlgn="auto" latinLnBrk="0" hangingPunct="1">
+              <a:lnSpc>
+                <a:spcPct val="100000"/>
+              </a:lnSpc>
+              <a:spcBef>
+                <a:spcPts val="0"/>
+              </a:spcBef>
+              <a:spcAft>
+                <a:spcPts val="0"/>
+              </a:spcAft>
+              <a:buClrTx/>
+              <a:buSzTx/>
+              <a:buFontTx/>
+              <a:buNone/>
+              <a:tabLst/>
+              <a:defRPr/>
+            </a:pPr>
+            <a:endParaRPr lang="en-US" b="0" dirty="0"/>
+          </a:p>
+          <a:p>
+            <a:pPr marL="0" marR="0" lvl="0" indent="0" algn="l" defTabSz="914400" rtl="0" eaLnBrk="1" fontAlgn="auto" latinLnBrk="0" hangingPunct="1">
+              <a:lnSpc>
+                <a:spcPct val="100000"/>
+              </a:lnSpc>
+              <a:spcBef>
+                <a:spcPts val="0"/>
+              </a:spcBef>
+              <a:spcAft>
+                <a:spcPts val="0"/>
+              </a:spcAft>
+              <a:buClrTx/>
+              <a:buSzTx/>
+              <a:buFontTx/>
+              <a:buNone/>
+              <a:tabLst/>
+              <a:defRPr/>
+            </a:pPr>
+            <a:endParaRPr lang="en-US" b="0"/>
+          </a:p>
+          <a:p>
+            <a:pPr marL="0" marR="0" lvl="0" indent="0" algn="l" defTabSz="914400" rtl="0" eaLnBrk="1" fontAlgn="auto" latinLnBrk="0" hangingPunct="1">
+              <a:lnSpc>
+                <a:spcPct val="100000"/>
+              </a:lnSpc>
+              <a:spcBef>
+                <a:spcPts val="0"/>
+              </a:spcBef>
+              <a:spcAft>
+                <a:spcPts val="0"/>
+              </a:spcAft>
+              <a:buClrTx/>
+              <a:buSzTx/>
+              <a:buFontTx/>
+              <a:buNone/>
+              <a:tabLst/>
+              <a:defRPr/>
+            </a:pPr>
+            <a:endParaRPr lang="en-US" b="0" dirty="0"/>
           </a:p>
           <a:p>
             <a:pPr marL="171450" marR="0" lvl="0" indent="-171450" algn="l" defTabSz="914400" rtl="0" eaLnBrk="1" fontAlgn="auto" latinLnBrk="0" hangingPunct="1">
@@ -4260,7 +5463,7 @@
               <a:tabLst/>
               <a:defRPr/>
             </a:pPr>
-            <a:endParaRPr lang="en-US" b="0" dirty="0"/>
+            <a:endParaRPr lang="en-US" dirty="0"/>
           </a:p>
           <a:p>
             <a:pPr marL="171450" marR="0" lvl="0" indent="-171450" algn="l" defTabSz="914400" rtl="0" eaLnBrk="1" fontAlgn="auto" latinLnBrk="0" hangingPunct="1">
@@ -4280,29 +5483,9 @@
               <a:tabLst/>
               <a:defRPr/>
             </a:pPr>
-            <a:endParaRPr lang="en-US" dirty="0"/>
-          </a:p>
-          <a:p>
-            <a:pPr marL="171450" marR="0" lvl="0" indent="-171450" algn="l" defTabSz="914400" rtl="0" eaLnBrk="1" fontAlgn="auto" latinLnBrk="0" hangingPunct="1">
-              <a:lnSpc>
-                <a:spcPct val="100000"/>
-              </a:lnSpc>
-              <a:spcBef>
-                <a:spcPts val="0"/>
-              </a:spcBef>
-              <a:spcAft>
-                <a:spcPts val="0"/>
-              </a:spcAft>
-              <a:buClrTx/>
-              <a:buSzTx/>
-              <a:buFontTx/>
-              <a:buChar char="-"/>
-              <a:tabLst/>
-              <a:defRPr/>
-            </a:pPr>
             <a:r>
               <a:rPr lang="en-US" dirty="0">
-                <a:hlinkClick r:id="rId4"/>
+                <a:hlinkClick r:id="rId3"/>
               </a:rPr>
               <a:t>https://freecontent.manning.com/tag/http-2-in-action/</a:t>
             </a:r>
@@ -4495,7 +5678,7 @@
           <a:p>
             <a:fld id="{F472E424-CC75-4448-A1B5-6FCA6BFEE599}" type="datetimeFigureOut">
               <a:rPr lang="he-IL" smtClean="0"/>
-              <a:t>י"א/תמוז/תשע"ט</a:t>
+              <a:t>י"ב/תמוז/תשע"ט</a:t>
             </a:fld>
             <a:endParaRPr lang="he-IL"/>
           </a:p>
@@ -4663,7 +5846,7 @@
           <a:p>
             <a:fld id="{F472E424-CC75-4448-A1B5-6FCA6BFEE599}" type="datetimeFigureOut">
               <a:rPr lang="he-IL" smtClean="0"/>
-              <a:t>י"א/תמוז/תשע"ט</a:t>
+              <a:t>י"ב/תמוז/תשע"ט</a:t>
             </a:fld>
             <a:endParaRPr lang="he-IL"/>
           </a:p>
@@ -4841,7 +6024,7 @@
           <a:p>
             <a:fld id="{F472E424-CC75-4448-A1B5-6FCA6BFEE599}" type="datetimeFigureOut">
               <a:rPr lang="he-IL" smtClean="0"/>
-              <a:t>י"א/תמוז/תשע"ט</a:t>
+              <a:t>י"ב/תמוז/תשע"ט</a:t>
             </a:fld>
             <a:endParaRPr lang="he-IL"/>
           </a:p>
@@ -5009,7 +6192,7 @@
           <a:p>
             <a:fld id="{F472E424-CC75-4448-A1B5-6FCA6BFEE599}" type="datetimeFigureOut">
               <a:rPr lang="he-IL" smtClean="0"/>
-              <a:t>י"א/תמוז/תשע"ט</a:t>
+              <a:t>י"ב/תמוז/תשע"ט</a:t>
             </a:fld>
             <a:endParaRPr lang="he-IL"/>
           </a:p>
@@ -5254,7 +6437,7 @@
           <a:p>
             <a:fld id="{F472E424-CC75-4448-A1B5-6FCA6BFEE599}" type="datetimeFigureOut">
               <a:rPr lang="he-IL" smtClean="0"/>
-              <a:t>י"א/תמוז/תשע"ט</a:t>
+              <a:t>י"ב/תמוז/תשע"ט</a:t>
             </a:fld>
             <a:endParaRPr lang="he-IL"/>
           </a:p>
@@ -5483,7 +6666,7 @@
           <a:p>
             <a:fld id="{F472E424-CC75-4448-A1B5-6FCA6BFEE599}" type="datetimeFigureOut">
               <a:rPr lang="he-IL" smtClean="0"/>
-              <a:t>י"א/תמוז/תשע"ט</a:t>
+              <a:t>י"ב/תמוז/תשע"ט</a:t>
             </a:fld>
             <a:endParaRPr lang="he-IL"/>
           </a:p>
@@ -5847,7 +7030,7 @@
           <a:p>
             <a:fld id="{F472E424-CC75-4448-A1B5-6FCA6BFEE599}" type="datetimeFigureOut">
               <a:rPr lang="he-IL" smtClean="0"/>
-              <a:t>י"א/תמוז/תשע"ט</a:t>
+              <a:t>י"ב/תמוז/תשע"ט</a:t>
             </a:fld>
             <a:endParaRPr lang="he-IL"/>
           </a:p>
@@ -5964,7 +7147,7 @@
           <a:p>
             <a:fld id="{F472E424-CC75-4448-A1B5-6FCA6BFEE599}" type="datetimeFigureOut">
               <a:rPr lang="he-IL" smtClean="0"/>
-              <a:t>י"א/תמוז/תשע"ט</a:t>
+              <a:t>י"ב/תמוז/תשע"ט</a:t>
             </a:fld>
             <a:endParaRPr lang="he-IL"/>
           </a:p>
@@ -6059,7 +7242,7 @@
           <a:p>
             <a:fld id="{F472E424-CC75-4448-A1B5-6FCA6BFEE599}" type="datetimeFigureOut">
               <a:rPr lang="he-IL" smtClean="0"/>
-              <a:t>י"א/תמוז/תשע"ט</a:t>
+              <a:t>י"ב/תמוז/תשע"ט</a:t>
             </a:fld>
             <a:endParaRPr lang="he-IL"/>
           </a:p>
@@ -6334,7 +7517,7 @@
           <a:p>
             <a:fld id="{F472E424-CC75-4448-A1B5-6FCA6BFEE599}" type="datetimeFigureOut">
               <a:rPr lang="he-IL" smtClean="0"/>
-              <a:t>י"א/תמוז/תשע"ט</a:t>
+              <a:t>י"ב/תמוז/תשע"ט</a:t>
             </a:fld>
             <a:endParaRPr lang="he-IL"/>
           </a:p>
@@ -6586,7 +7769,7 @@
           <a:p>
             <a:fld id="{F472E424-CC75-4448-A1B5-6FCA6BFEE599}" type="datetimeFigureOut">
               <a:rPr lang="he-IL" smtClean="0"/>
-              <a:t>י"א/תמוז/תשע"ט</a:t>
+              <a:t>י"ב/תמוז/תשע"ט</a:t>
             </a:fld>
             <a:endParaRPr lang="he-IL"/>
           </a:p>
@@ -6797,7 +7980,7 @@
           <a:p>
             <a:fld id="{F472E424-CC75-4448-A1B5-6FCA6BFEE599}" type="datetimeFigureOut">
               <a:rPr lang="he-IL" smtClean="0"/>
-              <a:t>י"א/תמוז/תשע"ט</a:t>
+              <a:t>י"ב/תמוז/תשע"ט</a:t>
             </a:fld>
             <a:endParaRPr lang="he-IL"/>
           </a:p>

</xml_diff>

<commit_message>
Add Resource Hints slide
</commit_message>
<xml_diff>
--- a/presentations/chapter-7/Practical Web Dev.pptx
+++ b/presentations/chapter-7/Practical Web Dev.pptx
@@ -5,7 +5,7 @@
     <p:sldMasterId id="2147483648" r:id="rId1"/>
   </p:sldMasterIdLst>
   <p:notesMasterIdLst>
-    <p:notesMasterId r:id="rId10"/>
+    <p:notesMasterId r:id="rId11"/>
   </p:notesMasterIdLst>
   <p:sldIdLst>
     <p:sldId id="408" r:id="rId2"/>
@@ -16,6 +16,7 @@
     <p:sldId id="413" r:id="rId7"/>
     <p:sldId id="414" r:id="rId8"/>
     <p:sldId id="415" r:id="rId9"/>
+    <p:sldId id="416" r:id="rId10"/>
   </p:sldIdLst>
   <p:sldSz cx="12192000" cy="6858000"/>
   <p:notesSz cx="6858000" cy="9144000"/>
@@ -130,6 +131,7 @@
             <p14:sldId id="413"/>
             <p14:sldId id="414"/>
             <p14:sldId id="415"/>
+            <p14:sldId id="416"/>
           </p14:sldIdLst>
         </p14:section>
       </p14:sectionLst>
@@ -234,7 +236,7 @@
           <a:p>
             <a:fld id="{B53C1D94-E0DD-4250-8C1B-3D8C3DA9B2B6}" type="datetimeFigureOut">
               <a:rPr lang="he-IL" smtClean="0"/>
-              <a:t>י"ד/תמוז/תשע"ט</a:t>
+              <a:t>ט"ו/תמוז/תשע"ט</a:t>
             </a:fld>
             <a:endParaRPr lang="he-IL"/>
           </a:p>
@@ -6853,6 +6855,2160 @@
 </p:notes>
 </file>
 
+<file path=ppt/notesSlides/notesSlide9.xml><?xml version="1.0" encoding="utf-8"?>
+<p:notes xmlns:a="http://schemas.openxmlformats.org/drawingml/2006/main" xmlns:r="http://schemas.openxmlformats.org/officeDocument/2006/relationships" xmlns:p="http://schemas.openxmlformats.org/presentationml/2006/main">
+  <p:cSld>
+    <p:spTree>
+      <p:nvGrpSpPr>
+        <p:cNvPr id="1" name=""/>
+        <p:cNvGrpSpPr/>
+        <p:nvPr/>
+      </p:nvGrpSpPr>
+      <p:grpSpPr>
+        <a:xfrm>
+          <a:off x="0" y="0"/>
+          <a:ext cx="0" cy="0"/>
+          <a:chOff x="0" y="0"/>
+          <a:chExt cx="0" cy="0"/>
+        </a:xfrm>
+      </p:grpSpPr>
+      <p:sp>
+        <p:nvSpPr>
+          <p:cNvPr id="2" name="Slide Image Placeholder 1"/>
+          <p:cNvSpPr>
+            <a:spLocks noGrp="1" noRot="1" noChangeAspect="1"/>
+          </p:cNvSpPr>
+          <p:nvPr>
+            <p:ph type="sldImg"/>
+          </p:nvPr>
+        </p:nvSpPr>
+        <p:spPr/>
+      </p:sp>
+      <p:sp>
+        <p:nvSpPr>
+          <p:cNvPr id="3" name="Notes Placeholder 2"/>
+          <p:cNvSpPr>
+            <a:spLocks noGrp="1"/>
+          </p:cNvSpPr>
+          <p:nvPr>
+            <p:ph type="body" idx="1"/>
+          </p:nvPr>
+        </p:nvSpPr>
+        <p:spPr/>
+        <p:txBody>
+          <a:bodyPr/>
+          <a:lstStyle/>
+          <a:p>
+            <a:pPr marL="171450" marR="0" lvl="0" indent="-171450" algn="l" defTabSz="914400" rtl="0" eaLnBrk="1" fontAlgn="auto" latinLnBrk="0" hangingPunct="1">
+              <a:lnSpc>
+                <a:spcPct val="100000"/>
+              </a:lnSpc>
+              <a:spcBef>
+                <a:spcPts val="0"/>
+              </a:spcBef>
+              <a:spcAft>
+                <a:spcPts val="0"/>
+              </a:spcAft>
+              <a:buClrTx/>
+              <a:buSzTx/>
+              <a:buFontTx/>
+              <a:buChar char="-"/>
+              <a:tabLst/>
+              <a:defRPr/>
+            </a:pPr>
+            <a:r>
+              <a:rPr lang="en-US" b="0" dirty="0"/>
+              <a:t>show images of request from </a:t>
+            </a:r>
+            <a:r>
+              <a:rPr lang="en-US" b="0" dirty="0" err="1"/>
+              <a:t>yoav</a:t>
+            </a:r>
+            <a:r>
+              <a:rPr lang="en-US" b="0" dirty="0"/>
+              <a:t> website (speedup) </a:t>
+            </a:r>
+          </a:p>
+          <a:p>
+            <a:pPr marL="171450" marR="0" lvl="0" indent="-171450" algn="l" defTabSz="914400" rtl="0" eaLnBrk="1" fontAlgn="auto" latinLnBrk="0" hangingPunct="1">
+              <a:lnSpc>
+                <a:spcPct val="100000"/>
+              </a:lnSpc>
+              <a:spcBef>
+                <a:spcPts val="0"/>
+              </a:spcBef>
+              <a:spcAft>
+                <a:spcPts val="0"/>
+              </a:spcAft>
+              <a:buClrTx/>
+              <a:buSzTx/>
+              <a:buFontTx/>
+              <a:buChar char="-"/>
+              <a:tabLst/>
+              <a:defRPr/>
+            </a:pPr>
+            <a:r>
+              <a:rPr lang="en-US" b="0" dirty="0"/>
+              <a:t>Responsive </a:t>
+            </a:r>
+            <a:r>
+              <a:rPr lang="en-US" b="0" dirty="0" err="1"/>
+              <a:t>withmedia</a:t>
+            </a:r>
+            <a:endParaRPr lang="en-US" b="0" dirty="0"/>
+          </a:p>
+          <a:p>
+            <a:pPr marL="171450" marR="0" lvl="0" indent="-171450" algn="l" defTabSz="914400" rtl="0" eaLnBrk="1" fontAlgn="auto" latinLnBrk="0" hangingPunct="1">
+              <a:lnSpc>
+                <a:spcPct val="100000"/>
+              </a:lnSpc>
+              <a:spcBef>
+                <a:spcPts val="0"/>
+              </a:spcBef>
+              <a:spcAft>
+                <a:spcPts val="0"/>
+              </a:spcAft>
+              <a:buClrTx/>
+              <a:buSzTx/>
+              <a:buFontTx/>
+              <a:buChar char="-"/>
+              <a:tabLst/>
+              <a:defRPr/>
+            </a:pPr>
+            <a:endParaRPr lang="en-US" b="0" dirty="0"/>
+          </a:p>
+          <a:p>
+            <a:pPr marL="171450" marR="0" lvl="0" indent="-171450" algn="l" defTabSz="914400" rtl="0" eaLnBrk="1" fontAlgn="auto" latinLnBrk="0" hangingPunct="1">
+              <a:lnSpc>
+                <a:spcPct val="100000"/>
+              </a:lnSpc>
+              <a:spcBef>
+                <a:spcPts val="0"/>
+              </a:spcBef>
+              <a:spcAft>
+                <a:spcPts val="0"/>
+              </a:spcAft>
+              <a:buClrTx/>
+              <a:buSzTx/>
+              <a:buFontTx/>
+              <a:buChar char="-"/>
+              <a:tabLst/>
+              <a:defRPr/>
+            </a:pPr>
+            <a:endParaRPr lang="en-US" b="0" dirty="0"/>
+          </a:p>
+          <a:p>
+            <a:pPr marL="171450" marR="0" lvl="0" indent="-171450" algn="l" defTabSz="914400" rtl="0" eaLnBrk="1" fontAlgn="auto" latinLnBrk="0" hangingPunct="1">
+              <a:lnSpc>
+                <a:spcPct val="100000"/>
+              </a:lnSpc>
+              <a:spcBef>
+                <a:spcPts val="0"/>
+              </a:spcBef>
+              <a:spcAft>
+                <a:spcPts val="0"/>
+              </a:spcAft>
+              <a:buClrTx/>
+              <a:buSzTx/>
+              <a:buFontTx/>
+              <a:buChar char="-"/>
+              <a:tabLst/>
+              <a:defRPr/>
+            </a:pPr>
+            <a:r>
+              <a:rPr lang="en-US" dirty="0"/>
+              <a:t>Http Making a Connection – Each request doing the following roundtrip, take a look at the colors:</a:t>
+            </a:r>
+            <a:br>
+              <a:rPr lang="en-US" dirty="0"/>
+            </a:br>
+            <a:r>
+              <a:rPr lang="en-US" b="1" dirty="0"/>
+              <a:t>DNS lookup</a:t>
+            </a:r>
+            <a:r>
+              <a:rPr lang="en-US" dirty="0"/>
+              <a:t> - First we need to know where to make the connection to so we are doing DNS lookup – to know the IP of the host.</a:t>
+            </a:r>
+            <a:br>
+              <a:rPr lang="en-US" dirty="0"/>
+            </a:br>
+            <a:br>
+              <a:rPr lang="en-US" dirty="0"/>
+            </a:br>
+            <a:r>
+              <a:rPr lang="en-US" b="1" dirty="0"/>
+              <a:t>TCP handshake</a:t>
+            </a:r>
+            <a:r>
+              <a:rPr lang="en-US" dirty="0"/>
+              <a:t> - Second we need to do TCP handshake - http is using TCP as transport layer to transfer the request and the response, handshake is how TCP setup connection (initiate it).</a:t>
+            </a:r>
+            <a:br>
+              <a:rPr lang="en-US" dirty="0"/>
+            </a:br>
+            <a:r>
+              <a:rPr lang="en-US" dirty="0"/>
+              <a:t>(</a:t>
+            </a:r>
+            <a:r>
+              <a:rPr lang="en-US" sz="1200" b="0" i="0" kern="1200" dirty="0">
+                <a:solidFill>
+                  <a:schemeClr val="tx1"/>
+                </a:solidFill>
+                <a:effectLst/>
+                <a:latin typeface="+mn-lt"/>
+                <a:ea typeface="+mn-ea"/>
+                <a:cs typeface="+mn-cs"/>
+              </a:rPr>
+              <a:t>TCP provides a guarantee that an entire file or document gets transferred correctly. It splits up the document into little packets and makes sure each packet gets across the network in an orderly fashion so the packets can be re-assembled into the original file. Compare this to UDP where your packets can arrive in any order and some may not arrive at all. Makes it pretty difficult to transfer a big document.</a:t>
+            </a:r>
+            <a:br>
+              <a:rPr lang="en-US" sz="1200" b="0" i="0" kern="1200" dirty="0">
+                <a:solidFill>
+                  <a:schemeClr val="tx1"/>
+                </a:solidFill>
+                <a:effectLst/>
+                <a:latin typeface="+mn-lt"/>
+                <a:ea typeface="+mn-ea"/>
+                <a:cs typeface="+mn-cs"/>
+              </a:rPr>
+            </a:br>
+            <a:br>
+              <a:rPr lang="en-US" sz="1200" b="0" i="0" kern="1200" dirty="0">
+                <a:solidFill>
+                  <a:schemeClr val="tx1"/>
+                </a:solidFill>
+                <a:effectLst/>
+                <a:latin typeface="+mn-lt"/>
+                <a:ea typeface="+mn-ea"/>
+                <a:cs typeface="+mn-cs"/>
+              </a:rPr>
+            </a:br>
+            <a:r>
+              <a:rPr lang="en-US" sz="1200" b="0" i="0" kern="1200" dirty="0">
+                <a:solidFill>
+                  <a:schemeClr val="tx1"/>
+                </a:solidFill>
+                <a:effectLst/>
+                <a:latin typeface="+mn-lt"/>
+                <a:ea typeface="+mn-ea"/>
+                <a:cs typeface="+mn-cs"/>
+              </a:rPr>
+              <a:t>HTTP is a protocol for transferring files over the internet. It sits on top of TCP and transfers files etc. along with metadata. HTTP requests are sent using TCP, and the server sends back it’s response (usually an HTML file) using TCP as well. It uses TCP to ensure that the entire request gets to the client or server intact.)</a:t>
+            </a:r>
+            <a:br>
+              <a:rPr lang="en-US" sz="1200" b="0" i="0" kern="1200" dirty="0">
+                <a:solidFill>
+                  <a:schemeClr val="tx1"/>
+                </a:solidFill>
+                <a:effectLst/>
+                <a:latin typeface="+mn-lt"/>
+                <a:ea typeface="+mn-ea"/>
+                <a:cs typeface="+mn-cs"/>
+              </a:rPr>
+            </a:br>
+            <a:br>
+              <a:rPr lang="en-US" sz="1200" b="0" i="0" kern="1200" dirty="0">
+                <a:solidFill>
+                  <a:schemeClr val="tx1"/>
+                </a:solidFill>
+                <a:effectLst/>
+                <a:latin typeface="+mn-lt"/>
+                <a:ea typeface="+mn-ea"/>
+                <a:cs typeface="+mn-cs"/>
+              </a:rPr>
+            </a:br>
+            <a:r>
+              <a:rPr lang="en-US" b="1" dirty="0"/>
+              <a:t>TLS/SSL handshake</a:t>
+            </a:r>
+            <a:r>
+              <a:rPr lang="en-US" dirty="0"/>
+              <a:t> - Last we need to do TLS/SSL handshake – We will setup our secure connection via TLS/SSL.</a:t>
+            </a:r>
+            <a:br>
+              <a:rPr lang="en-US" dirty="0"/>
+            </a:br>
+            <a:r>
+              <a:rPr lang="en-US" dirty="0"/>
+              <a:t>(</a:t>
+            </a:r>
+            <a:r>
+              <a:rPr lang="en-US" sz="1200" b="0" i="0" kern="1200" dirty="0">
+                <a:solidFill>
+                  <a:schemeClr val="tx1"/>
+                </a:solidFill>
+                <a:effectLst/>
+                <a:latin typeface="+mn-lt"/>
+                <a:ea typeface="+mn-ea"/>
+                <a:cs typeface="+mn-cs"/>
+              </a:rPr>
+              <a:t>Every SSL/TLS connection begins with a </a:t>
+            </a:r>
+            <a:r>
+              <a:rPr lang="en-US" sz="1200" b="1" i="0" kern="1200" dirty="0">
+                <a:solidFill>
+                  <a:schemeClr val="tx1"/>
+                </a:solidFill>
+                <a:effectLst/>
+                <a:latin typeface="+mn-lt"/>
+                <a:ea typeface="+mn-ea"/>
+                <a:cs typeface="+mn-cs"/>
+              </a:rPr>
+              <a:t>“handshake”</a:t>
+            </a:r>
+            <a:r>
+              <a:rPr lang="en-US" sz="1200" b="0" i="0" kern="1200" dirty="0">
+                <a:solidFill>
+                  <a:schemeClr val="tx1"/>
+                </a:solidFill>
+                <a:effectLst/>
+                <a:latin typeface="+mn-lt"/>
+                <a:ea typeface="+mn-ea"/>
+                <a:cs typeface="+mn-cs"/>
+              </a:rPr>
+              <a:t> – the negotiation between two parties that nails down the details of how they’ll proceed. The handshake determines what </a:t>
+            </a:r>
+            <a:r>
+              <a:rPr lang="en-US" sz="1200" b="1" i="0" kern="1200" dirty="0">
+                <a:solidFill>
+                  <a:schemeClr val="tx1"/>
+                </a:solidFill>
+                <a:effectLst/>
+                <a:latin typeface="+mn-lt"/>
+                <a:ea typeface="+mn-ea"/>
+                <a:cs typeface="+mn-cs"/>
+              </a:rPr>
+              <a:t>cipher suite</a:t>
+            </a:r>
+            <a:r>
+              <a:rPr lang="en-US" sz="1200" b="0" i="0" kern="1200" dirty="0">
+                <a:solidFill>
+                  <a:schemeClr val="tx1"/>
+                </a:solidFill>
+                <a:effectLst/>
+                <a:latin typeface="+mn-lt"/>
+                <a:ea typeface="+mn-ea"/>
+                <a:cs typeface="+mn-cs"/>
+              </a:rPr>
+              <a:t> will be used to encrypt their communications, verifies the server, and establishes that a secure connection is in place before beginning the actual transfer of data. This all happens in the background, thankfully – every time you direct your browser to a secure site a complex interaction takes place to make sure that your data is safe.</a:t>
+            </a:r>
+            <a:r>
+              <a:rPr lang="en-US" dirty="0"/>
+              <a:t>)</a:t>
+            </a:r>
+            <a:br>
+              <a:rPr lang="en-US" dirty="0"/>
+            </a:br>
+            <a:br>
+              <a:rPr lang="en-US" dirty="0"/>
+            </a:br>
+            <a:r>
+              <a:rPr lang="en-US" dirty="0"/>
+              <a:t>Request (Wait) – the browser send the request.</a:t>
+            </a:r>
+            <a:br>
+              <a:rPr lang="en-US" dirty="0"/>
+            </a:br>
+            <a:br>
+              <a:rPr lang="en-US" dirty="0"/>
+            </a:br>
+            <a:r>
+              <a:rPr lang="en-US" dirty="0"/>
+              <a:t>Response (Data Transfer) – response arrive</a:t>
+            </a:r>
+          </a:p>
+          <a:p>
+            <a:pPr marL="171450" marR="0" lvl="0" indent="-171450" algn="l" defTabSz="914400" rtl="0" eaLnBrk="1" fontAlgn="auto" latinLnBrk="0" hangingPunct="1">
+              <a:lnSpc>
+                <a:spcPct val="100000"/>
+              </a:lnSpc>
+              <a:spcBef>
+                <a:spcPts val="0"/>
+              </a:spcBef>
+              <a:spcAft>
+                <a:spcPts val="0"/>
+              </a:spcAft>
+              <a:buClrTx/>
+              <a:buSzTx/>
+              <a:buFontTx/>
+              <a:buChar char="-"/>
+              <a:tabLst/>
+              <a:defRPr/>
+            </a:pPr>
+            <a:endParaRPr lang="en-US" b="0" dirty="0"/>
+          </a:p>
+          <a:p>
+            <a:pPr marL="171450" marR="0" lvl="0" indent="-171450" algn="l" defTabSz="914400" rtl="0" eaLnBrk="1" fontAlgn="auto" latinLnBrk="0" hangingPunct="1">
+              <a:lnSpc>
+                <a:spcPct val="100000"/>
+              </a:lnSpc>
+              <a:spcBef>
+                <a:spcPts val="0"/>
+              </a:spcBef>
+              <a:spcAft>
+                <a:spcPts val="0"/>
+              </a:spcAft>
+              <a:buClrTx/>
+              <a:buSzTx/>
+              <a:buFontTx/>
+              <a:buChar char="-"/>
+              <a:tabLst/>
+              <a:defRPr/>
+            </a:pPr>
+            <a:r>
+              <a:rPr lang="en-US" b="0" dirty="0"/>
+              <a:t>When we will open chrome </a:t>
+            </a:r>
+            <a:r>
+              <a:rPr lang="en-US" b="0" dirty="0" err="1"/>
+              <a:t>devtool</a:t>
+            </a:r>
+            <a:r>
+              <a:rPr lang="en-US" b="0" dirty="0"/>
+              <a:t> we can see under network tab the waterfall, when we will hover it we will see the </a:t>
+            </a:r>
+            <a:r>
+              <a:rPr lang="en-US" sz="1200" b="0" i="0" kern="1200" dirty="0">
+                <a:solidFill>
+                  <a:schemeClr val="tx1"/>
+                </a:solidFill>
+                <a:effectLst/>
+                <a:latin typeface="+mn-lt"/>
+                <a:ea typeface="+mn-ea"/>
+                <a:cs typeface="+mn-cs"/>
+              </a:rPr>
+              <a:t>measurements. It will looks like the following image.</a:t>
+            </a:r>
+            <a:br>
+              <a:rPr lang="en-US" sz="1200" b="0" i="0" kern="1200" dirty="0">
+                <a:solidFill>
+                  <a:schemeClr val="tx1"/>
+                </a:solidFill>
+                <a:effectLst/>
+                <a:latin typeface="+mn-lt"/>
+                <a:ea typeface="+mn-ea"/>
+                <a:cs typeface="+mn-cs"/>
+              </a:rPr>
+            </a:br>
+            <a:endParaRPr lang="en-US" sz="1200" b="0" i="0" kern="1200" dirty="0">
+              <a:solidFill>
+                <a:schemeClr val="tx1"/>
+              </a:solidFill>
+              <a:effectLst/>
+              <a:latin typeface="+mn-lt"/>
+              <a:ea typeface="+mn-ea"/>
+              <a:cs typeface="+mn-cs"/>
+            </a:endParaRPr>
+          </a:p>
+          <a:p>
+            <a:pPr marL="171450" marR="0" lvl="0" indent="-171450" algn="l" defTabSz="914400" rtl="0" eaLnBrk="1" fontAlgn="auto" latinLnBrk="0" hangingPunct="1">
+              <a:lnSpc>
+                <a:spcPct val="100000"/>
+              </a:lnSpc>
+              <a:spcBef>
+                <a:spcPts val="0"/>
+              </a:spcBef>
+              <a:spcAft>
+                <a:spcPts val="0"/>
+              </a:spcAft>
+              <a:buClrTx/>
+              <a:buSzTx/>
+              <a:buFontTx/>
+              <a:buChar char="-"/>
+              <a:tabLst/>
+              <a:defRPr/>
+            </a:pPr>
+            <a:r>
+              <a:rPr lang="en-US" sz="1200" b="0" i="0" kern="1200" dirty="0">
+                <a:solidFill>
+                  <a:schemeClr val="tx1"/>
+                </a:solidFill>
+                <a:effectLst/>
+                <a:latin typeface="+mn-lt"/>
+                <a:ea typeface="+mn-ea"/>
+                <a:cs typeface="+mn-cs"/>
+              </a:rPr>
+              <a:t>When we are talking about optimization and performance we can help the browser to reduce some of this trip.</a:t>
+            </a:r>
+            <a:br>
+              <a:rPr lang="en-US" sz="1200" b="0" i="0" kern="1200" dirty="0">
+                <a:solidFill>
+                  <a:schemeClr val="tx1"/>
+                </a:solidFill>
+                <a:effectLst/>
+                <a:latin typeface="+mn-lt"/>
+                <a:ea typeface="+mn-ea"/>
+                <a:cs typeface="+mn-cs"/>
+              </a:rPr>
+            </a:br>
+            <a:r>
+              <a:rPr lang="en-US" sz="1200" b="0" i="0" kern="1200" dirty="0">
+                <a:solidFill>
+                  <a:schemeClr val="tx1"/>
+                </a:solidFill>
+                <a:effectLst/>
+                <a:latin typeface="+mn-lt"/>
+                <a:ea typeface="+mn-ea"/>
+                <a:cs typeface="+mn-cs"/>
+              </a:rPr>
+              <a:t>This where resource hints kicks in, it’s basically a way of predictive caching.</a:t>
+            </a:r>
+            <a:br>
+              <a:rPr lang="en-US" sz="1200" b="0" i="0" kern="1200" dirty="0">
+                <a:solidFill>
+                  <a:schemeClr val="tx1"/>
+                </a:solidFill>
+                <a:effectLst/>
+                <a:latin typeface="+mn-lt"/>
+                <a:ea typeface="+mn-ea"/>
+                <a:cs typeface="+mn-cs"/>
+              </a:rPr>
+            </a:br>
+            <a:r>
+              <a:rPr lang="en-US" sz="1200" b="0" i="0" kern="1200" dirty="0">
+                <a:solidFill>
+                  <a:schemeClr val="tx1"/>
+                </a:solidFill>
+                <a:effectLst/>
+                <a:latin typeface="+mn-lt"/>
+                <a:ea typeface="+mn-ea"/>
+                <a:cs typeface="+mn-cs"/>
+              </a:rPr>
+              <a:t>Resource hints allow developers point the browser for resources such as scripts, CSS, images etc. before the browser can know it will need it but we know it will need it.</a:t>
+            </a:r>
+            <a:br>
+              <a:rPr lang="en-US" sz="1200" b="0" i="0" kern="1200" dirty="0">
+                <a:solidFill>
+                  <a:schemeClr val="tx1"/>
+                </a:solidFill>
+                <a:effectLst/>
+                <a:latin typeface="+mn-lt"/>
+                <a:ea typeface="+mn-ea"/>
+                <a:cs typeface="+mn-cs"/>
+              </a:rPr>
+            </a:br>
+            <a:r>
+              <a:rPr lang="en-US" sz="1200" b="0" i="0" kern="1200" dirty="0">
+                <a:solidFill>
+                  <a:schemeClr val="tx1"/>
+                </a:solidFill>
+                <a:effectLst/>
+                <a:latin typeface="+mn-lt"/>
+                <a:ea typeface="+mn-ea"/>
+                <a:cs typeface="+mn-cs"/>
+              </a:rPr>
+              <a:t>Now let’s see what we have:</a:t>
+            </a:r>
+            <a:br>
+              <a:rPr lang="en-US" sz="1200" b="0" i="0" kern="1200" dirty="0">
+                <a:solidFill>
+                  <a:schemeClr val="tx1"/>
+                </a:solidFill>
+                <a:effectLst/>
+                <a:latin typeface="+mn-lt"/>
+                <a:ea typeface="+mn-ea"/>
+                <a:cs typeface="+mn-cs"/>
+              </a:rPr>
+            </a:br>
+            <a:endParaRPr lang="en-US" sz="1200" b="0" i="0" kern="1200" dirty="0">
+              <a:solidFill>
+                <a:schemeClr val="tx1"/>
+              </a:solidFill>
+              <a:effectLst/>
+              <a:latin typeface="+mn-lt"/>
+              <a:ea typeface="+mn-ea"/>
+              <a:cs typeface="+mn-cs"/>
+            </a:endParaRPr>
+          </a:p>
+          <a:p>
+            <a:pPr marL="171450" marR="0" lvl="0" indent="-171450" algn="l" defTabSz="914400" rtl="0" eaLnBrk="1" fontAlgn="auto" latinLnBrk="0" hangingPunct="1">
+              <a:lnSpc>
+                <a:spcPct val="100000"/>
+              </a:lnSpc>
+              <a:spcBef>
+                <a:spcPts val="0"/>
+              </a:spcBef>
+              <a:spcAft>
+                <a:spcPts val="0"/>
+              </a:spcAft>
+              <a:buClrTx/>
+              <a:buSzTx/>
+              <a:buFontTx/>
+              <a:buChar char="-"/>
+              <a:tabLst/>
+              <a:defRPr/>
+            </a:pPr>
+            <a:r>
+              <a:rPr lang="en-US" sz="1200" b="1" i="0" kern="1200" dirty="0">
+                <a:solidFill>
+                  <a:schemeClr val="tx1"/>
+                </a:solidFill>
+                <a:effectLst/>
+                <a:latin typeface="+mn-lt"/>
+                <a:ea typeface="+mn-ea"/>
+                <a:cs typeface="+mn-cs"/>
+              </a:rPr>
+              <a:t>DNS Prefetching </a:t>
+            </a:r>
+            <a:r>
+              <a:rPr lang="en-US" sz="1200" b="0" i="0" kern="1200" dirty="0">
+                <a:solidFill>
+                  <a:schemeClr val="tx1"/>
+                </a:solidFill>
+                <a:effectLst/>
+                <a:latin typeface="+mn-lt"/>
+                <a:ea typeface="+mn-ea"/>
+                <a:cs typeface="+mn-cs"/>
+              </a:rPr>
+              <a:t>-  the browser will perform DNS lookups on a page in the background while the user is browsing.</a:t>
+            </a:r>
+            <a:br>
+              <a:rPr lang="en-US" sz="1200" b="0" i="0" kern="1200" dirty="0">
+                <a:solidFill>
+                  <a:schemeClr val="tx1"/>
+                </a:solidFill>
+                <a:effectLst/>
+                <a:latin typeface="+mn-lt"/>
+                <a:ea typeface="+mn-ea"/>
+                <a:cs typeface="+mn-cs"/>
+              </a:rPr>
+            </a:br>
+            <a:r>
+              <a:rPr lang="en-US" sz="1200" b="0" i="0" kern="1200" dirty="0">
+                <a:solidFill>
+                  <a:schemeClr val="tx1"/>
+                </a:solidFill>
+                <a:effectLst/>
+                <a:latin typeface="+mn-lt"/>
+                <a:ea typeface="+mn-ea"/>
+                <a:cs typeface="+mn-cs"/>
+              </a:rPr>
+              <a:t>It’s useful if resource is loaded later.</a:t>
+            </a:r>
+            <a:br>
+              <a:rPr lang="en-US" sz="1200" b="0" i="0" kern="1200" dirty="0">
+                <a:solidFill>
+                  <a:schemeClr val="tx1"/>
+                </a:solidFill>
+                <a:effectLst/>
+                <a:latin typeface="+mn-lt"/>
+                <a:ea typeface="+mn-ea"/>
+                <a:cs typeface="+mn-cs"/>
+              </a:rPr>
+            </a:br>
+            <a:r>
+              <a:rPr lang="en-US" sz="1200" b="0" i="0" kern="1200" dirty="0">
+                <a:solidFill>
+                  <a:schemeClr val="tx1"/>
+                </a:solidFill>
+                <a:effectLst/>
+                <a:latin typeface="+mn-lt"/>
+                <a:ea typeface="+mn-ea"/>
+                <a:cs typeface="+mn-cs"/>
+              </a:rPr>
+              <a:t>Good for things such as Google fonts, Google Analytics, and your CDN.</a:t>
+            </a:r>
+          </a:p>
+          <a:p>
+            <a:pPr marL="0" marR="0" lvl="0" indent="0" algn="l" defTabSz="914400" rtl="0" eaLnBrk="1" fontAlgn="auto" latinLnBrk="0" hangingPunct="1">
+              <a:lnSpc>
+                <a:spcPct val="100000"/>
+              </a:lnSpc>
+              <a:spcBef>
+                <a:spcPts val="0"/>
+              </a:spcBef>
+              <a:spcAft>
+                <a:spcPts val="0"/>
+              </a:spcAft>
+              <a:buClrTx/>
+              <a:buSzTx/>
+              <a:buFontTx/>
+              <a:buNone/>
+              <a:tabLst/>
+              <a:defRPr/>
+            </a:pPr>
+            <a:endParaRPr lang="en-US" sz="1200" b="0" i="0" kern="1200" dirty="0">
+              <a:solidFill>
+                <a:schemeClr val="tx1"/>
+              </a:solidFill>
+              <a:effectLst/>
+              <a:latin typeface="+mn-lt"/>
+              <a:ea typeface="+mn-ea"/>
+              <a:cs typeface="+mn-cs"/>
+            </a:endParaRPr>
+          </a:p>
+          <a:p>
+            <a:pPr marL="171450" marR="0" lvl="0" indent="-171450" algn="l" defTabSz="914400" rtl="0" eaLnBrk="1" fontAlgn="auto" latinLnBrk="0" hangingPunct="1">
+              <a:lnSpc>
+                <a:spcPct val="100000"/>
+              </a:lnSpc>
+              <a:spcBef>
+                <a:spcPts val="0"/>
+              </a:spcBef>
+              <a:spcAft>
+                <a:spcPts val="0"/>
+              </a:spcAft>
+              <a:buClrTx/>
+              <a:buSzTx/>
+              <a:buFontTx/>
+              <a:buChar char="-"/>
+              <a:tabLst/>
+              <a:defRPr/>
+            </a:pPr>
+            <a:r>
+              <a:rPr lang="en-US" sz="1200" b="1" i="0" kern="1200" dirty="0" err="1">
+                <a:solidFill>
+                  <a:schemeClr val="tx1"/>
+                </a:solidFill>
+                <a:effectLst/>
+                <a:latin typeface="+mn-lt"/>
+                <a:ea typeface="+mn-ea"/>
+                <a:cs typeface="+mn-cs"/>
+              </a:rPr>
+              <a:t>Preconnect</a:t>
+            </a:r>
+            <a:r>
+              <a:rPr lang="en-US" sz="1200" b="0" i="0" kern="1200" dirty="0">
+                <a:solidFill>
+                  <a:schemeClr val="tx1"/>
+                </a:solidFill>
+                <a:effectLst/>
+                <a:latin typeface="+mn-lt"/>
+                <a:ea typeface="+mn-ea"/>
+                <a:cs typeface="+mn-cs"/>
+              </a:rPr>
+              <a:t> – With </a:t>
+            </a:r>
+            <a:r>
+              <a:rPr lang="en-US" sz="1200" b="0" i="0" kern="1200" dirty="0" err="1">
+                <a:solidFill>
+                  <a:schemeClr val="tx1"/>
+                </a:solidFill>
+                <a:effectLst/>
+                <a:latin typeface="+mn-lt"/>
+                <a:ea typeface="+mn-ea"/>
+                <a:cs typeface="+mn-cs"/>
+              </a:rPr>
+              <a:t>preconnect</a:t>
+            </a:r>
+            <a:r>
+              <a:rPr lang="en-US" sz="1200" b="0" i="0" kern="1200" dirty="0">
+                <a:solidFill>
+                  <a:schemeClr val="tx1"/>
+                </a:solidFill>
+                <a:effectLst/>
+                <a:latin typeface="+mn-lt"/>
+                <a:ea typeface="+mn-ea"/>
+                <a:cs typeface="+mn-cs"/>
+              </a:rPr>
+              <a:t> the browser will setup early connections before an HTTP request is actually sent to the server. It includes:</a:t>
+            </a:r>
+          </a:p>
+          <a:p>
+            <a:pPr marL="0" marR="0" lvl="0" indent="0" algn="l" defTabSz="914400" rtl="0" eaLnBrk="1" fontAlgn="auto" latinLnBrk="0" hangingPunct="1">
+              <a:lnSpc>
+                <a:spcPct val="100000"/>
+              </a:lnSpc>
+              <a:spcBef>
+                <a:spcPts val="0"/>
+              </a:spcBef>
+              <a:spcAft>
+                <a:spcPts val="0"/>
+              </a:spcAft>
+              <a:buClrTx/>
+              <a:buSzTx/>
+              <a:buFontTx/>
+              <a:buNone/>
+              <a:tabLst/>
+              <a:defRPr/>
+            </a:pPr>
+            <a:r>
+              <a:rPr lang="en-US" sz="1200" b="0" i="0" kern="1200" dirty="0">
+                <a:solidFill>
+                  <a:schemeClr val="tx1"/>
+                </a:solidFill>
+                <a:effectLst/>
+                <a:latin typeface="+mn-lt"/>
+                <a:ea typeface="+mn-ea"/>
+                <a:cs typeface="+mn-cs"/>
+              </a:rPr>
+              <a:t>	• Resolve DNS</a:t>
+            </a:r>
+          </a:p>
+          <a:p>
+            <a:pPr marL="0" marR="0" lvl="0" indent="0" algn="l" defTabSz="914400" rtl="0" eaLnBrk="1" fontAlgn="auto" latinLnBrk="0" hangingPunct="1">
+              <a:lnSpc>
+                <a:spcPct val="100000"/>
+              </a:lnSpc>
+              <a:spcBef>
+                <a:spcPts val="0"/>
+              </a:spcBef>
+              <a:spcAft>
+                <a:spcPts val="0"/>
+              </a:spcAft>
+              <a:buClrTx/>
+              <a:buSzTx/>
+              <a:buFontTx/>
+              <a:buNone/>
+              <a:tabLst/>
+              <a:defRPr/>
+            </a:pPr>
+            <a:r>
+              <a:rPr lang="en-US" sz="1200" b="0" i="0" kern="1200" dirty="0">
+                <a:solidFill>
+                  <a:schemeClr val="tx1"/>
+                </a:solidFill>
+                <a:effectLst/>
+                <a:latin typeface="+mn-lt"/>
+                <a:ea typeface="+mn-ea"/>
+                <a:cs typeface="+mn-cs"/>
+              </a:rPr>
+              <a:t>	• Perform TCP handshake</a:t>
+            </a:r>
+          </a:p>
+          <a:p>
+            <a:pPr algn="l" rtl="0"/>
+            <a:r>
+              <a:rPr lang="en-US" sz="1200" b="0" i="0" kern="1200" dirty="0">
+                <a:solidFill>
+                  <a:schemeClr val="tx1"/>
+                </a:solidFill>
+                <a:effectLst/>
+                <a:latin typeface="+mn-lt"/>
+                <a:ea typeface="+mn-ea"/>
+                <a:cs typeface="+mn-cs"/>
+              </a:rPr>
+              <a:t>	• Setup TLS</a:t>
+            </a:r>
+            <a:br>
+              <a:rPr lang="en-US" sz="1200" b="0" i="0" kern="1200" dirty="0">
+                <a:solidFill>
+                  <a:schemeClr val="tx1"/>
+                </a:solidFill>
+                <a:effectLst/>
+                <a:latin typeface="+mn-lt"/>
+                <a:ea typeface="+mn-ea"/>
+                <a:cs typeface="+mn-cs"/>
+              </a:rPr>
+            </a:br>
+            <a:r>
+              <a:rPr lang="en-US" sz="1200" b="0" i="0" kern="1200" dirty="0">
+                <a:solidFill>
+                  <a:schemeClr val="tx1"/>
+                </a:solidFill>
+                <a:effectLst/>
+                <a:latin typeface="+mn-lt"/>
+                <a:ea typeface="+mn-ea"/>
+                <a:cs typeface="+mn-cs"/>
+              </a:rPr>
+              <a:t>in the first image we can see if we are making 2 requests instead of resolving DNS/TCP/TLS after the first request we will do it earlier and we will save 0.5s</a:t>
+            </a:r>
+            <a:br>
+              <a:rPr lang="en-US" sz="1200" b="0" i="0" kern="1200" dirty="0">
+                <a:solidFill>
+                  <a:schemeClr val="tx1"/>
+                </a:solidFill>
+                <a:effectLst/>
+                <a:latin typeface="+mn-lt"/>
+                <a:ea typeface="+mn-ea"/>
+                <a:cs typeface="+mn-cs"/>
+              </a:rPr>
+            </a:br>
+            <a:endParaRPr lang="en-US" sz="1200" b="0" i="0" kern="1200" dirty="0">
+              <a:solidFill>
+                <a:schemeClr val="tx1"/>
+              </a:solidFill>
+              <a:effectLst/>
+              <a:latin typeface="+mn-lt"/>
+              <a:ea typeface="+mn-ea"/>
+              <a:cs typeface="+mn-cs"/>
+            </a:endParaRPr>
+          </a:p>
+          <a:p>
+            <a:pPr algn="l" rtl="0"/>
+            <a:r>
+              <a:rPr lang="en-US" sz="1200" b="0" i="0" kern="1200" dirty="0">
+                <a:solidFill>
+                  <a:schemeClr val="tx1"/>
+                </a:solidFill>
+                <a:effectLst/>
+                <a:latin typeface="+mn-lt"/>
+                <a:ea typeface="+mn-ea"/>
+                <a:cs typeface="+mn-cs"/>
+              </a:rPr>
+              <a:t>Example, let say in our website we are loading styles from google.</a:t>
+            </a:r>
+          </a:p>
+          <a:p>
+            <a:pPr algn="l" rtl="0"/>
+            <a:r>
+              <a:rPr lang="en-US" sz="1200" b="0" i="0" kern="1200" dirty="0">
+                <a:solidFill>
+                  <a:schemeClr val="tx1"/>
+                </a:solidFill>
+                <a:effectLst/>
+                <a:latin typeface="+mn-lt"/>
+                <a:ea typeface="+mn-ea"/>
+                <a:cs typeface="+mn-cs"/>
+              </a:rPr>
+              <a:t>In google style, it’s loading </a:t>
+            </a:r>
+            <a:r>
+              <a:rPr lang="en-US" sz="1200" b="0" i="0" kern="1200" dirty="0" err="1">
+                <a:solidFill>
+                  <a:schemeClr val="tx1"/>
+                </a:solidFill>
+                <a:effectLst/>
+                <a:latin typeface="+mn-lt"/>
+                <a:ea typeface="+mn-ea"/>
+                <a:cs typeface="+mn-cs"/>
+              </a:rPr>
+              <a:t>webfont</a:t>
+            </a:r>
+            <a:r>
+              <a:rPr lang="en-US" sz="1200" b="0" i="0" kern="1200" dirty="0">
+                <a:solidFill>
+                  <a:schemeClr val="tx1"/>
+                </a:solidFill>
+                <a:effectLst/>
+                <a:latin typeface="+mn-lt"/>
+                <a:ea typeface="+mn-ea"/>
+                <a:cs typeface="+mn-cs"/>
+              </a:rPr>
+              <a:t> from other domain.</a:t>
+            </a:r>
+            <a:br>
+              <a:rPr lang="en-US" sz="1200" b="0" i="0" kern="1200" dirty="0">
+                <a:solidFill>
+                  <a:schemeClr val="tx1"/>
+                </a:solidFill>
+                <a:effectLst/>
+                <a:latin typeface="+mn-lt"/>
+                <a:ea typeface="+mn-ea"/>
+                <a:cs typeface="+mn-cs"/>
+              </a:rPr>
+            </a:br>
+            <a:r>
+              <a:rPr lang="en-US" sz="1200" b="0" i="0" kern="1200" dirty="0">
+                <a:solidFill>
+                  <a:schemeClr val="tx1"/>
+                </a:solidFill>
+                <a:effectLst/>
+                <a:latin typeface="+mn-lt"/>
+                <a:ea typeface="+mn-ea"/>
+                <a:cs typeface="+mn-cs"/>
+              </a:rPr>
+              <a:t>Because it’s external </a:t>
+            </a:r>
+            <a:r>
+              <a:rPr lang="en-US" sz="1200" b="0" i="0" kern="1200" dirty="0" err="1">
+                <a:solidFill>
+                  <a:schemeClr val="tx1"/>
+                </a:solidFill>
+                <a:effectLst/>
+                <a:latin typeface="+mn-lt"/>
+                <a:ea typeface="+mn-ea"/>
+                <a:cs typeface="+mn-cs"/>
+              </a:rPr>
+              <a:t>stle</a:t>
+            </a:r>
+            <a:r>
+              <a:rPr lang="en-US" sz="1200" b="0" i="0" kern="1200" dirty="0">
+                <a:solidFill>
+                  <a:schemeClr val="tx1"/>
+                </a:solidFill>
+                <a:effectLst/>
+                <a:latin typeface="+mn-lt"/>
+                <a:ea typeface="+mn-ea"/>
+                <a:cs typeface="+mn-cs"/>
+              </a:rPr>
+              <a:t> the </a:t>
+            </a:r>
+            <a:r>
+              <a:rPr lang="en-US" sz="1200" b="0" i="0" kern="1200" dirty="0" err="1">
+                <a:solidFill>
+                  <a:schemeClr val="tx1"/>
+                </a:solidFill>
+                <a:effectLst/>
+                <a:latin typeface="+mn-lt"/>
+                <a:ea typeface="+mn-ea"/>
+                <a:cs typeface="+mn-cs"/>
+              </a:rPr>
+              <a:t>webfont</a:t>
+            </a:r>
+            <a:r>
+              <a:rPr lang="en-US" sz="1200" b="0" i="0" kern="1200" dirty="0">
+                <a:solidFill>
+                  <a:schemeClr val="tx1"/>
+                </a:solidFill>
+                <a:effectLst/>
+                <a:latin typeface="+mn-lt"/>
+                <a:ea typeface="+mn-ea"/>
+                <a:cs typeface="+mn-cs"/>
+              </a:rPr>
+              <a:t> </a:t>
+            </a:r>
+            <a:r>
+              <a:rPr lang="en-US" sz="1200" b="0" i="0" kern="1200" dirty="0" err="1">
+                <a:solidFill>
+                  <a:schemeClr val="tx1"/>
+                </a:solidFill>
+                <a:effectLst/>
+                <a:latin typeface="+mn-lt"/>
+                <a:ea typeface="+mn-ea"/>
+                <a:cs typeface="+mn-cs"/>
+              </a:rPr>
+              <a:t>subfix</a:t>
+            </a:r>
+            <a:r>
+              <a:rPr lang="en-US" sz="1200" b="0" i="0" kern="1200" dirty="0">
+                <a:solidFill>
+                  <a:schemeClr val="tx1"/>
+                </a:solidFill>
+                <a:effectLst/>
+                <a:latin typeface="+mn-lt"/>
+                <a:ea typeface="+mn-ea"/>
+                <a:cs typeface="+mn-cs"/>
+              </a:rPr>
+              <a:t> might change so we don’t know the whole path.</a:t>
+            </a:r>
+          </a:p>
+          <a:p>
+            <a:pPr algn="l" rtl="0"/>
+            <a:r>
+              <a:rPr lang="en-US" sz="1200" b="0" i="0" kern="1200" dirty="0">
+                <a:solidFill>
+                  <a:schemeClr val="tx1"/>
+                </a:solidFill>
+                <a:effectLst/>
+                <a:latin typeface="+mn-lt"/>
+                <a:ea typeface="+mn-ea"/>
+                <a:cs typeface="+mn-cs"/>
+              </a:rPr>
+              <a:t>How can we improve download time? Using </a:t>
+            </a:r>
+            <a:r>
+              <a:rPr lang="en-US" sz="1200" b="0" i="0" kern="1200" dirty="0" err="1">
+                <a:solidFill>
+                  <a:schemeClr val="tx1"/>
+                </a:solidFill>
+                <a:effectLst/>
+                <a:latin typeface="+mn-lt"/>
+                <a:ea typeface="+mn-ea"/>
+                <a:cs typeface="+mn-cs"/>
+              </a:rPr>
+              <a:t>preconnect</a:t>
+            </a:r>
+            <a:r>
+              <a:rPr lang="en-US" sz="1200" b="0" i="0" kern="1200" dirty="0">
+                <a:solidFill>
+                  <a:schemeClr val="tx1"/>
+                </a:solidFill>
+                <a:effectLst/>
+                <a:latin typeface="+mn-lt"/>
+                <a:ea typeface="+mn-ea"/>
+                <a:cs typeface="+mn-cs"/>
+              </a:rPr>
+              <a:t> and save resolving DNS/TCP/TLS</a:t>
+            </a:r>
+          </a:p>
+          <a:p>
+            <a:pPr algn="l" rtl="0"/>
+            <a:r>
+              <a:rPr lang="en-US" sz="1200" b="0" i="0" kern="1200" dirty="0">
+                <a:solidFill>
+                  <a:schemeClr val="tx1"/>
+                </a:solidFill>
+                <a:effectLst/>
+                <a:latin typeface="+mn-lt"/>
+                <a:ea typeface="+mn-ea"/>
+                <a:cs typeface="+mn-cs"/>
+              </a:rPr>
+              <a:t>Let see it in </a:t>
+            </a:r>
+            <a:r>
+              <a:rPr lang="en-US" sz="1200" b="0" i="0" u="none" strike="noStrike" kern="1200" baseline="0" dirty="0">
+                <a:solidFill>
+                  <a:schemeClr val="tx1"/>
+                </a:solidFill>
+                <a:effectLst/>
+                <a:latin typeface="+mn-lt"/>
+                <a:ea typeface="+mn-ea"/>
+                <a:cs typeface="+mn-cs"/>
+              </a:rPr>
+              <a:t>how it looks via </a:t>
+            </a:r>
+            <a:r>
+              <a:rPr lang="en-US" sz="1200" b="0" i="0" u="none" strike="noStrike" kern="1200" baseline="0" dirty="0">
+                <a:solidFill>
+                  <a:schemeClr val="tx1"/>
+                </a:solidFill>
+                <a:latin typeface="+mn-lt"/>
+                <a:ea typeface="+mn-ea"/>
+                <a:cs typeface="+mn-cs"/>
+              </a:rPr>
+              <a:t>`</a:t>
+            </a:r>
+            <a:r>
+              <a:rPr lang="en-US" sz="1200" b="0" i="0" u="none" strike="noStrike" kern="1200" baseline="0" dirty="0" err="1">
+                <a:solidFill>
+                  <a:schemeClr val="tx1"/>
+                </a:solidFill>
+                <a:latin typeface="+mn-lt"/>
+                <a:ea typeface="+mn-ea"/>
+                <a:cs typeface="+mn-cs"/>
+              </a:rPr>
+              <a:t>webpagetest</a:t>
+            </a:r>
+            <a:r>
+              <a:rPr lang="en-US" sz="1200" b="0" i="0" u="none" strike="noStrike" kern="1200" baseline="0" dirty="0">
+                <a:solidFill>
+                  <a:schemeClr val="tx1"/>
+                </a:solidFill>
+                <a:latin typeface="+mn-lt"/>
+                <a:ea typeface="+mn-ea"/>
+                <a:cs typeface="+mn-cs"/>
+              </a:rPr>
+              <a:t>`. We can see </a:t>
+            </a:r>
+            <a:r>
+              <a:rPr lang="en-US" sz="1200" b="0" i="0" u="none" strike="noStrike" kern="1200" baseline="0" dirty="0" err="1">
+                <a:solidFill>
+                  <a:schemeClr val="tx1"/>
+                </a:solidFill>
+                <a:latin typeface="+mn-lt"/>
+                <a:ea typeface="+mn-ea"/>
+                <a:cs typeface="+mn-cs"/>
+              </a:rPr>
+              <a:t>whe</a:t>
+            </a:r>
+            <a:r>
+              <a:rPr lang="en-US" sz="1200" b="0" i="0" u="none" strike="noStrike" kern="1200" baseline="0" dirty="0">
+                <a:solidFill>
+                  <a:schemeClr val="tx1"/>
+                </a:solidFill>
+                <a:latin typeface="+mn-lt"/>
+                <a:ea typeface="+mn-ea"/>
+                <a:cs typeface="+mn-cs"/>
+              </a:rPr>
+              <a:t> third line is finish we start downloading the file without resolving DNS/TCP/TLS.</a:t>
+            </a:r>
+            <a:br>
+              <a:rPr lang="en-US" sz="1200" b="0" i="0" kern="1200" dirty="0">
+                <a:solidFill>
+                  <a:schemeClr val="tx1"/>
+                </a:solidFill>
+                <a:effectLst/>
+                <a:latin typeface="+mn-lt"/>
+                <a:ea typeface="+mn-ea"/>
+                <a:cs typeface="+mn-cs"/>
+              </a:rPr>
+            </a:br>
+            <a:r>
+              <a:rPr lang="en-US" sz="1200" b="0" i="0" kern="1200" dirty="0">
+                <a:solidFill>
+                  <a:schemeClr val="tx1"/>
+                </a:solidFill>
+                <a:effectLst/>
+                <a:latin typeface="+mn-lt"/>
+                <a:ea typeface="+mn-ea"/>
+                <a:cs typeface="+mn-cs"/>
+              </a:rPr>
+              <a:t>Note that in </a:t>
+            </a:r>
+            <a:r>
+              <a:rPr lang="en-US" sz="1200" b="0" i="0" kern="1200" dirty="0" err="1">
+                <a:solidFill>
+                  <a:schemeClr val="tx1"/>
+                </a:solidFill>
+                <a:effectLst/>
+                <a:latin typeface="+mn-lt"/>
+                <a:ea typeface="+mn-ea"/>
+                <a:cs typeface="+mn-cs"/>
+              </a:rPr>
+              <a:t>preconnect</a:t>
+            </a:r>
+            <a:r>
+              <a:rPr lang="en-US" sz="1200" b="0" i="0" kern="1200" dirty="0">
+                <a:solidFill>
+                  <a:schemeClr val="tx1"/>
+                </a:solidFill>
+                <a:effectLst/>
+                <a:latin typeface="+mn-lt"/>
+                <a:ea typeface="+mn-ea"/>
+                <a:cs typeface="+mn-cs"/>
+              </a:rPr>
+              <a:t> we putting the domain and not the file</a:t>
+            </a:r>
+            <a:br>
+              <a:rPr lang="en-US" sz="1200" b="0" i="0" kern="1200" dirty="0">
+                <a:solidFill>
+                  <a:schemeClr val="tx1"/>
+                </a:solidFill>
+                <a:effectLst/>
+                <a:latin typeface="+mn-lt"/>
+                <a:ea typeface="+mn-ea"/>
+                <a:cs typeface="+mn-cs"/>
+              </a:rPr>
+            </a:br>
+            <a:r>
+              <a:rPr lang="en-US" sz="1200" b="0" i="0" kern="1200" dirty="0">
+                <a:solidFill>
+                  <a:schemeClr val="tx1"/>
+                </a:solidFill>
+                <a:effectLst/>
+                <a:latin typeface="+mn-lt"/>
+                <a:ea typeface="+mn-ea"/>
+                <a:cs typeface="+mn-cs"/>
+              </a:rPr>
+              <a:t>it’s good for resources we need now or later (in current page or other page)</a:t>
+            </a:r>
+          </a:p>
+          <a:p>
+            <a:pPr algn="l" rtl="0"/>
+            <a:endParaRPr lang="en-US" sz="1200" b="0" i="0" kern="1200" dirty="0">
+              <a:solidFill>
+                <a:schemeClr val="tx1"/>
+              </a:solidFill>
+              <a:effectLst/>
+              <a:latin typeface="+mn-lt"/>
+              <a:ea typeface="+mn-ea"/>
+              <a:cs typeface="+mn-cs"/>
+            </a:endParaRPr>
+          </a:p>
+          <a:p>
+            <a:pPr marL="171450" indent="-171450" algn="l" rtl="0">
+              <a:buFontTx/>
+              <a:buChar char="-"/>
+            </a:pPr>
+            <a:r>
+              <a:rPr lang="en-US" sz="1200" b="0" i="0" kern="1200" dirty="0">
+                <a:solidFill>
+                  <a:schemeClr val="tx1"/>
+                </a:solidFill>
+                <a:effectLst/>
+                <a:latin typeface="+mn-lt"/>
+                <a:ea typeface="+mn-ea"/>
+                <a:cs typeface="+mn-cs"/>
+              </a:rPr>
+              <a:t>When to use prefetch or </a:t>
+            </a:r>
+            <a:r>
+              <a:rPr lang="en-US" sz="1200" b="0" i="0" kern="1200" dirty="0" err="1">
+                <a:solidFill>
+                  <a:schemeClr val="tx1"/>
+                </a:solidFill>
+                <a:effectLst/>
+                <a:latin typeface="+mn-lt"/>
+                <a:ea typeface="+mn-ea"/>
+                <a:cs typeface="+mn-cs"/>
+              </a:rPr>
+              <a:t>dns</a:t>
+            </a:r>
+            <a:r>
+              <a:rPr lang="en-US" sz="1200" b="0" i="0" kern="1200" dirty="0">
+                <a:solidFill>
+                  <a:schemeClr val="tx1"/>
+                </a:solidFill>
+                <a:effectLst/>
+                <a:latin typeface="+mn-lt"/>
+                <a:ea typeface="+mn-ea"/>
+                <a:cs typeface="+mn-cs"/>
+              </a:rPr>
+              <a:t>-</a:t>
+            </a:r>
+            <a:r>
+              <a:rPr lang="en-US" sz="1200" kern="1200" dirty="0">
+                <a:solidFill>
+                  <a:schemeClr val="tx1"/>
+                </a:solidFill>
+                <a:effectLst/>
+                <a:latin typeface="+mn-lt"/>
+                <a:ea typeface="+mn-ea"/>
+                <a:cs typeface="+mn-cs"/>
+              </a:rPr>
+              <a:t>prefetch</a:t>
+            </a:r>
+            <a:r>
+              <a:rPr lang="en-US" sz="1200" b="0" i="0" kern="1200" dirty="0">
+                <a:solidFill>
+                  <a:schemeClr val="tx1"/>
+                </a:solidFill>
+                <a:effectLst/>
+                <a:latin typeface="+mn-lt"/>
+                <a:ea typeface="+mn-ea"/>
+                <a:cs typeface="+mn-cs"/>
+              </a:rPr>
+              <a:t>? If we know we will need a resource but we don’t know when then we will do </a:t>
+            </a:r>
+            <a:r>
+              <a:rPr lang="en-US" sz="1200" b="0" i="0" kern="1200" dirty="0" err="1">
+                <a:solidFill>
+                  <a:schemeClr val="tx1"/>
+                </a:solidFill>
+                <a:effectLst/>
+                <a:latin typeface="+mn-lt"/>
+                <a:ea typeface="+mn-ea"/>
+                <a:cs typeface="+mn-cs"/>
+              </a:rPr>
+              <a:t>dns</a:t>
+            </a:r>
+            <a:r>
+              <a:rPr lang="en-US" sz="1200" b="0" i="0" kern="1200" dirty="0">
+                <a:solidFill>
+                  <a:schemeClr val="tx1"/>
+                </a:solidFill>
+                <a:effectLst/>
+                <a:latin typeface="+mn-lt"/>
+                <a:ea typeface="+mn-ea"/>
+                <a:cs typeface="+mn-cs"/>
+              </a:rPr>
+              <a:t>-</a:t>
+            </a:r>
+            <a:r>
+              <a:rPr lang="en-US" sz="1200" kern="1200" dirty="0">
+                <a:solidFill>
+                  <a:schemeClr val="tx1"/>
+                </a:solidFill>
+                <a:effectLst/>
+                <a:latin typeface="+mn-lt"/>
+                <a:ea typeface="+mn-ea"/>
+                <a:cs typeface="+mn-cs"/>
+              </a:rPr>
+              <a:t>prefetch.</a:t>
+            </a:r>
+            <a:br>
+              <a:rPr lang="en-US" sz="1200" kern="1200" dirty="0">
+                <a:solidFill>
+                  <a:schemeClr val="tx1"/>
+                </a:solidFill>
+                <a:effectLst/>
+                <a:latin typeface="+mn-lt"/>
+                <a:ea typeface="+mn-ea"/>
+                <a:cs typeface="+mn-cs"/>
+              </a:rPr>
+            </a:br>
+            <a:r>
+              <a:rPr lang="en-US" sz="1200" kern="1200" dirty="0">
+                <a:solidFill>
+                  <a:schemeClr val="tx1"/>
+                </a:solidFill>
+                <a:effectLst/>
+                <a:latin typeface="+mn-lt"/>
+                <a:ea typeface="+mn-ea"/>
+                <a:cs typeface="+mn-cs"/>
+              </a:rPr>
+              <a:t>In </a:t>
+            </a:r>
+            <a:r>
+              <a:rPr lang="en-US" sz="1200" kern="1200" dirty="0" err="1">
+                <a:solidFill>
+                  <a:schemeClr val="tx1"/>
+                </a:solidFill>
+                <a:effectLst/>
+                <a:latin typeface="+mn-lt"/>
+                <a:ea typeface="+mn-ea"/>
+                <a:cs typeface="+mn-cs"/>
+              </a:rPr>
+              <a:t>preconnect</a:t>
+            </a:r>
+            <a:r>
+              <a:rPr lang="en-US" sz="1200" kern="1200" dirty="0">
+                <a:solidFill>
+                  <a:schemeClr val="tx1"/>
+                </a:solidFill>
+                <a:effectLst/>
+                <a:latin typeface="+mn-lt"/>
+                <a:ea typeface="+mn-ea"/>
+                <a:cs typeface="+mn-cs"/>
+              </a:rPr>
+              <a:t> if we are opening a connection, the are several of implementation that will close the connection if there is no data that have been sent in couple of seconds, so it doesn’t make a sense to open a connection if it will be used in 15 seconds from now. For this case we will use </a:t>
+            </a:r>
+            <a:r>
+              <a:rPr lang="en-US" sz="1200" kern="1200" dirty="0" err="1">
+                <a:solidFill>
+                  <a:schemeClr val="tx1"/>
+                </a:solidFill>
+                <a:effectLst/>
+                <a:latin typeface="+mn-lt"/>
+                <a:ea typeface="+mn-ea"/>
+                <a:cs typeface="+mn-cs"/>
+              </a:rPr>
+              <a:t>dns</a:t>
+            </a:r>
+            <a:r>
+              <a:rPr lang="en-US" sz="1200" kern="1200" dirty="0">
+                <a:solidFill>
+                  <a:schemeClr val="tx1"/>
+                </a:solidFill>
+                <a:effectLst/>
+                <a:latin typeface="+mn-lt"/>
+                <a:ea typeface="+mn-ea"/>
+                <a:cs typeface="+mn-cs"/>
+              </a:rPr>
+              <a:t>-prefetch</a:t>
+            </a:r>
+          </a:p>
+          <a:p>
+            <a:pPr marL="171450" indent="-171450" algn="l" rtl="0">
+              <a:buFontTx/>
+              <a:buChar char="-"/>
+            </a:pPr>
+            <a:endParaRPr lang="en-US" sz="1200" b="0" i="0" kern="1200" dirty="0">
+              <a:solidFill>
+                <a:schemeClr val="tx1"/>
+              </a:solidFill>
+              <a:effectLst/>
+              <a:latin typeface="+mn-lt"/>
+              <a:ea typeface="+mn-ea"/>
+              <a:cs typeface="+mn-cs"/>
+            </a:endParaRPr>
+          </a:p>
+          <a:p>
+            <a:pPr marL="171450" indent="-171450" algn="l" rtl="0">
+              <a:buFontTx/>
+              <a:buChar char="-"/>
+            </a:pPr>
+            <a:r>
+              <a:rPr lang="en-US" sz="1200" b="0" i="0" kern="1200" dirty="0">
+                <a:solidFill>
+                  <a:schemeClr val="tx1"/>
+                </a:solidFill>
+                <a:effectLst/>
+                <a:latin typeface="+mn-lt"/>
+                <a:ea typeface="+mn-ea"/>
+                <a:cs typeface="+mn-cs"/>
+              </a:rPr>
+              <a:t>If you want to use </a:t>
+            </a:r>
+            <a:r>
+              <a:rPr lang="en-US" sz="1200" b="0" i="0" kern="1200" dirty="0" err="1">
+                <a:solidFill>
+                  <a:schemeClr val="tx1"/>
+                </a:solidFill>
+                <a:effectLst/>
+                <a:latin typeface="+mn-lt"/>
+                <a:ea typeface="+mn-ea"/>
+                <a:cs typeface="+mn-cs"/>
+              </a:rPr>
+              <a:t>preconnect</a:t>
+            </a:r>
+            <a:r>
+              <a:rPr lang="en-US" sz="1200" b="0" i="0" kern="1200" dirty="0">
+                <a:solidFill>
+                  <a:schemeClr val="tx1"/>
+                </a:solidFill>
+                <a:effectLst/>
+                <a:latin typeface="+mn-lt"/>
+                <a:ea typeface="+mn-ea"/>
+                <a:cs typeface="+mn-cs"/>
+              </a:rPr>
+              <a:t> but  the browser is not support it we can give </a:t>
+            </a:r>
+            <a:r>
+              <a:rPr lang="en-US" sz="1200" b="0" i="0" kern="1200" dirty="0" err="1">
+                <a:solidFill>
+                  <a:schemeClr val="tx1"/>
+                </a:solidFill>
+                <a:effectLst/>
+                <a:latin typeface="+mn-lt"/>
+                <a:ea typeface="+mn-ea"/>
+                <a:cs typeface="+mn-cs"/>
+              </a:rPr>
+              <a:t>dns</a:t>
+            </a:r>
+            <a:r>
+              <a:rPr lang="en-US" sz="1200" b="0" i="0" kern="1200" dirty="0">
+                <a:solidFill>
+                  <a:schemeClr val="tx1"/>
+                </a:solidFill>
+                <a:effectLst/>
+                <a:latin typeface="+mn-lt"/>
+                <a:ea typeface="+mn-ea"/>
+                <a:cs typeface="+mn-cs"/>
+              </a:rPr>
+              <a:t>-prefetch as default so if you don’t support </a:t>
+            </a:r>
+            <a:r>
+              <a:rPr lang="en-US" sz="1200" b="0" i="0" kern="1200" dirty="0" err="1">
+                <a:solidFill>
+                  <a:schemeClr val="tx1"/>
+                </a:solidFill>
+                <a:effectLst/>
+                <a:latin typeface="+mn-lt"/>
+                <a:ea typeface="+mn-ea"/>
+                <a:cs typeface="+mn-cs"/>
+              </a:rPr>
+              <a:t>preconnect</a:t>
+            </a:r>
+            <a:r>
+              <a:rPr lang="en-US" sz="1200" b="0" i="0" kern="1200" dirty="0">
+                <a:solidFill>
+                  <a:schemeClr val="tx1"/>
+                </a:solidFill>
+                <a:effectLst/>
+                <a:latin typeface="+mn-lt"/>
+                <a:ea typeface="+mn-ea"/>
+                <a:cs typeface="+mn-cs"/>
+              </a:rPr>
+              <a:t> at least do </a:t>
+            </a:r>
+            <a:r>
+              <a:rPr lang="en-US" sz="1200" b="0" i="0" kern="1200" dirty="0" err="1">
+                <a:solidFill>
+                  <a:schemeClr val="tx1"/>
+                </a:solidFill>
+                <a:effectLst/>
+                <a:latin typeface="+mn-lt"/>
+                <a:ea typeface="+mn-ea"/>
+                <a:cs typeface="+mn-cs"/>
+              </a:rPr>
+              <a:t>dns</a:t>
+            </a:r>
+            <a:r>
+              <a:rPr lang="en-US" sz="1200" b="0" i="0" kern="1200" dirty="0">
+                <a:solidFill>
+                  <a:schemeClr val="tx1"/>
+                </a:solidFill>
+                <a:effectLst/>
+                <a:latin typeface="+mn-lt"/>
+                <a:ea typeface="+mn-ea"/>
+                <a:cs typeface="+mn-cs"/>
+              </a:rPr>
+              <a:t>-prefetch</a:t>
+            </a:r>
+          </a:p>
+          <a:p>
+            <a:pPr marL="171450" marR="0" lvl="0" indent="-171450" algn="l" defTabSz="914400" rtl="0" eaLnBrk="1" fontAlgn="auto" latinLnBrk="0" hangingPunct="1">
+              <a:lnSpc>
+                <a:spcPct val="100000"/>
+              </a:lnSpc>
+              <a:spcBef>
+                <a:spcPts val="0"/>
+              </a:spcBef>
+              <a:spcAft>
+                <a:spcPts val="0"/>
+              </a:spcAft>
+              <a:buClrTx/>
+              <a:buSzTx/>
+              <a:buFontTx/>
+              <a:buChar char="-"/>
+              <a:tabLst/>
+              <a:defRPr/>
+            </a:pPr>
+            <a:endParaRPr lang="en-US" sz="1200" b="0" i="0" kern="1200" dirty="0">
+              <a:solidFill>
+                <a:schemeClr val="tx1"/>
+              </a:solidFill>
+              <a:effectLst/>
+              <a:latin typeface="+mn-lt"/>
+              <a:ea typeface="+mn-ea"/>
+              <a:cs typeface="+mn-cs"/>
+            </a:endParaRPr>
+          </a:p>
+          <a:p>
+            <a:pPr marL="171450" marR="0" lvl="0" indent="-171450" algn="l" defTabSz="914400" rtl="0" eaLnBrk="1" fontAlgn="auto" latinLnBrk="0" hangingPunct="1">
+              <a:lnSpc>
+                <a:spcPct val="100000"/>
+              </a:lnSpc>
+              <a:spcBef>
+                <a:spcPts val="0"/>
+              </a:spcBef>
+              <a:spcAft>
+                <a:spcPts val="0"/>
+              </a:spcAft>
+              <a:buClrTx/>
+              <a:buSzTx/>
+              <a:buFontTx/>
+              <a:buChar char="-"/>
+              <a:tabLst/>
+              <a:defRPr/>
+            </a:pPr>
+            <a:r>
+              <a:rPr lang="en-US" sz="1200" b="0" i="0" kern="1200" dirty="0">
+                <a:solidFill>
+                  <a:schemeClr val="tx1"/>
+                </a:solidFill>
+                <a:effectLst/>
+                <a:latin typeface="+mn-lt"/>
+                <a:ea typeface="+mn-ea"/>
+                <a:cs typeface="+mn-cs"/>
+              </a:rPr>
+              <a:t>Prefetch – we will download resource -&gt; store it cache -&gt; execute later</a:t>
+            </a:r>
+            <a:br>
+              <a:rPr lang="en-US" sz="1200" b="0" i="0" kern="1200" dirty="0">
+                <a:solidFill>
+                  <a:schemeClr val="tx1"/>
+                </a:solidFill>
+                <a:effectLst/>
+                <a:latin typeface="+mn-lt"/>
+                <a:ea typeface="+mn-ea"/>
+                <a:cs typeface="+mn-cs"/>
+              </a:rPr>
+            </a:br>
+            <a:r>
+              <a:rPr lang="en-US" sz="1200" b="0" i="0" kern="1200" dirty="0">
+                <a:solidFill>
+                  <a:schemeClr val="tx1"/>
+                </a:solidFill>
+                <a:effectLst/>
+                <a:latin typeface="+mn-lt"/>
+                <a:ea typeface="+mn-ea"/>
+                <a:cs typeface="+mn-cs"/>
+              </a:rPr>
+              <a:t>(Prefetch is a low priority resource hint that allows the browser to </a:t>
+            </a:r>
+            <a:r>
+              <a:rPr lang="en-US" sz="1200" b="1" i="0" kern="1200" dirty="0">
+                <a:solidFill>
+                  <a:schemeClr val="tx1"/>
+                </a:solidFill>
+                <a:effectLst/>
+                <a:latin typeface="+mn-lt"/>
+                <a:ea typeface="+mn-ea"/>
+                <a:cs typeface="+mn-cs"/>
+              </a:rPr>
+              <a:t>fetch resources in the background</a:t>
+            </a:r>
+            <a:r>
+              <a:rPr lang="en-US" sz="1200" b="0" i="0" kern="1200" dirty="0">
+                <a:solidFill>
+                  <a:schemeClr val="tx1"/>
+                </a:solidFill>
+                <a:effectLst/>
+                <a:latin typeface="+mn-lt"/>
+                <a:ea typeface="+mn-ea"/>
+                <a:cs typeface="+mn-cs"/>
+              </a:rPr>
+              <a:t>(idle time) that might be needed later, and </a:t>
+            </a:r>
+            <a:r>
+              <a:rPr lang="en-US" sz="1200" b="1" i="0" kern="1200" dirty="0">
+                <a:solidFill>
+                  <a:schemeClr val="tx1"/>
+                </a:solidFill>
+                <a:effectLst/>
+                <a:latin typeface="+mn-lt"/>
+                <a:ea typeface="+mn-ea"/>
+                <a:cs typeface="+mn-cs"/>
+              </a:rPr>
+              <a:t>store them in the browser’s cache</a:t>
+            </a:r>
+            <a:r>
+              <a:rPr lang="en-US" sz="1200" b="0" i="0" kern="1200" dirty="0">
+                <a:solidFill>
+                  <a:schemeClr val="tx1"/>
+                </a:solidFill>
+                <a:effectLst/>
+                <a:latin typeface="+mn-lt"/>
+                <a:ea typeface="+mn-ea"/>
+                <a:cs typeface="+mn-cs"/>
+              </a:rPr>
+              <a:t>. )</a:t>
+            </a:r>
+            <a:br>
+              <a:rPr lang="en-US" sz="1200" b="0" i="0" kern="1200" dirty="0">
+                <a:solidFill>
+                  <a:schemeClr val="tx1"/>
+                </a:solidFill>
+                <a:effectLst/>
+                <a:latin typeface="+mn-lt"/>
+                <a:ea typeface="+mn-ea"/>
+                <a:cs typeface="+mn-cs"/>
+              </a:rPr>
+            </a:br>
+            <a:r>
+              <a:rPr lang="en-US" sz="1200" b="0" i="0" kern="1200" dirty="0">
+                <a:solidFill>
+                  <a:schemeClr val="tx1"/>
+                </a:solidFill>
+                <a:effectLst/>
+                <a:latin typeface="+mn-lt"/>
+                <a:ea typeface="+mn-ea"/>
+                <a:cs typeface="+mn-cs"/>
+              </a:rPr>
+              <a:t>Example of use: checkout flow:</a:t>
+            </a:r>
+            <a:br>
+              <a:rPr lang="en-US" sz="1200" b="0" i="0" kern="1200" dirty="0">
+                <a:solidFill>
+                  <a:schemeClr val="tx1"/>
+                </a:solidFill>
+                <a:effectLst/>
+                <a:latin typeface="+mn-lt"/>
+                <a:ea typeface="+mn-ea"/>
+                <a:cs typeface="+mn-cs"/>
+              </a:rPr>
+            </a:br>
+            <a:r>
+              <a:rPr lang="en-US" sz="1200" b="0" i="0" kern="1200" dirty="0">
+                <a:solidFill>
+                  <a:schemeClr val="tx1"/>
+                </a:solidFill>
+                <a:effectLst/>
+                <a:latin typeface="+mn-lt"/>
+                <a:ea typeface="+mn-ea"/>
+                <a:cs typeface="+mn-cs"/>
+              </a:rPr>
+              <a:t>product pages -&gt; cart -&gt; checkout -&gt; payment</a:t>
+            </a:r>
+            <a:br>
+              <a:rPr lang="en-US" sz="1200" b="0" i="0" kern="1200" dirty="0">
+                <a:solidFill>
+                  <a:schemeClr val="tx1"/>
+                </a:solidFill>
+                <a:effectLst/>
+                <a:latin typeface="+mn-lt"/>
+                <a:ea typeface="+mn-ea"/>
+                <a:cs typeface="+mn-cs"/>
+              </a:rPr>
+            </a:br>
+            <a:r>
+              <a:rPr lang="en-US" sz="1200" b="0" i="0" kern="1200" dirty="0">
+                <a:solidFill>
+                  <a:schemeClr val="tx1"/>
+                </a:solidFill>
+                <a:effectLst/>
+                <a:latin typeface="+mn-lt"/>
+                <a:ea typeface="+mn-ea"/>
+                <a:cs typeface="+mn-cs"/>
+              </a:rPr>
+              <a:t>when we arrive to cart page we know it is a wizard so the user next step will be going to checkout so in cart page we can download checkout resources like CSS &amp; JS and serve it to the user instantly when he will navigate to this page.</a:t>
+            </a:r>
+            <a:br>
+              <a:rPr lang="en-US" sz="1200" b="0" i="0" kern="1200" dirty="0">
+                <a:solidFill>
+                  <a:schemeClr val="tx1"/>
+                </a:solidFill>
+                <a:effectLst/>
+                <a:latin typeface="+mn-lt"/>
+                <a:ea typeface="+mn-ea"/>
+                <a:cs typeface="+mn-cs"/>
+              </a:rPr>
+            </a:br>
+            <a:r>
+              <a:rPr lang="en-US" sz="1200" b="0" i="0" kern="1200" dirty="0">
+                <a:solidFill>
+                  <a:schemeClr val="tx1"/>
+                </a:solidFill>
+                <a:effectLst/>
+                <a:latin typeface="+mn-lt"/>
+                <a:ea typeface="+mn-ea"/>
+                <a:cs typeface="+mn-cs"/>
+              </a:rPr>
+              <a:t>Other example is for login, when user landing at login page we can prefetch our application in the background so when he will logged in he will have all the resource he need.</a:t>
+            </a:r>
+            <a:endParaRPr lang="en-US" b="0" dirty="0"/>
+          </a:p>
+          <a:p>
+            <a:pPr marL="171450" marR="0" lvl="0" indent="-171450" algn="l" defTabSz="914400" rtl="0" eaLnBrk="1" fontAlgn="auto" latinLnBrk="0" hangingPunct="1">
+              <a:lnSpc>
+                <a:spcPct val="100000"/>
+              </a:lnSpc>
+              <a:spcBef>
+                <a:spcPts val="0"/>
+              </a:spcBef>
+              <a:spcAft>
+                <a:spcPts val="0"/>
+              </a:spcAft>
+              <a:buClrTx/>
+              <a:buSzTx/>
+              <a:buFontTx/>
+              <a:buChar char="-"/>
+              <a:tabLst/>
+              <a:defRPr/>
+            </a:pPr>
+            <a:endParaRPr lang="en-US" b="0" dirty="0"/>
+          </a:p>
+          <a:p>
+            <a:pPr marL="171450" marR="0" lvl="0" indent="-171450" algn="l" defTabSz="914400" rtl="0" eaLnBrk="1" fontAlgn="auto" latinLnBrk="0" hangingPunct="1">
+              <a:lnSpc>
+                <a:spcPct val="100000"/>
+              </a:lnSpc>
+              <a:spcBef>
+                <a:spcPts val="0"/>
+              </a:spcBef>
+              <a:spcAft>
+                <a:spcPts val="0"/>
+              </a:spcAft>
+              <a:buClrTx/>
+              <a:buSzTx/>
+              <a:buFontTx/>
+              <a:buChar char="-"/>
+              <a:tabLst/>
+              <a:defRPr/>
+            </a:pPr>
+            <a:r>
+              <a:rPr lang="en-US" b="0" dirty="0"/>
+              <a:t>Preload – resources which needed to be downloaded in current navigation (current page) with high priority (</a:t>
+            </a:r>
+            <a:r>
+              <a:rPr lang="en-US" sz="1200" b="0" i="0" kern="1200" dirty="0">
+                <a:solidFill>
+                  <a:schemeClr val="tx1"/>
+                </a:solidFill>
+                <a:effectLst/>
+                <a:latin typeface="+mn-lt"/>
+                <a:ea typeface="+mn-ea"/>
+                <a:cs typeface="+mn-cs"/>
+              </a:rPr>
+              <a:t>preload your most important resources such as images, CSS, JavaScript, and font files.</a:t>
+            </a:r>
+            <a:r>
+              <a:rPr lang="en-US" b="0" dirty="0"/>
+              <a:t>)</a:t>
+            </a:r>
+            <a:br>
+              <a:rPr lang="en-US" b="0" dirty="0"/>
+            </a:br>
+            <a:r>
+              <a:rPr lang="en-US" b="0" dirty="0"/>
+              <a:t>usually we will do it for assets which are discovered in JS &amp; CSS like images, fonts etc.</a:t>
+            </a:r>
+          </a:p>
+          <a:p>
+            <a:pPr marL="171450" marR="0" lvl="0" indent="-171450" algn="l" defTabSz="914400" rtl="0" eaLnBrk="1" fontAlgn="auto" latinLnBrk="0" hangingPunct="1">
+              <a:lnSpc>
+                <a:spcPct val="100000"/>
+              </a:lnSpc>
+              <a:spcBef>
+                <a:spcPts val="0"/>
+              </a:spcBef>
+              <a:spcAft>
+                <a:spcPts val="0"/>
+              </a:spcAft>
+              <a:buClrTx/>
+              <a:buSzTx/>
+              <a:buFontTx/>
+              <a:buChar char="-"/>
+              <a:tabLst/>
+              <a:defRPr/>
+            </a:pPr>
+            <a:endParaRPr lang="en-US" b="0" dirty="0"/>
+          </a:p>
+          <a:p>
+            <a:pPr marL="171450" marR="0" lvl="0" indent="-171450" algn="l" defTabSz="914400" rtl="0" eaLnBrk="1" fontAlgn="auto" latinLnBrk="0" hangingPunct="1">
+              <a:lnSpc>
+                <a:spcPct val="100000"/>
+              </a:lnSpc>
+              <a:spcBef>
+                <a:spcPts val="0"/>
+              </a:spcBef>
+              <a:spcAft>
+                <a:spcPts val="0"/>
+              </a:spcAft>
+              <a:buClrTx/>
+              <a:buSzTx/>
+              <a:buFontTx/>
+              <a:buChar char="-"/>
+              <a:tabLst/>
+              <a:defRPr/>
+            </a:pPr>
+            <a:r>
+              <a:rPr lang="en-US" b="0" dirty="0"/>
+              <a:t>Responsive – we can add media query to our tag so if for example we want to preload image but we have 2 size of it one for mobile and one for desktop we can put media query on the tag and it will preload according to our width</a:t>
+            </a:r>
+          </a:p>
+          <a:p>
+            <a:pPr marL="171450" marR="0" lvl="0" indent="-171450" algn="l" defTabSz="914400" rtl="0" eaLnBrk="1" fontAlgn="auto" latinLnBrk="0" hangingPunct="1">
+              <a:lnSpc>
+                <a:spcPct val="100000"/>
+              </a:lnSpc>
+              <a:spcBef>
+                <a:spcPts val="0"/>
+              </a:spcBef>
+              <a:spcAft>
+                <a:spcPts val="0"/>
+              </a:spcAft>
+              <a:buClrTx/>
+              <a:buSzTx/>
+              <a:buFontTx/>
+              <a:buChar char="-"/>
+              <a:tabLst/>
+              <a:defRPr/>
+            </a:pPr>
+            <a:endParaRPr lang="en-US" b="0" dirty="0"/>
+          </a:p>
+          <a:p>
+            <a:pPr marL="171450" marR="0" lvl="0" indent="-171450" algn="l" defTabSz="914400" rtl="0" eaLnBrk="1" fontAlgn="auto" latinLnBrk="0" hangingPunct="1">
+              <a:lnSpc>
+                <a:spcPct val="100000"/>
+              </a:lnSpc>
+              <a:spcBef>
+                <a:spcPts val="0"/>
+              </a:spcBef>
+              <a:spcAft>
+                <a:spcPts val="0"/>
+              </a:spcAft>
+              <a:buClrTx/>
+              <a:buSzTx/>
+              <a:buFontTx/>
+              <a:buChar char="-"/>
+              <a:tabLst/>
+              <a:defRPr/>
+            </a:pPr>
+            <a:r>
+              <a:rPr lang="en-US" b="0" dirty="0"/>
+              <a:t>Http2 push – what about it? We just talk about it previously so why do we need it all what we learn?</a:t>
+            </a:r>
+            <a:br>
+              <a:rPr lang="en-US" b="0" dirty="0"/>
+            </a:br>
+            <a:r>
+              <a:rPr lang="en-US" b="0" dirty="0"/>
+              <a:t>Well, preload is kind of similar to http2 push but it’s have some differences:</a:t>
+            </a:r>
+            <a:br>
+              <a:rPr lang="en-US" b="0" dirty="0"/>
+            </a:br>
+            <a:r>
+              <a:rPr lang="en-US" b="0" dirty="0"/>
+              <a:t>- We can push only our resources and not third party like google fonts</a:t>
+            </a:r>
+            <a:br>
+              <a:rPr lang="en-US" b="0" dirty="0"/>
+            </a:br>
+            <a:r>
+              <a:rPr lang="en-US" b="0" dirty="0"/>
+              <a:t>- We don’t have media support in push</a:t>
+            </a:r>
+            <a:br>
+              <a:rPr lang="en-US" b="0" dirty="0"/>
+            </a:br>
+            <a:r>
+              <a:rPr lang="en-US" b="0" dirty="0"/>
+              <a:t>- In tag we can have callback when download have done, via push we can’t know when download was done</a:t>
+            </a:r>
+          </a:p>
+          <a:p>
+            <a:pPr marL="171450" marR="0" lvl="0" indent="-171450" algn="l" defTabSz="914400" rtl="0" eaLnBrk="1" fontAlgn="auto" latinLnBrk="0" hangingPunct="1">
+              <a:lnSpc>
+                <a:spcPct val="100000"/>
+              </a:lnSpc>
+              <a:spcBef>
+                <a:spcPts val="0"/>
+              </a:spcBef>
+              <a:spcAft>
+                <a:spcPts val="0"/>
+              </a:spcAft>
+              <a:buClrTx/>
+              <a:buSzTx/>
+              <a:buFontTx/>
+              <a:buChar char="-"/>
+              <a:tabLst/>
+              <a:defRPr/>
+            </a:pPr>
+            <a:endParaRPr lang="en-US" b="0" dirty="0"/>
+          </a:p>
+          <a:p>
+            <a:pPr marL="171450" marR="0" lvl="0" indent="-171450" algn="l" defTabSz="914400" rtl="0" eaLnBrk="1" fontAlgn="auto" latinLnBrk="0" hangingPunct="1">
+              <a:lnSpc>
+                <a:spcPct val="100000"/>
+              </a:lnSpc>
+              <a:spcBef>
+                <a:spcPts val="0"/>
+              </a:spcBef>
+              <a:spcAft>
+                <a:spcPts val="0"/>
+              </a:spcAft>
+              <a:buClrTx/>
+              <a:buSzTx/>
+              <a:buFontTx/>
+              <a:buChar char="-"/>
+              <a:tabLst/>
+              <a:defRPr/>
+            </a:pPr>
+            <a:r>
+              <a:rPr lang="en-US" dirty="0">
+                <a:hlinkClick r:id="rId3"/>
+              </a:rPr>
+              <a:t>https://www.youtube.com/watch?v=S0LuakIy65Y</a:t>
+            </a:r>
+            <a:endParaRPr lang="en-US" dirty="0"/>
+          </a:p>
+          <a:p>
+            <a:pPr marL="171450" marR="0" lvl="0" indent="-171450" algn="l" defTabSz="914400" rtl="0" eaLnBrk="1" fontAlgn="auto" latinLnBrk="0" hangingPunct="1">
+              <a:lnSpc>
+                <a:spcPct val="100000"/>
+              </a:lnSpc>
+              <a:spcBef>
+                <a:spcPts val="0"/>
+              </a:spcBef>
+              <a:spcAft>
+                <a:spcPts val="0"/>
+              </a:spcAft>
+              <a:buClrTx/>
+              <a:buSzTx/>
+              <a:buFontTx/>
+              <a:buChar char="-"/>
+              <a:tabLst/>
+              <a:defRPr/>
+            </a:pPr>
+            <a:r>
+              <a:rPr lang="en-US" dirty="0">
+                <a:hlinkClick r:id="rId4"/>
+              </a:rPr>
+              <a:t>https://slidr.io/robin-drexler/preconnect-prefetch-preload-pre-what-an-introduction-to-resource-hints</a:t>
+            </a:r>
+            <a:r>
+              <a:rPr lang="en-US">
+                <a:hlinkClick r:id="rId4"/>
+              </a:rPr>
+              <a:t>#81</a:t>
+            </a:r>
+            <a:endParaRPr lang="en-US" dirty="0"/>
+          </a:p>
+          <a:p>
+            <a:pPr marL="171450" marR="0" lvl="0" indent="-171450" algn="l" defTabSz="914400" rtl="0" eaLnBrk="1" fontAlgn="auto" latinLnBrk="0" hangingPunct="1">
+              <a:lnSpc>
+                <a:spcPct val="100000"/>
+              </a:lnSpc>
+              <a:spcBef>
+                <a:spcPts val="0"/>
+              </a:spcBef>
+              <a:spcAft>
+                <a:spcPts val="0"/>
+              </a:spcAft>
+              <a:buClrTx/>
+              <a:buSzTx/>
+              <a:buFontTx/>
+              <a:buChar char="-"/>
+              <a:tabLst/>
+              <a:defRPr/>
+            </a:pPr>
+            <a:r>
+              <a:rPr lang="en-US" dirty="0">
+                <a:hlinkClick r:id="rId5"/>
+              </a:rPr>
+              <a:t>https://www.keycdn.com/blog/resource-hints</a:t>
+            </a:r>
+            <a:endParaRPr lang="en-US" dirty="0"/>
+          </a:p>
+          <a:p>
+            <a:pPr marL="171450" marR="0" lvl="0" indent="-171450" algn="l" defTabSz="914400" rtl="0" eaLnBrk="1" fontAlgn="auto" latinLnBrk="0" hangingPunct="1">
+              <a:lnSpc>
+                <a:spcPct val="100000"/>
+              </a:lnSpc>
+              <a:spcBef>
+                <a:spcPts val="0"/>
+              </a:spcBef>
+              <a:spcAft>
+                <a:spcPts val="0"/>
+              </a:spcAft>
+              <a:buClrTx/>
+              <a:buSzTx/>
+              <a:buFontTx/>
+              <a:buChar char="-"/>
+              <a:tabLst/>
+              <a:defRPr/>
+            </a:pPr>
+            <a:r>
+              <a:rPr lang="en-US" dirty="0">
+                <a:hlinkClick r:id="rId6"/>
+              </a:rPr>
+              <a:t>https://new.blog.cloudflare.com/a-question-of-timing/</a:t>
+            </a:r>
+            <a:endParaRPr lang="en-US" dirty="0"/>
+          </a:p>
+          <a:p>
+            <a:pPr marL="171450" marR="0" lvl="0" indent="-171450" algn="l" defTabSz="914400" rtl="0" eaLnBrk="1" fontAlgn="auto" latinLnBrk="0" hangingPunct="1">
+              <a:lnSpc>
+                <a:spcPct val="100000"/>
+              </a:lnSpc>
+              <a:spcBef>
+                <a:spcPts val="0"/>
+              </a:spcBef>
+              <a:spcAft>
+                <a:spcPts val="0"/>
+              </a:spcAft>
+              <a:buClrTx/>
+              <a:buSzTx/>
+              <a:buFontTx/>
+              <a:buChar char="-"/>
+              <a:tabLst/>
+              <a:defRPr/>
+            </a:pPr>
+            <a:r>
+              <a:rPr lang="en-US" dirty="0">
+                <a:hlinkClick r:id="rId7"/>
+              </a:rPr>
+              <a:t>https://www.youtube.com/watch?v=hkKoXKoKSzU</a:t>
+            </a:r>
+            <a:r>
+              <a:rPr lang="en-US" dirty="0">
+                <a:hlinkClick r:id="rId8"/>
+              </a:rPr>
+              <a:t>https://www.websecurity.symantec.com/security-topics/what-is-ssl-tls-https</a:t>
+            </a:r>
+            <a:endParaRPr lang="en-US" dirty="0"/>
+          </a:p>
+          <a:p>
+            <a:pPr marL="171450" marR="0" lvl="0" indent="-171450" algn="l" defTabSz="914400" rtl="0" eaLnBrk="1" fontAlgn="auto" latinLnBrk="0" hangingPunct="1">
+              <a:lnSpc>
+                <a:spcPct val="100000"/>
+              </a:lnSpc>
+              <a:spcBef>
+                <a:spcPts val="0"/>
+              </a:spcBef>
+              <a:spcAft>
+                <a:spcPts val="0"/>
+              </a:spcAft>
+              <a:buClrTx/>
+              <a:buSzTx/>
+              <a:buFontTx/>
+              <a:buChar char="-"/>
+              <a:tabLst/>
+              <a:defRPr/>
+            </a:pPr>
+            <a:r>
+              <a:rPr lang="en-US" dirty="0">
+                <a:hlinkClick r:id="rId9"/>
+              </a:rPr>
+              <a:t>https://www.ssl.com/article/ssl-tls-handshake-overview/</a:t>
+            </a:r>
+            <a:endParaRPr lang="en-US" b="0" dirty="0"/>
+          </a:p>
+        </p:txBody>
+      </p:sp>
+      <p:sp>
+        <p:nvSpPr>
+          <p:cNvPr id="4" name="Slide Number Placeholder 3"/>
+          <p:cNvSpPr>
+            <a:spLocks noGrp="1"/>
+          </p:cNvSpPr>
+          <p:nvPr>
+            <p:ph type="sldNum" sz="quarter" idx="10"/>
+          </p:nvPr>
+        </p:nvSpPr>
+        <p:spPr/>
+        <p:txBody>
+          <a:bodyPr/>
+          <a:lstStyle/>
+          <a:p>
+            <a:fld id="{595D0871-5AD0-4670-BDA8-FBE649F625DD}" type="slidenum">
+              <a:rPr lang="he-IL" smtClean="0"/>
+              <a:t>9</a:t>
+            </a:fld>
+            <a:endParaRPr lang="he-IL"/>
+          </a:p>
+        </p:txBody>
+      </p:sp>
+    </p:spTree>
+    <p:extLst>
+      <p:ext uri="{BB962C8B-B14F-4D97-AF65-F5344CB8AC3E}">
+        <p14:creationId xmlns:p14="http://schemas.microsoft.com/office/powerpoint/2010/main" val="3893335909"/>
+      </p:ext>
+    </p:extLst>
+  </p:cSld>
+  <p:clrMapOvr>
+    <a:masterClrMapping/>
+  </p:clrMapOvr>
+</p:notes>
+</file>
+
 <file path=ppt/slideLayouts/slideLayout1.xml><?xml version="1.0" encoding="utf-8"?>
 <p:sldLayout xmlns:a="http://schemas.openxmlformats.org/drawingml/2006/main" xmlns:r="http://schemas.openxmlformats.org/officeDocument/2006/relationships" xmlns:p="http://schemas.openxmlformats.org/presentationml/2006/main" type="title" preserve="1">
   <p:cSld name="שקופית כותרת">
@@ -6982,7 +9138,7 @@
           <a:p>
             <a:fld id="{F472E424-CC75-4448-A1B5-6FCA6BFEE599}" type="datetimeFigureOut">
               <a:rPr lang="he-IL" smtClean="0"/>
-              <a:t>י"ד/תמוז/תשע"ט</a:t>
+              <a:t>ט"ו/תמוז/תשע"ט</a:t>
             </a:fld>
             <a:endParaRPr lang="he-IL"/>
           </a:p>
@@ -7150,7 +9306,7 @@
           <a:p>
             <a:fld id="{F472E424-CC75-4448-A1B5-6FCA6BFEE599}" type="datetimeFigureOut">
               <a:rPr lang="he-IL" smtClean="0"/>
-              <a:t>י"ד/תמוז/תשע"ט</a:t>
+              <a:t>ט"ו/תמוז/תשע"ט</a:t>
             </a:fld>
             <a:endParaRPr lang="he-IL"/>
           </a:p>
@@ -7328,7 +9484,7 @@
           <a:p>
             <a:fld id="{F472E424-CC75-4448-A1B5-6FCA6BFEE599}" type="datetimeFigureOut">
               <a:rPr lang="he-IL" smtClean="0"/>
-              <a:t>י"ד/תמוז/תשע"ט</a:t>
+              <a:t>ט"ו/תמוז/תשע"ט</a:t>
             </a:fld>
             <a:endParaRPr lang="he-IL"/>
           </a:p>
@@ -7496,7 +9652,7 @@
           <a:p>
             <a:fld id="{F472E424-CC75-4448-A1B5-6FCA6BFEE599}" type="datetimeFigureOut">
               <a:rPr lang="he-IL" smtClean="0"/>
-              <a:t>י"ד/תמוז/תשע"ט</a:t>
+              <a:t>ט"ו/תמוז/תשע"ט</a:t>
             </a:fld>
             <a:endParaRPr lang="he-IL"/>
           </a:p>
@@ -7741,7 +9897,7 @@
           <a:p>
             <a:fld id="{F472E424-CC75-4448-A1B5-6FCA6BFEE599}" type="datetimeFigureOut">
               <a:rPr lang="he-IL" smtClean="0"/>
-              <a:t>י"ד/תמוז/תשע"ט</a:t>
+              <a:t>ט"ו/תמוז/תשע"ט</a:t>
             </a:fld>
             <a:endParaRPr lang="he-IL"/>
           </a:p>
@@ -7970,7 +10126,7 @@
           <a:p>
             <a:fld id="{F472E424-CC75-4448-A1B5-6FCA6BFEE599}" type="datetimeFigureOut">
               <a:rPr lang="he-IL" smtClean="0"/>
-              <a:t>י"ד/תמוז/תשע"ט</a:t>
+              <a:t>ט"ו/תמוז/תשע"ט</a:t>
             </a:fld>
             <a:endParaRPr lang="he-IL"/>
           </a:p>
@@ -8334,7 +10490,7 @@
           <a:p>
             <a:fld id="{F472E424-CC75-4448-A1B5-6FCA6BFEE599}" type="datetimeFigureOut">
               <a:rPr lang="he-IL" smtClean="0"/>
-              <a:t>י"ד/תמוז/תשע"ט</a:t>
+              <a:t>ט"ו/תמוז/תשע"ט</a:t>
             </a:fld>
             <a:endParaRPr lang="he-IL"/>
           </a:p>
@@ -8451,7 +10607,7 @@
           <a:p>
             <a:fld id="{F472E424-CC75-4448-A1B5-6FCA6BFEE599}" type="datetimeFigureOut">
               <a:rPr lang="he-IL" smtClean="0"/>
-              <a:t>י"ד/תמוז/תשע"ט</a:t>
+              <a:t>ט"ו/תמוז/תשע"ט</a:t>
             </a:fld>
             <a:endParaRPr lang="he-IL"/>
           </a:p>
@@ -8546,7 +10702,7 @@
           <a:p>
             <a:fld id="{F472E424-CC75-4448-A1B5-6FCA6BFEE599}" type="datetimeFigureOut">
               <a:rPr lang="he-IL" smtClean="0"/>
-              <a:t>י"ד/תמוז/תשע"ט</a:t>
+              <a:t>ט"ו/תמוז/תשע"ט</a:t>
             </a:fld>
             <a:endParaRPr lang="he-IL"/>
           </a:p>
@@ -8821,7 +10977,7 @@
           <a:p>
             <a:fld id="{F472E424-CC75-4448-A1B5-6FCA6BFEE599}" type="datetimeFigureOut">
               <a:rPr lang="he-IL" smtClean="0"/>
-              <a:t>י"ד/תמוז/תשע"ט</a:t>
+              <a:t>ט"ו/תמוז/תשע"ט</a:t>
             </a:fld>
             <a:endParaRPr lang="he-IL"/>
           </a:p>
@@ -9073,7 +11229,7 @@
           <a:p>
             <a:fld id="{F472E424-CC75-4448-A1B5-6FCA6BFEE599}" type="datetimeFigureOut">
               <a:rPr lang="he-IL" smtClean="0"/>
-              <a:t>י"ד/תמוז/תשע"ט</a:t>
+              <a:t>ט"ו/תמוז/תשע"ט</a:t>
             </a:fld>
             <a:endParaRPr lang="he-IL"/>
           </a:p>
@@ -9284,7 +11440,7 @@
           <a:p>
             <a:fld id="{F472E424-CC75-4448-A1B5-6FCA6BFEE599}" type="datetimeFigureOut">
               <a:rPr lang="he-IL" smtClean="0"/>
-              <a:t>י"ד/תמוז/תשע"ט</a:t>
+              <a:t>ט"ו/תמוז/תשע"ט</a:t>
             </a:fld>
             <a:endParaRPr lang="he-IL"/>
           </a:p>
@@ -10714,6 +12870,138 @@
     <p:extLst>
       <p:ext uri="{BB962C8B-B14F-4D97-AF65-F5344CB8AC3E}">
         <p14:creationId xmlns:p14="http://schemas.microsoft.com/office/powerpoint/2010/main" val="4259968551"/>
+      </p:ext>
+    </p:extLst>
+  </p:cSld>
+  <p:clrMapOvr>
+    <a:masterClrMapping/>
+  </p:clrMapOvr>
+  <mc:AlternateContent xmlns:mc="http://schemas.openxmlformats.org/markup-compatibility/2006" xmlns:p14="http://schemas.microsoft.com/office/powerpoint/2010/main">
+    <mc:Choice Requires="p14">
+      <p:transition spd="med" p14:dur="700">
+        <p:fade/>
+      </p:transition>
+    </mc:Choice>
+    <mc:Fallback xmlns="">
+      <p:transition xmlns:p14="http://schemas.microsoft.com/office/powerpoint/2010/main" spd="med">
+        <p:fade/>
+      </p:transition>
+    </mc:Fallback>
+  </mc:AlternateContent>
+</p:sld>
+</file>
+
+<file path=ppt/slides/slide9.xml><?xml version="1.0" encoding="utf-8"?>
+<p:sld xmlns:a="http://schemas.openxmlformats.org/drawingml/2006/main" xmlns:r="http://schemas.openxmlformats.org/officeDocument/2006/relationships" xmlns:p="http://schemas.openxmlformats.org/presentationml/2006/main">
+  <p:cSld>
+    <p:spTree>
+      <p:nvGrpSpPr>
+        <p:cNvPr id="1" name=""/>
+        <p:cNvGrpSpPr/>
+        <p:nvPr/>
+      </p:nvGrpSpPr>
+      <p:grpSpPr>
+        <a:xfrm>
+          <a:off x="0" y="0"/>
+          <a:ext cx="0" cy="0"/>
+          <a:chOff x="0" y="0"/>
+          <a:chExt cx="0" cy="0"/>
+        </a:xfrm>
+      </p:grpSpPr>
+      <p:sp>
+        <p:nvSpPr>
+          <p:cNvPr id="6" name="Rectangle 5"/>
+          <p:cNvSpPr/>
+          <p:nvPr/>
+        </p:nvSpPr>
+        <p:spPr>
+          <a:xfrm>
+            <a:off x="-215115" y="0"/>
+            <a:ext cx="12407115" cy="6858000"/>
+          </a:xfrm>
+          <a:prstGeom prst="rect">
+            <a:avLst/>
+          </a:prstGeom>
+          <a:solidFill>
+            <a:schemeClr val="accent1">
+              <a:lumMod val="75000"/>
+            </a:schemeClr>
+          </a:solidFill>
+          <a:ln>
+            <a:noFill/>
+          </a:ln>
+        </p:spPr>
+        <p:style>
+          <a:lnRef idx="1">
+            <a:schemeClr val="accent1"/>
+          </a:lnRef>
+          <a:fillRef idx="3">
+            <a:schemeClr val="accent1"/>
+          </a:fillRef>
+          <a:effectRef idx="2">
+            <a:schemeClr val="accent1"/>
+          </a:effectRef>
+          <a:fontRef idx="minor">
+            <a:schemeClr val="lt1"/>
+          </a:fontRef>
+        </p:style>
+        <p:txBody>
+          <a:bodyPr rtlCol="0" anchor="ctr"/>
+          <a:lstStyle/>
+          <a:p>
+            <a:pPr algn="ctr"/>
+            <a:endParaRPr lang="en-US" sz="2400"/>
+          </a:p>
+        </p:txBody>
+      </p:sp>
+      <p:sp>
+        <p:nvSpPr>
+          <p:cNvPr id="24" name="Title 1"/>
+          <p:cNvSpPr>
+            <a:spLocks noGrp="1"/>
+          </p:cNvSpPr>
+          <p:nvPr>
+            <p:ph type="title"/>
+          </p:nvPr>
+        </p:nvSpPr>
+        <p:spPr>
+          <a:xfrm>
+            <a:off x="502042" y="1936377"/>
+            <a:ext cx="10972800" cy="2985246"/>
+          </a:xfrm>
+        </p:spPr>
+        <p:txBody>
+          <a:bodyPr>
+            <a:noAutofit/>
+          </a:bodyPr>
+          <a:lstStyle/>
+          <a:p>
+            <a:pPr algn="ctr" rtl="0" eaLnBrk="0" fontAlgn="base" hangingPunct="0">
+              <a:spcAft>
+                <a:spcPct val="0"/>
+              </a:spcAft>
+            </a:pPr>
+            <a:r>
+              <a:rPr lang="en-US" sz="6000" dirty="0">
+                <a:solidFill>
+                  <a:schemeClr val="bg1"/>
+                </a:solidFill>
+              </a:rPr>
+              <a:t>Resource Hints</a:t>
+            </a:r>
+            <a:endParaRPr lang="en-US" altLang="en-US" sz="6000" b="1" dirty="0">
+              <a:solidFill>
+                <a:schemeClr val="bg1"/>
+              </a:solidFill>
+              <a:latin typeface="Calibri (Body)"/>
+            </a:endParaRPr>
+          </a:p>
+        </p:txBody>
+      </p:sp>
+    </p:spTree>
+    <p:extLst>
+      <p:ext uri="{BB962C8B-B14F-4D97-AF65-F5344CB8AC3E}">
+        <p14:creationId xmlns:p14="http://schemas.microsoft.com/office/powerpoint/2010/main" val="4159114607"/>
       </p:ext>
     </p:extLst>
   </p:cSld>

</xml_diff>